<commit_message>
Update Proposal Edit Ver.
Update Proposal. Edit by SunA at 12:26A.M.
</commit_message>
<xml_diff>
--- a/Game_Design/2019184003 김 선아 장르 제안서.pptx
+++ b/Game_Design/2019184003 김 선아 장르 제안서.pptx
@@ -262,7 +262,7 @@
           <a:p>
             <a:fld id="{E2CF5178-EA5D-4D99-A2BC-F1725EA1756D}" type="datetimeFigureOut">
               <a:rPr lang="ko-KR" altLang="en-US" smtClean="0"/>
-              <a:t>2022-09-21</a:t>
+              <a:t>2022-09-22</a:t>
             </a:fld>
             <a:endParaRPr lang="ko-KR" altLang="en-US"/>
           </a:p>
@@ -432,7 +432,7 @@
           <a:p>
             <a:fld id="{E2CF5178-EA5D-4D99-A2BC-F1725EA1756D}" type="datetimeFigureOut">
               <a:rPr lang="ko-KR" altLang="en-US" smtClean="0"/>
-              <a:t>2022-09-21</a:t>
+              <a:t>2022-09-22</a:t>
             </a:fld>
             <a:endParaRPr lang="ko-KR" altLang="en-US"/>
           </a:p>
@@ -612,7 +612,7 @@
           <a:p>
             <a:fld id="{E2CF5178-EA5D-4D99-A2BC-F1725EA1756D}" type="datetimeFigureOut">
               <a:rPr lang="ko-KR" altLang="en-US" smtClean="0"/>
-              <a:t>2022-09-21</a:t>
+              <a:t>2022-09-22</a:t>
             </a:fld>
             <a:endParaRPr lang="ko-KR" altLang="en-US"/>
           </a:p>
@@ -782,7 +782,7 @@
           <a:p>
             <a:fld id="{E2CF5178-EA5D-4D99-A2BC-F1725EA1756D}" type="datetimeFigureOut">
               <a:rPr lang="ko-KR" altLang="en-US" smtClean="0"/>
-              <a:t>2022-09-21</a:t>
+              <a:t>2022-09-22</a:t>
             </a:fld>
             <a:endParaRPr lang="ko-KR" altLang="en-US"/>
           </a:p>
@@ -1028,7 +1028,7 @@
           <a:p>
             <a:fld id="{E2CF5178-EA5D-4D99-A2BC-F1725EA1756D}" type="datetimeFigureOut">
               <a:rPr lang="ko-KR" altLang="en-US" smtClean="0"/>
-              <a:t>2022-09-21</a:t>
+              <a:t>2022-09-22</a:t>
             </a:fld>
             <a:endParaRPr lang="ko-KR" altLang="en-US"/>
           </a:p>
@@ -1260,7 +1260,7 @@
           <a:p>
             <a:fld id="{E2CF5178-EA5D-4D99-A2BC-F1725EA1756D}" type="datetimeFigureOut">
               <a:rPr lang="ko-KR" altLang="en-US" smtClean="0"/>
-              <a:t>2022-09-21</a:t>
+              <a:t>2022-09-22</a:t>
             </a:fld>
             <a:endParaRPr lang="ko-KR" altLang="en-US"/>
           </a:p>
@@ -1627,7 +1627,7 @@
           <a:p>
             <a:fld id="{E2CF5178-EA5D-4D99-A2BC-F1725EA1756D}" type="datetimeFigureOut">
               <a:rPr lang="ko-KR" altLang="en-US" smtClean="0"/>
-              <a:t>2022-09-21</a:t>
+              <a:t>2022-09-22</a:t>
             </a:fld>
             <a:endParaRPr lang="ko-KR" altLang="en-US"/>
           </a:p>
@@ -1745,7 +1745,7 @@
           <a:p>
             <a:fld id="{E2CF5178-EA5D-4D99-A2BC-F1725EA1756D}" type="datetimeFigureOut">
               <a:rPr lang="ko-KR" altLang="en-US" smtClean="0"/>
-              <a:t>2022-09-21</a:t>
+              <a:t>2022-09-22</a:t>
             </a:fld>
             <a:endParaRPr lang="ko-KR" altLang="en-US"/>
           </a:p>
@@ -1840,7 +1840,7 @@
           <a:p>
             <a:fld id="{E2CF5178-EA5D-4D99-A2BC-F1725EA1756D}" type="datetimeFigureOut">
               <a:rPr lang="ko-KR" altLang="en-US" smtClean="0"/>
-              <a:t>2022-09-21</a:t>
+              <a:t>2022-09-22</a:t>
             </a:fld>
             <a:endParaRPr lang="ko-KR" altLang="en-US"/>
           </a:p>
@@ -2117,7 +2117,7 @@
           <a:p>
             <a:fld id="{E2CF5178-EA5D-4D99-A2BC-F1725EA1756D}" type="datetimeFigureOut">
               <a:rPr lang="ko-KR" altLang="en-US" smtClean="0"/>
-              <a:t>2022-09-21</a:t>
+              <a:t>2022-09-22</a:t>
             </a:fld>
             <a:endParaRPr lang="ko-KR" altLang="en-US"/>
           </a:p>
@@ -2374,7 +2374,7 @@
           <a:p>
             <a:fld id="{E2CF5178-EA5D-4D99-A2BC-F1725EA1756D}" type="datetimeFigureOut">
               <a:rPr lang="ko-KR" altLang="en-US" smtClean="0"/>
-              <a:t>2022-09-21</a:t>
+              <a:t>2022-09-22</a:t>
             </a:fld>
             <a:endParaRPr lang="ko-KR" altLang="en-US"/>
           </a:p>
@@ -2587,7 +2587,7 @@
           <a:p>
             <a:fld id="{E2CF5178-EA5D-4D99-A2BC-F1725EA1756D}" type="datetimeFigureOut">
               <a:rPr lang="ko-KR" altLang="en-US" smtClean="0"/>
-              <a:t>2022-09-21</a:t>
+              <a:t>2022-09-22</a:t>
             </a:fld>
             <a:endParaRPr lang="ko-KR" altLang="en-US"/>
           </a:p>
@@ -3547,6 +3547,700 @@
           </a:p>
         </p:txBody>
       </p:sp>
+      <p:pic>
+        <p:nvPicPr>
+          <p:cNvPr id="1026" name="Picture 2">
+            <a:extLst>
+              <a:ext uri="{FF2B5EF4-FFF2-40B4-BE49-F238E27FC236}">
+                <a16:creationId xmlns:a16="http://schemas.microsoft.com/office/drawing/2014/main" id="{8A842A41-F646-76D6-B42E-D5DD4A884CE5}"/>
+              </a:ext>
+            </a:extLst>
+          </p:cNvPr>
+          <p:cNvPicPr>
+            <a:picLocks noChangeAspect="1" noChangeArrowheads="1"/>
+          </p:cNvPicPr>
+          <p:nvPr/>
+        </p:nvPicPr>
+        <p:blipFill rotWithShape="1">
+          <a:blip r:embed="rId2">
+            <a:extLst>
+              <a:ext uri="{BEBA8EAE-BF5A-486C-A8C5-ECC9F3942E4B}">
+                <a14:imgProps xmlns:a14="http://schemas.microsoft.com/office/drawing/2010/main">
+                  <a14:imgLayer r:embed="rId3">
+                    <a14:imgEffect>
+                      <a14:backgroundRemoval t="7343" b="74126" l="0" r="97727"/>
+                    </a14:imgEffect>
+                  </a14:imgLayer>
+                </a14:imgProps>
+              </a:ext>
+              <a:ext uri="{28A0092B-C50C-407E-A947-70E740481C1C}">
+                <a14:useLocalDpi xmlns:a14="http://schemas.microsoft.com/office/drawing/2010/main" val="0"/>
+              </a:ext>
+            </a:extLst>
+          </a:blip>
+          <a:srcRect t="27150" b="25146"/>
+          <a:stretch/>
+        </p:blipFill>
+        <p:spPr bwMode="auto">
+          <a:xfrm>
+            <a:off x="1919037" y="925976"/>
+            <a:ext cx="8353926" cy="3985142"/>
+          </a:xfrm>
+          <a:prstGeom prst="rect">
+            <a:avLst/>
+          </a:prstGeom>
+          <a:noFill/>
+          <a:extLst>
+            <a:ext uri="{909E8E84-426E-40DD-AFC4-6F175D3DCCD1}">
+              <a14:hiddenFill xmlns:a14="http://schemas.microsoft.com/office/drawing/2010/main">
+                <a:solidFill>
+                  <a:srgbClr val="FFFFFF"/>
+                </a:solidFill>
+              </a14:hiddenFill>
+            </a:ext>
+          </a:extLst>
+        </p:spPr>
+      </p:pic>
+      <p:sp>
+        <p:nvSpPr>
+          <p:cNvPr id="3" name="사각형: 둥근 모서리 2">
+            <a:extLst>
+              <a:ext uri="{FF2B5EF4-FFF2-40B4-BE49-F238E27FC236}">
+                <a16:creationId xmlns:a16="http://schemas.microsoft.com/office/drawing/2014/main" id="{9224A4DD-1280-583F-ACEF-A0DD7BD8BAC9}"/>
+              </a:ext>
+            </a:extLst>
+          </p:cNvPr>
+          <p:cNvSpPr/>
+          <p:nvPr/>
+        </p:nvSpPr>
+        <p:spPr>
+          <a:xfrm>
+            <a:off x="3571970" y="2317827"/>
+            <a:ext cx="504000" cy="504000"/>
+          </a:xfrm>
+          <a:prstGeom prst="roundRect">
+            <a:avLst/>
+          </a:prstGeom>
+          <a:solidFill>
+            <a:srgbClr val="FFC000">
+              <a:alpha val="40000"/>
+            </a:srgbClr>
+          </a:solidFill>
+          <a:ln>
+            <a:noFill/>
+          </a:ln>
+        </p:spPr>
+        <p:style>
+          <a:lnRef idx="2">
+            <a:schemeClr val="accent1">
+              <a:shade val="50000"/>
+            </a:schemeClr>
+          </a:lnRef>
+          <a:fillRef idx="1">
+            <a:schemeClr val="accent1"/>
+          </a:fillRef>
+          <a:effectRef idx="0">
+            <a:schemeClr val="accent1"/>
+          </a:effectRef>
+          <a:fontRef idx="minor">
+            <a:schemeClr val="lt1"/>
+          </a:fontRef>
+        </p:style>
+        <p:txBody>
+          <a:bodyPr rtlCol="0" anchor="ctr"/>
+          <a:lstStyle/>
+          <a:p>
+            <a:pPr algn="ctr"/>
+            <a:endParaRPr lang="ko-KR" altLang="en-US"/>
+          </a:p>
+        </p:txBody>
+      </p:sp>
+      <p:sp>
+        <p:nvSpPr>
+          <p:cNvPr id="4" name="사각형: 둥근 모서리 3">
+            <a:extLst>
+              <a:ext uri="{FF2B5EF4-FFF2-40B4-BE49-F238E27FC236}">
+                <a16:creationId xmlns:a16="http://schemas.microsoft.com/office/drawing/2014/main" id="{BD53039B-5DEF-2FB3-8929-0953F1F18FD4}"/>
+              </a:ext>
+            </a:extLst>
+          </p:cNvPr>
+          <p:cNvSpPr/>
+          <p:nvPr/>
+        </p:nvSpPr>
+        <p:spPr>
+          <a:xfrm>
+            <a:off x="3175730" y="2831987"/>
+            <a:ext cx="504000" cy="504000"/>
+          </a:xfrm>
+          <a:prstGeom prst="roundRect">
+            <a:avLst/>
+          </a:prstGeom>
+          <a:solidFill>
+            <a:srgbClr val="FFC000">
+              <a:alpha val="40000"/>
+            </a:srgbClr>
+          </a:solidFill>
+          <a:ln>
+            <a:noFill/>
+          </a:ln>
+        </p:spPr>
+        <p:style>
+          <a:lnRef idx="2">
+            <a:schemeClr val="accent1">
+              <a:shade val="50000"/>
+            </a:schemeClr>
+          </a:lnRef>
+          <a:fillRef idx="1">
+            <a:schemeClr val="accent1"/>
+          </a:fillRef>
+          <a:effectRef idx="0">
+            <a:schemeClr val="accent1"/>
+          </a:effectRef>
+          <a:fontRef idx="minor">
+            <a:schemeClr val="lt1"/>
+          </a:fontRef>
+        </p:style>
+        <p:txBody>
+          <a:bodyPr rtlCol="0" anchor="ctr"/>
+          <a:lstStyle/>
+          <a:p>
+            <a:pPr algn="ctr"/>
+            <a:endParaRPr lang="ko-KR" altLang="en-US"/>
+          </a:p>
+        </p:txBody>
+      </p:sp>
+      <p:sp>
+        <p:nvSpPr>
+          <p:cNvPr id="5" name="사각형: 둥근 모서리 4">
+            <a:extLst>
+              <a:ext uri="{FF2B5EF4-FFF2-40B4-BE49-F238E27FC236}">
+                <a16:creationId xmlns:a16="http://schemas.microsoft.com/office/drawing/2014/main" id="{6E2C2755-0D45-2D38-FE89-DAAC5F47D5F1}"/>
+              </a:ext>
+            </a:extLst>
+          </p:cNvPr>
+          <p:cNvSpPr/>
+          <p:nvPr/>
+        </p:nvSpPr>
+        <p:spPr>
+          <a:xfrm>
+            <a:off x="3716750" y="2831987"/>
+            <a:ext cx="504000" cy="504000"/>
+          </a:xfrm>
+          <a:prstGeom prst="roundRect">
+            <a:avLst/>
+          </a:prstGeom>
+          <a:solidFill>
+            <a:srgbClr val="FFC000">
+              <a:alpha val="40000"/>
+            </a:srgbClr>
+          </a:solidFill>
+          <a:ln>
+            <a:noFill/>
+          </a:ln>
+        </p:spPr>
+        <p:style>
+          <a:lnRef idx="2">
+            <a:schemeClr val="accent1">
+              <a:shade val="50000"/>
+            </a:schemeClr>
+          </a:lnRef>
+          <a:fillRef idx="1">
+            <a:schemeClr val="accent1"/>
+          </a:fillRef>
+          <a:effectRef idx="0">
+            <a:schemeClr val="accent1"/>
+          </a:effectRef>
+          <a:fontRef idx="minor">
+            <a:schemeClr val="lt1"/>
+          </a:fontRef>
+        </p:style>
+        <p:txBody>
+          <a:bodyPr rtlCol="0" anchor="ctr"/>
+          <a:lstStyle/>
+          <a:p>
+            <a:pPr algn="ctr"/>
+            <a:endParaRPr lang="ko-KR" altLang="en-US"/>
+          </a:p>
+        </p:txBody>
+      </p:sp>
+      <p:sp>
+        <p:nvSpPr>
+          <p:cNvPr id="6" name="사각형: 둥근 모서리 5">
+            <a:extLst>
+              <a:ext uri="{FF2B5EF4-FFF2-40B4-BE49-F238E27FC236}">
+                <a16:creationId xmlns:a16="http://schemas.microsoft.com/office/drawing/2014/main" id="{110F7627-F2DD-A9B1-4B98-06FEB96A05D4}"/>
+              </a:ext>
+            </a:extLst>
+          </p:cNvPr>
+          <p:cNvSpPr/>
+          <p:nvPr/>
+        </p:nvSpPr>
+        <p:spPr>
+          <a:xfrm>
+            <a:off x="4257770" y="2831987"/>
+            <a:ext cx="504000" cy="504000"/>
+          </a:xfrm>
+          <a:prstGeom prst="roundRect">
+            <a:avLst/>
+          </a:prstGeom>
+          <a:solidFill>
+            <a:srgbClr val="FFC000">
+              <a:alpha val="40000"/>
+            </a:srgbClr>
+          </a:solidFill>
+          <a:ln>
+            <a:noFill/>
+          </a:ln>
+        </p:spPr>
+        <p:style>
+          <a:lnRef idx="2">
+            <a:schemeClr val="accent1">
+              <a:shade val="50000"/>
+            </a:schemeClr>
+          </a:lnRef>
+          <a:fillRef idx="1">
+            <a:schemeClr val="accent1"/>
+          </a:fillRef>
+          <a:effectRef idx="0">
+            <a:schemeClr val="accent1"/>
+          </a:effectRef>
+          <a:fontRef idx="minor">
+            <a:schemeClr val="lt1"/>
+          </a:fontRef>
+        </p:style>
+        <p:txBody>
+          <a:bodyPr rtlCol="0" anchor="ctr"/>
+          <a:lstStyle/>
+          <a:p>
+            <a:pPr algn="ctr"/>
+            <a:endParaRPr lang="ko-KR" altLang="en-US"/>
+          </a:p>
+        </p:txBody>
+      </p:sp>
+      <p:sp>
+        <p:nvSpPr>
+          <p:cNvPr id="7" name="사각형: 둥근 모서리 6">
+            <a:extLst>
+              <a:ext uri="{FF2B5EF4-FFF2-40B4-BE49-F238E27FC236}">
+                <a16:creationId xmlns:a16="http://schemas.microsoft.com/office/drawing/2014/main" id="{716ABDEA-8758-9AD8-A7EC-A33C863C9EB0}"/>
+              </a:ext>
+            </a:extLst>
+          </p:cNvPr>
+          <p:cNvSpPr/>
+          <p:nvPr/>
+        </p:nvSpPr>
+        <p:spPr>
+          <a:xfrm>
+            <a:off x="2779490" y="1800492"/>
+            <a:ext cx="504000" cy="504000"/>
+          </a:xfrm>
+          <a:prstGeom prst="roundRect">
+            <a:avLst/>
+          </a:prstGeom>
+          <a:solidFill>
+            <a:srgbClr val="FF0000">
+              <a:alpha val="40000"/>
+            </a:srgbClr>
+          </a:solidFill>
+          <a:ln>
+            <a:noFill/>
+          </a:ln>
+        </p:spPr>
+        <p:style>
+          <a:lnRef idx="2">
+            <a:schemeClr val="accent1">
+              <a:shade val="50000"/>
+            </a:schemeClr>
+          </a:lnRef>
+          <a:fillRef idx="1">
+            <a:schemeClr val="accent1"/>
+          </a:fillRef>
+          <a:effectRef idx="0">
+            <a:schemeClr val="accent1"/>
+          </a:effectRef>
+          <a:fontRef idx="minor">
+            <a:schemeClr val="lt1"/>
+          </a:fontRef>
+        </p:style>
+        <p:txBody>
+          <a:bodyPr rtlCol="0" anchor="ctr"/>
+          <a:lstStyle/>
+          <a:p>
+            <a:pPr algn="ctr"/>
+            <a:endParaRPr lang="ko-KR" altLang="en-US"/>
+          </a:p>
+        </p:txBody>
+      </p:sp>
+      <p:sp>
+        <p:nvSpPr>
+          <p:cNvPr id="8" name="사각형: 둥근 모서리 7">
+            <a:extLst>
+              <a:ext uri="{FF2B5EF4-FFF2-40B4-BE49-F238E27FC236}">
+                <a16:creationId xmlns:a16="http://schemas.microsoft.com/office/drawing/2014/main" id="{5B2488FF-546C-C097-60B0-87DF72DF6912}"/>
+              </a:ext>
+            </a:extLst>
+          </p:cNvPr>
+          <p:cNvSpPr/>
+          <p:nvPr/>
+        </p:nvSpPr>
+        <p:spPr>
+          <a:xfrm>
+            <a:off x="3316160" y="1799846"/>
+            <a:ext cx="504000" cy="504000"/>
+          </a:xfrm>
+          <a:prstGeom prst="roundRect">
+            <a:avLst/>
+          </a:prstGeom>
+          <a:solidFill>
+            <a:srgbClr val="FF0000">
+              <a:alpha val="40000"/>
+            </a:srgbClr>
+          </a:solidFill>
+          <a:ln>
+            <a:noFill/>
+          </a:ln>
+        </p:spPr>
+        <p:style>
+          <a:lnRef idx="2">
+            <a:schemeClr val="accent1">
+              <a:shade val="50000"/>
+            </a:schemeClr>
+          </a:lnRef>
+          <a:fillRef idx="1">
+            <a:schemeClr val="accent1"/>
+          </a:fillRef>
+          <a:effectRef idx="0">
+            <a:schemeClr val="accent1"/>
+          </a:effectRef>
+          <a:fontRef idx="minor">
+            <a:schemeClr val="lt1"/>
+          </a:fontRef>
+        </p:style>
+        <p:txBody>
+          <a:bodyPr rtlCol="0" anchor="ctr"/>
+          <a:lstStyle/>
+          <a:p>
+            <a:pPr algn="ctr"/>
+            <a:endParaRPr lang="ko-KR" altLang="en-US"/>
+          </a:p>
+        </p:txBody>
+      </p:sp>
+      <p:sp>
+        <p:nvSpPr>
+          <p:cNvPr id="9" name="사각형: 둥근 모서리 8">
+            <a:extLst>
+              <a:ext uri="{FF2B5EF4-FFF2-40B4-BE49-F238E27FC236}">
+                <a16:creationId xmlns:a16="http://schemas.microsoft.com/office/drawing/2014/main" id="{A930A052-3423-AE5E-7118-71C6D5FEF24A}"/>
+              </a:ext>
+            </a:extLst>
+          </p:cNvPr>
+          <p:cNvSpPr/>
+          <p:nvPr/>
+        </p:nvSpPr>
+        <p:spPr>
+          <a:xfrm>
+            <a:off x="3850925" y="1799846"/>
+            <a:ext cx="504000" cy="504000"/>
+          </a:xfrm>
+          <a:prstGeom prst="roundRect">
+            <a:avLst/>
+          </a:prstGeom>
+          <a:solidFill>
+            <a:srgbClr val="FF0000">
+              <a:alpha val="40000"/>
+            </a:srgbClr>
+          </a:solidFill>
+          <a:ln>
+            <a:noFill/>
+          </a:ln>
+        </p:spPr>
+        <p:style>
+          <a:lnRef idx="2">
+            <a:schemeClr val="accent1">
+              <a:shade val="50000"/>
+            </a:schemeClr>
+          </a:lnRef>
+          <a:fillRef idx="1">
+            <a:schemeClr val="accent1"/>
+          </a:fillRef>
+          <a:effectRef idx="0">
+            <a:schemeClr val="accent1"/>
+          </a:effectRef>
+          <a:fontRef idx="minor">
+            <a:schemeClr val="lt1"/>
+          </a:fontRef>
+        </p:style>
+        <p:txBody>
+          <a:bodyPr rtlCol="0" anchor="ctr"/>
+          <a:lstStyle/>
+          <a:p>
+            <a:pPr algn="ctr"/>
+            <a:endParaRPr lang="ko-KR" altLang="en-US"/>
+          </a:p>
+        </p:txBody>
+      </p:sp>
+      <p:sp>
+        <p:nvSpPr>
+          <p:cNvPr id="10" name="TextBox 9">
+            <a:extLst>
+              <a:ext uri="{FF2B5EF4-FFF2-40B4-BE49-F238E27FC236}">
+                <a16:creationId xmlns:a16="http://schemas.microsoft.com/office/drawing/2014/main" id="{A923B3FC-B30A-09C9-831D-6D0A48CE15DB}"/>
+              </a:ext>
+            </a:extLst>
+          </p:cNvPr>
+          <p:cNvSpPr txBox="1"/>
+          <p:nvPr/>
+        </p:nvSpPr>
+        <p:spPr>
+          <a:xfrm>
+            <a:off x="1919037" y="4670316"/>
+            <a:ext cx="8518359" cy="1438855"/>
+          </a:xfrm>
+          <a:prstGeom prst="rect">
+            <a:avLst/>
+          </a:prstGeom>
+          <a:noFill/>
+        </p:spPr>
+        <p:txBody>
+          <a:bodyPr wrap="square" rtlCol="0">
+            <a:spAutoFit/>
+          </a:bodyPr>
+          <a:lstStyle/>
+          <a:p>
+            <a:pPr>
+              <a:lnSpc>
+                <a:spcPct val="150000"/>
+              </a:lnSpc>
+            </a:pPr>
+            <a:r>
+              <a:rPr lang="ko-KR" altLang="en-US" sz="2000" dirty="0">
+                <a:latin typeface="G마켓 산스 TTF Light" panose="02000000000000000000" pitchFamily="2" charset="-127"/>
+                <a:ea typeface="G마켓 산스 TTF Light" panose="02000000000000000000" pitchFamily="2" charset="-127"/>
+              </a:rPr>
+              <a:t>플레이어 이동</a:t>
+            </a:r>
+            <a:r>
+              <a:rPr lang="en-US" altLang="ko-KR" sz="2000" dirty="0">
+                <a:latin typeface="G마켓 산스 TTF Light" panose="02000000000000000000" pitchFamily="2" charset="-127"/>
+                <a:ea typeface="G마켓 산스 TTF Light" panose="02000000000000000000" pitchFamily="2" charset="-127"/>
+              </a:rPr>
+              <a:t>	| W, A, S, D (</a:t>
+            </a:r>
+            <a:r>
+              <a:rPr lang="ko-KR" altLang="en-US" sz="2000" dirty="0">
+                <a:latin typeface="G마켓 산스 TTF Light" panose="02000000000000000000" pitchFamily="2" charset="-127"/>
+                <a:ea typeface="G마켓 산스 TTF Light" panose="02000000000000000000" pitchFamily="2" charset="-127"/>
+              </a:rPr>
+              <a:t>상</a:t>
+            </a:r>
+            <a:r>
+              <a:rPr lang="en-US" altLang="ko-KR" sz="2000" dirty="0">
+                <a:latin typeface="G마켓 산스 TTF Light" panose="02000000000000000000" pitchFamily="2" charset="-127"/>
+                <a:ea typeface="G마켓 산스 TTF Light" panose="02000000000000000000" pitchFamily="2" charset="-127"/>
+              </a:rPr>
+              <a:t>, </a:t>
+            </a:r>
+            <a:r>
+              <a:rPr lang="ko-KR" altLang="en-US" sz="2000" dirty="0">
+                <a:latin typeface="G마켓 산스 TTF Light" panose="02000000000000000000" pitchFamily="2" charset="-127"/>
+                <a:ea typeface="G마켓 산스 TTF Light" panose="02000000000000000000" pitchFamily="2" charset="-127"/>
+              </a:rPr>
+              <a:t>좌</a:t>
+            </a:r>
+            <a:r>
+              <a:rPr lang="en-US" altLang="ko-KR" sz="2000" dirty="0">
+                <a:latin typeface="G마켓 산스 TTF Light" panose="02000000000000000000" pitchFamily="2" charset="-127"/>
+                <a:ea typeface="G마켓 산스 TTF Light" panose="02000000000000000000" pitchFamily="2" charset="-127"/>
+              </a:rPr>
+              <a:t>, </a:t>
+            </a:r>
+            <a:r>
+              <a:rPr lang="ko-KR" altLang="en-US" sz="2000" dirty="0">
+                <a:latin typeface="G마켓 산스 TTF Light" panose="02000000000000000000" pitchFamily="2" charset="-127"/>
+                <a:ea typeface="G마켓 산스 TTF Light" panose="02000000000000000000" pitchFamily="2" charset="-127"/>
+              </a:rPr>
+              <a:t>하</a:t>
+            </a:r>
+            <a:r>
+              <a:rPr lang="en-US" altLang="ko-KR" sz="2000" dirty="0">
+                <a:latin typeface="G마켓 산스 TTF Light" panose="02000000000000000000" pitchFamily="2" charset="-127"/>
+                <a:ea typeface="G마켓 산스 TTF Light" panose="02000000000000000000" pitchFamily="2" charset="-127"/>
+              </a:rPr>
+              <a:t>, </a:t>
+            </a:r>
+            <a:r>
+              <a:rPr lang="ko-KR" altLang="en-US" sz="2000" dirty="0">
+                <a:latin typeface="G마켓 산스 TTF Light" panose="02000000000000000000" pitchFamily="2" charset="-127"/>
+                <a:ea typeface="G마켓 산스 TTF Light" panose="02000000000000000000" pitchFamily="2" charset="-127"/>
+              </a:rPr>
+              <a:t>우 </a:t>
+            </a:r>
+            <a:r>
+              <a:rPr lang="en-US" altLang="ko-KR" sz="2000" dirty="0">
+                <a:latin typeface="G마켓 산스 TTF Light" panose="02000000000000000000" pitchFamily="2" charset="-127"/>
+                <a:ea typeface="G마켓 산스 TTF Light" panose="02000000000000000000" pitchFamily="2" charset="-127"/>
+              </a:rPr>
+              <a:t>)</a:t>
+            </a:r>
+          </a:p>
+          <a:p>
+            <a:pPr>
+              <a:lnSpc>
+                <a:spcPct val="150000"/>
+              </a:lnSpc>
+            </a:pPr>
+            <a:r>
+              <a:rPr lang="ko-KR" altLang="en-US" sz="2000" dirty="0">
+                <a:latin typeface="G마켓 산스 TTF Light" panose="02000000000000000000" pitchFamily="2" charset="-127"/>
+                <a:ea typeface="G마켓 산스 TTF Light" panose="02000000000000000000" pitchFamily="2" charset="-127"/>
+              </a:rPr>
+              <a:t>무기 변경</a:t>
+            </a:r>
+            <a:r>
+              <a:rPr lang="en-US" altLang="ko-KR" sz="2000" dirty="0">
+                <a:latin typeface="G마켓 산스 TTF Light" panose="02000000000000000000" pitchFamily="2" charset="-127"/>
+                <a:ea typeface="G마켓 산스 TTF Light" panose="02000000000000000000" pitchFamily="2" charset="-127"/>
+              </a:rPr>
+              <a:t>		| 1, 2, 3 (1</a:t>
+            </a:r>
+            <a:r>
+              <a:rPr lang="ko-KR" altLang="en-US" sz="2000" dirty="0">
+                <a:latin typeface="G마켓 산스 TTF Light" panose="02000000000000000000" pitchFamily="2" charset="-127"/>
+                <a:ea typeface="G마켓 산스 TTF Light" panose="02000000000000000000" pitchFamily="2" charset="-127"/>
+              </a:rPr>
+              <a:t>을 누르면 </a:t>
+            </a:r>
+            <a:r>
+              <a:rPr lang="en-US" altLang="ko-KR" sz="2000" dirty="0">
+                <a:latin typeface="G마켓 산스 TTF Light" panose="02000000000000000000" pitchFamily="2" charset="-127"/>
+                <a:ea typeface="G마켓 산스 TTF Light" panose="02000000000000000000" pitchFamily="2" charset="-127"/>
+              </a:rPr>
+              <a:t>1</a:t>
+            </a:r>
+            <a:r>
+              <a:rPr lang="ko-KR" altLang="en-US" sz="2000" dirty="0">
+                <a:latin typeface="G마켓 산스 TTF Light" panose="02000000000000000000" pitchFamily="2" charset="-127"/>
+                <a:ea typeface="G마켓 산스 TTF Light" panose="02000000000000000000" pitchFamily="2" charset="-127"/>
+              </a:rPr>
+              <a:t>번 무기</a:t>
+            </a:r>
+            <a:r>
+              <a:rPr lang="en-US" altLang="ko-KR" sz="2000" dirty="0">
+                <a:latin typeface="G마켓 산스 TTF Light" panose="02000000000000000000" pitchFamily="2" charset="-127"/>
+                <a:ea typeface="G마켓 산스 TTF Light" panose="02000000000000000000" pitchFamily="2" charset="-127"/>
+              </a:rPr>
+              <a:t>, 2</a:t>
+            </a:r>
+            <a:r>
+              <a:rPr lang="ko-KR" altLang="en-US" sz="2000" dirty="0">
+                <a:latin typeface="G마켓 산스 TTF Light" panose="02000000000000000000" pitchFamily="2" charset="-127"/>
+                <a:ea typeface="G마켓 산스 TTF Light" panose="02000000000000000000" pitchFamily="2" charset="-127"/>
+              </a:rPr>
+              <a:t>를 누르면 </a:t>
+            </a:r>
+            <a:r>
+              <a:rPr lang="en-US" altLang="ko-KR" sz="2000" dirty="0">
+                <a:latin typeface="G마켓 산스 TTF Light" panose="02000000000000000000" pitchFamily="2" charset="-127"/>
+                <a:ea typeface="G마켓 산스 TTF Light" panose="02000000000000000000" pitchFamily="2" charset="-127"/>
+              </a:rPr>
+              <a:t>2</a:t>
+            </a:r>
+            <a:r>
+              <a:rPr lang="ko-KR" altLang="en-US" sz="2000" dirty="0">
+                <a:latin typeface="G마켓 산스 TTF Light" panose="02000000000000000000" pitchFamily="2" charset="-127"/>
+                <a:ea typeface="G마켓 산스 TTF Light" panose="02000000000000000000" pitchFamily="2" charset="-127"/>
+              </a:rPr>
+              <a:t>번 무기</a:t>
+            </a:r>
+            <a:r>
+              <a:rPr lang="en-US" altLang="ko-KR" sz="2000" dirty="0">
+                <a:latin typeface="G마켓 산스 TTF Light" panose="02000000000000000000" pitchFamily="2" charset="-127"/>
+                <a:ea typeface="G마켓 산스 TTF Light" panose="02000000000000000000" pitchFamily="2" charset="-127"/>
+              </a:rPr>
+              <a:t>)</a:t>
+            </a:r>
+          </a:p>
+          <a:p>
+            <a:pPr>
+              <a:lnSpc>
+                <a:spcPct val="150000"/>
+              </a:lnSpc>
+            </a:pPr>
+            <a:r>
+              <a:rPr lang="ko-KR" altLang="en-US" sz="2000" dirty="0">
+                <a:latin typeface="G마켓 산스 TTF Light" panose="02000000000000000000" pitchFamily="2" charset="-127"/>
+                <a:ea typeface="G마켓 산스 TTF Light" panose="02000000000000000000" pitchFamily="2" charset="-127"/>
+              </a:rPr>
+              <a:t>아이템 줍기</a:t>
+            </a:r>
+            <a:r>
+              <a:rPr lang="en-US" altLang="ko-KR" sz="2000" dirty="0">
+                <a:latin typeface="G마켓 산스 TTF Light" panose="02000000000000000000" pitchFamily="2" charset="-127"/>
+                <a:ea typeface="G마켓 산스 TTF Light" panose="02000000000000000000" pitchFamily="2" charset="-127"/>
+              </a:rPr>
+              <a:t>		| Q</a:t>
+            </a:r>
+            <a:endParaRPr lang="ko-KR" altLang="en-US" sz="2000" dirty="0">
+              <a:latin typeface="G마켓 산스 TTF Light" panose="02000000000000000000" pitchFamily="2" charset="-127"/>
+              <a:ea typeface="G마켓 산스 TTF Light" panose="02000000000000000000" pitchFamily="2" charset="-127"/>
+            </a:endParaRPr>
+          </a:p>
+        </p:txBody>
+      </p:sp>
+      <p:sp>
+        <p:nvSpPr>
+          <p:cNvPr id="11" name="사각형: 둥근 모서리 10">
+            <a:extLst>
+              <a:ext uri="{FF2B5EF4-FFF2-40B4-BE49-F238E27FC236}">
+                <a16:creationId xmlns:a16="http://schemas.microsoft.com/office/drawing/2014/main" id="{71CE780D-7A91-D6A2-DE6F-C04C79C6AEAA}"/>
+              </a:ext>
+            </a:extLst>
+          </p:cNvPr>
+          <p:cNvSpPr/>
+          <p:nvPr/>
+        </p:nvSpPr>
+        <p:spPr>
+          <a:xfrm>
+            <a:off x="3044920" y="2317816"/>
+            <a:ext cx="504000" cy="504000"/>
+          </a:xfrm>
+          <a:prstGeom prst="roundRect">
+            <a:avLst/>
+          </a:prstGeom>
+          <a:solidFill>
+            <a:srgbClr val="0070C0">
+              <a:alpha val="40000"/>
+            </a:srgbClr>
+          </a:solidFill>
+          <a:ln>
+            <a:noFill/>
+          </a:ln>
+        </p:spPr>
+        <p:style>
+          <a:lnRef idx="2">
+            <a:schemeClr val="accent1">
+              <a:shade val="50000"/>
+            </a:schemeClr>
+          </a:lnRef>
+          <a:fillRef idx="1">
+            <a:schemeClr val="accent1"/>
+          </a:fillRef>
+          <a:effectRef idx="0">
+            <a:schemeClr val="accent1"/>
+          </a:effectRef>
+          <a:fontRef idx="minor">
+            <a:schemeClr val="lt1"/>
+          </a:fontRef>
+        </p:style>
+        <p:txBody>
+          <a:bodyPr rtlCol="0" anchor="ctr"/>
+          <a:lstStyle/>
+          <a:p>
+            <a:pPr algn="ctr"/>
+            <a:endParaRPr lang="ko-KR" altLang="en-US"/>
+          </a:p>
+        </p:txBody>
+      </p:sp>
     </p:spTree>
     <p:extLst>
       <p:ext uri="{BB962C8B-B14F-4D97-AF65-F5344CB8AC3E}">
@@ -3758,9 +4452,7 @@
           <a:prstGeom prst="rect">
             <a:avLst/>
           </a:prstGeom>
-          <a:solidFill>
-            <a:schemeClr val="bg1"/>
-          </a:solidFill>
+          <a:noFill/>
           <a:ln w="28575">
             <a:solidFill>
               <a:srgbClr val="A3BCBD"/>
@@ -3843,6 +4535,431 @@
           </a:p>
         </p:txBody>
       </p:sp>
+      <p:sp>
+        <p:nvSpPr>
+          <p:cNvPr id="4" name="사각형: 둥근 모서리 3">
+            <a:extLst>
+              <a:ext uri="{FF2B5EF4-FFF2-40B4-BE49-F238E27FC236}">
+                <a16:creationId xmlns:a16="http://schemas.microsoft.com/office/drawing/2014/main" id="{85325A8B-CBDF-BB16-0A30-9A48FD39CB0E}"/>
+              </a:ext>
+            </a:extLst>
+          </p:cNvPr>
+          <p:cNvSpPr/>
+          <p:nvPr/>
+        </p:nvSpPr>
+        <p:spPr>
+          <a:xfrm>
+            <a:off x="1005601" y="2529000"/>
+            <a:ext cx="1800000" cy="1800000"/>
+          </a:xfrm>
+          <a:prstGeom prst="roundRect">
+            <a:avLst/>
+          </a:prstGeom>
+          <a:solidFill>
+            <a:srgbClr val="B1C6C7"/>
+          </a:solidFill>
+          <a:ln>
+            <a:noFill/>
+          </a:ln>
+        </p:spPr>
+        <p:style>
+          <a:lnRef idx="2">
+            <a:schemeClr val="accent1">
+              <a:shade val="50000"/>
+            </a:schemeClr>
+          </a:lnRef>
+          <a:fillRef idx="1">
+            <a:schemeClr val="accent1"/>
+          </a:fillRef>
+          <a:effectRef idx="0">
+            <a:schemeClr val="accent1"/>
+          </a:effectRef>
+          <a:fontRef idx="minor">
+            <a:schemeClr val="lt1"/>
+          </a:fontRef>
+        </p:style>
+        <p:txBody>
+          <a:bodyPr rtlCol="0" anchor="ctr"/>
+          <a:lstStyle/>
+          <a:p>
+            <a:pPr algn="ctr"/>
+            <a:endParaRPr lang="ko-KR" altLang="en-US"/>
+          </a:p>
+        </p:txBody>
+      </p:sp>
+      <p:pic>
+        <p:nvPicPr>
+          <p:cNvPr id="1030" name="Picture 6" descr="It’s finally here. Bicep is in Visual Studio!">
+            <a:extLst>
+              <a:ext uri="{FF2B5EF4-FFF2-40B4-BE49-F238E27FC236}">
+                <a16:creationId xmlns:a16="http://schemas.microsoft.com/office/drawing/2014/main" id="{459F292C-C88B-3A3E-68C1-8BF873151D30}"/>
+              </a:ext>
+            </a:extLst>
+          </p:cNvPr>
+          <p:cNvPicPr>
+            <a:picLocks noChangeAspect="1" noChangeArrowheads="1"/>
+          </p:cNvPicPr>
+          <p:nvPr/>
+        </p:nvPicPr>
+        <p:blipFill rotWithShape="1">
+          <a:blip r:embed="rId2">
+            <a:extLst>
+              <a:ext uri="{BEBA8EAE-BF5A-486C-A8C5-ECC9F3942E4B}">
+                <a14:imgProps xmlns:a14="http://schemas.microsoft.com/office/drawing/2010/main">
+                  <a14:imgLayer r:embed="rId3">
+                    <a14:imgEffect>
+                      <a14:backgroundRemoval t="17429" b="83714" l="27679" r="73750"/>
+                    </a14:imgEffect>
+                  </a14:imgLayer>
+                </a14:imgProps>
+              </a:ext>
+              <a:ext uri="{28A0092B-C50C-407E-A947-70E740481C1C}">
+                <a14:useLocalDpi xmlns:a14="http://schemas.microsoft.com/office/drawing/2010/main" val="0"/>
+              </a:ext>
+            </a:extLst>
+          </a:blip>
+          <a:srcRect l="27444" t="15955" r="24136" b="11864"/>
+          <a:stretch/>
+        </p:blipFill>
+        <p:spPr bwMode="auto">
+          <a:xfrm>
+            <a:off x="1253405" y="2780007"/>
+            <a:ext cx="1393172" cy="1297986"/>
+          </a:xfrm>
+          <a:prstGeom prst="rect">
+            <a:avLst/>
+          </a:prstGeom>
+          <a:noFill/>
+          <a:extLst>
+            <a:ext uri="{909E8E84-426E-40DD-AFC4-6F175D3DCCD1}">
+              <a14:hiddenFill xmlns:a14="http://schemas.microsoft.com/office/drawing/2010/main">
+                <a:solidFill>
+                  <a:srgbClr val="FFFFFF"/>
+                </a:solidFill>
+              </a14:hiddenFill>
+            </a:ext>
+          </a:extLst>
+        </p:spPr>
+      </p:pic>
+      <p:sp>
+        <p:nvSpPr>
+          <p:cNvPr id="6" name="사각형: 둥근 모서리 5">
+            <a:extLst>
+              <a:ext uri="{FF2B5EF4-FFF2-40B4-BE49-F238E27FC236}">
+                <a16:creationId xmlns:a16="http://schemas.microsoft.com/office/drawing/2014/main" id="{B146143F-70F2-311B-A313-41E70057244B}"/>
+              </a:ext>
+            </a:extLst>
+          </p:cNvPr>
+          <p:cNvSpPr/>
+          <p:nvPr/>
+        </p:nvSpPr>
+        <p:spPr>
+          <a:xfrm>
+            <a:off x="3768548" y="2529000"/>
+            <a:ext cx="1800000" cy="1800000"/>
+          </a:xfrm>
+          <a:prstGeom prst="roundRect">
+            <a:avLst/>
+          </a:prstGeom>
+          <a:solidFill>
+            <a:srgbClr val="B1C6C7"/>
+          </a:solidFill>
+          <a:ln>
+            <a:noFill/>
+          </a:ln>
+        </p:spPr>
+        <p:style>
+          <a:lnRef idx="2">
+            <a:schemeClr val="accent1">
+              <a:shade val="50000"/>
+            </a:schemeClr>
+          </a:lnRef>
+          <a:fillRef idx="1">
+            <a:schemeClr val="accent1"/>
+          </a:fillRef>
+          <a:effectRef idx="0">
+            <a:schemeClr val="accent1"/>
+          </a:effectRef>
+          <a:fontRef idx="minor">
+            <a:schemeClr val="lt1"/>
+          </a:fontRef>
+        </p:style>
+        <p:txBody>
+          <a:bodyPr rtlCol="0" anchor="ctr"/>
+          <a:lstStyle/>
+          <a:p>
+            <a:pPr algn="ctr"/>
+            <a:endParaRPr lang="ko-KR" altLang="en-US"/>
+          </a:p>
+        </p:txBody>
+      </p:sp>
+      <p:pic>
+        <p:nvPicPr>
+          <p:cNvPr id="1032" name="Picture 8">
+            <a:extLst>
+              <a:ext uri="{FF2B5EF4-FFF2-40B4-BE49-F238E27FC236}">
+                <a16:creationId xmlns:a16="http://schemas.microsoft.com/office/drawing/2014/main" id="{9FB82E99-BCF7-BE89-1587-3715BAE6D968}"/>
+              </a:ext>
+            </a:extLst>
+          </p:cNvPr>
+          <p:cNvPicPr>
+            <a:picLocks noChangeAspect="1" noChangeArrowheads="1"/>
+          </p:cNvPicPr>
+          <p:nvPr/>
+        </p:nvPicPr>
+        <p:blipFill>
+          <a:blip r:embed="rId4">
+            <a:extLst>
+              <a:ext uri="{BEBA8EAE-BF5A-486C-A8C5-ECC9F3942E4B}">
+                <a14:imgProps xmlns:a14="http://schemas.microsoft.com/office/drawing/2010/main">
+                  <a14:imgLayer r:embed="rId5">
+                    <a14:imgEffect>
+                      <a14:backgroundRemoval t="0" b="100000" l="0" r="100000">
+                        <a14:foregroundMark x1="49580" y1="47899" x2="49580" y2="47899"/>
+                        <a14:foregroundMark x1="37815" y1="97479" x2="40336" y2="87395"/>
+                        <a14:foregroundMark x1="40336" y1="87395" x2="40336" y2="87395"/>
+                        <a14:foregroundMark x1="39496" y1="87395" x2="19328" y2="78992"/>
+                        <a14:foregroundMark x1="19328" y1="78992" x2="19328" y2="78992"/>
+                        <a14:foregroundMark x1="39496" y1="89076" x2="45378" y2="97479"/>
+                        <a14:foregroundMark x1="43697" y1="97479" x2="61345" y2="97479"/>
+                        <a14:foregroundMark x1="61345" y1="97479" x2="59664" y2="76471"/>
+                        <a14:foregroundMark x1="58824" y1="72269" x2="78992" y2="63866"/>
+                        <a14:foregroundMark x1="78992" y1="63866" x2="80672" y2="42857"/>
+                        <a14:foregroundMark x1="80672" y1="42857" x2="77311" y2="23529"/>
+                        <a14:foregroundMark x1="76471" y1="23529" x2="62185" y2="28571"/>
+                        <a14:foregroundMark x1="61345" y1="28571" x2="55462" y2="25210"/>
+                        <a14:foregroundMark x1="55462" y1="25210" x2="37815" y2="28571"/>
+                        <a14:foregroundMark x1="37815" y1="28571" x2="26050" y2="22689"/>
+                        <a14:foregroundMark x1="26050" y1="22689" x2="26050" y2="22689"/>
+                      </a14:backgroundRemoval>
+                    </a14:imgEffect>
+                  </a14:imgLayer>
+                </a14:imgProps>
+              </a:ext>
+              <a:ext uri="{28A0092B-C50C-407E-A947-70E740481C1C}">
+                <a14:useLocalDpi xmlns:a14="http://schemas.microsoft.com/office/drawing/2010/main" val="0"/>
+              </a:ext>
+            </a:extLst>
+          </a:blip>
+          <a:srcRect/>
+          <a:stretch>
+            <a:fillRect/>
+          </a:stretch>
+        </p:blipFill>
+        <p:spPr bwMode="auto">
+          <a:xfrm>
+            <a:off x="4101810" y="2862262"/>
+            <a:ext cx="1133475" cy="1133475"/>
+          </a:xfrm>
+          <a:prstGeom prst="rect">
+            <a:avLst/>
+          </a:prstGeom>
+          <a:noFill/>
+          <a:extLst>
+            <a:ext uri="{909E8E84-426E-40DD-AFC4-6F175D3DCCD1}">
+              <a14:hiddenFill xmlns:a14="http://schemas.microsoft.com/office/drawing/2010/main">
+                <a:solidFill>
+                  <a:srgbClr val="FFFFFF"/>
+                </a:solidFill>
+              </a14:hiddenFill>
+            </a:ext>
+          </a:extLst>
+        </p:spPr>
+      </p:pic>
+      <p:sp>
+        <p:nvSpPr>
+          <p:cNvPr id="8" name="사각형: 둥근 모서리 7">
+            <a:extLst>
+              <a:ext uri="{FF2B5EF4-FFF2-40B4-BE49-F238E27FC236}">
+                <a16:creationId xmlns:a16="http://schemas.microsoft.com/office/drawing/2014/main" id="{068BD12D-5022-3E59-BEAB-5A0F1D92FDF0}"/>
+              </a:ext>
+            </a:extLst>
+          </p:cNvPr>
+          <p:cNvSpPr/>
+          <p:nvPr/>
+        </p:nvSpPr>
+        <p:spPr>
+          <a:xfrm>
+            <a:off x="6398922" y="2558526"/>
+            <a:ext cx="1800000" cy="1800000"/>
+          </a:xfrm>
+          <a:prstGeom prst="roundRect">
+            <a:avLst/>
+          </a:prstGeom>
+          <a:solidFill>
+            <a:srgbClr val="B1C6C7"/>
+          </a:solidFill>
+          <a:ln>
+            <a:noFill/>
+          </a:ln>
+        </p:spPr>
+        <p:style>
+          <a:lnRef idx="2">
+            <a:schemeClr val="accent1">
+              <a:shade val="50000"/>
+            </a:schemeClr>
+          </a:lnRef>
+          <a:fillRef idx="1">
+            <a:schemeClr val="accent1"/>
+          </a:fillRef>
+          <a:effectRef idx="0">
+            <a:schemeClr val="accent1"/>
+          </a:effectRef>
+          <a:fontRef idx="minor">
+            <a:schemeClr val="lt1"/>
+          </a:fontRef>
+        </p:style>
+        <p:txBody>
+          <a:bodyPr rtlCol="0" anchor="ctr"/>
+          <a:lstStyle/>
+          <a:p>
+            <a:pPr algn="ctr"/>
+            <a:endParaRPr lang="ko-KR" altLang="en-US"/>
+          </a:p>
+        </p:txBody>
+      </p:sp>
+      <p:pic>
+        <p:nvPicPr>
+          <p:cNvPr id="7" name="Google Shape;179;p23">
+            <a:extLst>
+              <a:ext uri="{FF2B5EF4-FFF2-40B4-BE49-F238E27FC236}">
+                <a16:creationId xmlns:a16="http://schemas.microsoft.com/office/drawing/2014/main" id="{B3B70556-3D22-EAB9-6F1E-6445BB8DA7DE}"/>
+              </a:ext>
+            </a:extLst>
+          </p:cNvPr>
+          <p:cNvPicPr preferRelativeResize="0"/>
+          <p:nvPr/>
+        </p:nvPicPr>
+        <p:blipFill>
+          <a:blip r:embed="rId6">
+            <a:alphaModFix/>
+            <a:extLst>
+              <a:ext uri="{BEBA8EAE-BF5A-486C-A8C5-ECC9F3942E4B}">
+                <a14:imgProps xmlns:a14="http://schemas.microsoft.com/office/drawing/2010/main">
+                  <a14:imgLayer r:embed="rId7">
+                    <a14:imgEffect>
+                      <a14:backgroundRemoval t="10000" b="90000" l="10000" r="90000"/>
+                    </a14:imgEffect>
+                  </a14:imgLayer>
+                </a14:imgProps>
+              </a:ext>
+            </a:extLst>
+          </a:blip>
+          <a:stretch>
+            <a:fillRect/>
+          </a:stretch>
+        </p:blipFill>
+        <p:spPr>
+          <a:xfrm>
+            <a:off x="6526743" y="2857092"/>
+            <a:ext cx="1684789" cy="1202868"/>
+          </a:xfrm>
+          <a:prstGeom prst="rect">
+            <a:avLst/>
+          </a:prstGeom>
+          <a:noFill/>
+          <a:ln>
+            <a:noFill/>
+          </a:ln>
+        </p:spPr>
+      </p:pic>
+      <p:sp>
+        <p:nvSpPr>
+          <p:cNvPr id="14" name="사각형: 둥근 모서리 13">
+            <a:extLst>
+              <a:ext uri="{FF2B5EF4-FFF2-40B4-BE49-F238E27FC236}">
+                <a16:creationId xmlns:a16="http://schemas.microsoft.com/office/drawing/2014/main" id="{A4AB25C1-A64C-A547-D971-997119092A07}"/>
+              </a:ext>
+            </a:extLst>
+          </p:cNvPr>
+          <p:cNvSpPr/>
+          <p:nvPr/>
+        </p:nvSpPr>
+        <p:spPr>
+          <a:xfrm>
+            <a:off x="9178168" y="2558526"/>
+            <a:ext cx="1800000" cy="1800000"/>
+          </a:xfrm>
+          <a:prstGeom prst="roundRect">
+            <a:avLst/>
+          </a:prstGeom>
+          <a:solidFill>
+            <a:srgbClr val="B1C6C7"/>
+          </a:solidFill>
+          <a:ln>
+            <a:noFill/>
+          </a:ln>
+        </p:spPr>
+        <p:style>
+          <a:lnRef idx="2">
+            <a:schemeClr val="accent1">
+              <a:shade val="50000"/>
+            </a:schemeClr>
+          </a:lnRef>
+          <a:fillRef idx="1">
+            <a:schemeClr val="accent1"/>
+          </a:fillRef>
+          <a:effectRef idx="0">
+            <a:schemeClr val="accent1"/>
+          </a:effectRef>
+          <a:fontRef idx="minor">
+            <a:schemeClr val="lt1"/>
+          </a:fontRef>
+        </p:style>
+        <p:txBody>
+          <a:bodyPr rtlCol="0" anchor="ctr"/>
+          <a:lstStyle/>
+          <a:p>
+            <a:pPr algn="ctr"/>
+            <a:endParaRPr lang="ko-KR" altLang="en-US"/>
+          </a:p>
+        </p:txBody>
+      </p:sp>
+      <p:pic>
+        <p:nvPicPr>
+          <p:cNvPr id="1034" name="Picture 10">
+            <a:extLst>
+              <a:ext uri="{FF2B5EF4-FFF2-40B4-BE49-F238E27FC236}">
+                <a16:creationId xmlns:a16="http://schemas.microsoft.com/office/drawing/2014/main" id="{D707EB6E-6821-FE36-631C-06876683DBCF}"/>
+              </a:ext>
+            </a:extLst>
+          </p:cNvPr>
+          <p:cNvPicPr>
+            <a:picLocks noChangeAspect="1" noChangeArrowheads="1"/>
+          </p:cNvPicPr>
+          <p:nvPr/>
+        </p:nvPicPr>
+        <p:blipFill rotWithShape="1">
+          <a:blip r:embed="rId8">
+            <a:extLst>
+              <a:ext uri="{28A0092B-C50C-407E-A947-70E740481C1C}">
+                <a14:useLocalDpi xmlns:a14="http://schemas.microsoft.com/office/drawing/2010/main" val="0"/>
+              </a:ext>
+            </a:extLst>
+          </a:blip>
+          <a:srcRect r="86176" b="-8378"/>
+          <a:stretch/>
+        </p:blipFill>
+        <p:spPr bwMode="auto">
+          <a:xfrm>
+            <a:off x="9626165" y="3076334"/>
+            <a:ext cx="1066565" cy="919403"/>
+          </a:xfrm>
+          <a:prstGeom prst="rect">
+            <a:avLst/>
+          </a:prstGeom>
+          <a:noFill/>
+          <a:extLst>
+            <a:ext uri="{909E8E84-426E-40DD-AFC4-6F175D3DCCD1}">
+              <a14:hiddenFill xmlns:a14="http://schemas.microsoft.com/office/drawing/2010/main">
+                <a:solidFill>
+                  <a:srgbClr val="FFFFFF"/>
+                </a:solidFill>
+              </a14:hiddenFill>
+            </a:ext>
+          </a:extLst>
+        </p:spPr>
+      </p:pic>
     </p:spTree>
     <p:extLst>
       <p:ext uri="{BB962C8B-B14F-4D97-AF65-F5344CB8AC3E}">

</xml_diff>

<commit_message>
Update Game Design Proposal
Update Game Design Proposal at 01:57 A.M.
</commit_message>
<xml_diff>
--- a/Game_Design/2019184003 김 선아 장르 제안서.pptx
+++ b/Game_Design/2019184003 김 선아 장르 제안서.pptx
@@ -13,20 +13,21 @@
     <p:sldId id="268" r:id="rId7"/>
     <p:sldId id="274" r:id="rId8"/>
     <p:sldId id="269" r:id="rId9"/>
-    <p:sldId id="291" r:id="rId10"/>
-    <p:sldId id="276" r:id="rId11"/>
-    <p:sldId id="290" r:id="rId12"/>
-    <p:sldId id="289" r:id="rId13"/>
-    <p:sldId id="277" r:id="rId14"/>
-    <p:sldId id="272" r:id="rId15"/>
-    <p:sldId id="273" r:id="rId16"/>
-    <p:sldId id="271" r:id="rId17"/>
-    <p:sldId id="279" r:id="rId18"/>
-    <p:sldId id="278" r:id="rId19"/>
-    <p:sldId id="264" r:id="rId20"/>
-    <p:sldId id="280" r:id="rId21"/>
-    <p:sldId id="281" r:id="rId22"/>
-    <p:sldId id="262" r:id="rId23"/>
+    <p:sldId id="292" r:id="rId10"/>
+    <p:sldId id="291" r:id="rId11"/>
+    <p:sldId id="276" r:id="rId12"/>
+    <p:sldId id="290" r:id="rId13"/>
+    <p:sldId id="289" r:id="rId14"/>
+    <p:sldId id="277" r:id="rId15"/>
+    <p:sldId id="272" r:id="rId16"/>
+    <p:sldId id="273" r:id="rId17"/>
+    <p:sldId id="271" r:id="rId18"/>
+    <p:sldId id="279" r:id="rId19"/>
+    <p:sldId id="278" r:id="rId20"/>
+    <p:sldId id="293" r:id="rId21"/>
+    <p:sldId id="280" r:id="rId22"/>
+    <p:sldId id="281" r:id="rId23"/>
+    <p:sldId id="262" r:id="rId24"/>
   </p:sldIdLst>
   <p:sldSz cx="12192000" cy="6858000"/>
   <p:notesSz cx="6858000" cy="9144000"/>
@@ -3150,14 +3151,6 @@
 <file path=ppt/slides/slide10.xml><?xml version="1.0" encoding="utf-8"?>
 <p:sld xmlns:a="http://schemas.openxmlformats.org/drawingml/2006/main" xmlns:r="http://schemas.openxmlformats.org/officeDocument/2006/relationships" xmlns:p="http://schemas.openxmlformats.org/presentationml/2006/main">
   <p:cSld>
-    <p:bg>
-      <p:bgPr>
-        <a:solidFill>
-          <a:srgbClr val="8BA9AB"/>
-        </a:solidFill>
-        <a:effectLst/>
-      </p:bgPr>
-    </p:bg>
     <p:spTree>
       <p:nvGrpSpPr>
         <p:cNvPr id="1" name=""/>
@@ -3216,6 +3209,10 @@
           <a:lstStyle/>
           <a:p>
             <a:pPr algn="ctr"/>
+            <a:r>
+              <a:rPr lang="en-US" altLang="ko-KR"/>
+              <a:t>s</a:t>
+            </a:r>
             <a:endParaRPr lang="ko-KR" altLang="en-US"/>
           </a:p>
         </p:txBody>
@@ -3229,7 +3226,7 @@
         <p:spPr>
           <a:xfrm>
             <a:off x="469900" y="260991"/>
-            <a:ext cx="6692900" cy="584775"/>
+            <a:ext cx="5412740" cy="1077218"/>
           </a:xfrm>
           <a:prstGeom prst="rect">
             <a:avLst/>
@@ -3244,13 +3241,45 @@
           <a:p>
             <a:r>
               <a:rPr lang="en-US" altLang="ko-KR" sz="3200" dirty="0">
-                <a:solidFill>
-                  <a:schemeClr val="bg1"/>
-                </a:solidFill>
                 <a:latin typeface="여기어때 잘난체" panose="020B0600000101010101" pitchFamily="50" charset="-127"/>
                 <a:ea typeface="여기어때 잘난체" panose="020B0600000101010101" pitchFamily="50" charset="-127"/>
               </a:rPr>
               <a:t>02. </a:t>
+            </a:r>
+            <a:r>
+              <a:rPr lang="ko-KR" altLang="en-US" sz="3200" dirty="0">
+                <a:latin typeface="여기어때 잘난체" panose="020B0600000101010101" pitchFamily="50" charset="-127"/>
+                <a:ea typeface="여기어때 잘난체" panose="020B0600000101010101" pitchFamily="50" charset="-127"/>
+              </a:rPr>
+              <a:t>게임소개 </a:t>
+            </a:r>
+            <a:r>
+              <a:rPr lang="en-US" altLang="ko-KR" sz="3200" dirty="0">
+                <a:latin typeface="여기어때 잘난체" panose="020B0600000101010101" pitchFamily="50" charset="-127"/>
+                <a:ea typeface="여기어때 잘난체" panose="020B0600000101010101" pitchFamily="50" charset="-127"/>
+              </a:rPr>
+              <a:t>– </a:t>
+            </a:r>
+            <a:r>
+              <a:rPr lang="ko-KR" altLang="en-US" sz="3200" dirty="0">
+                <a:latin typeface="여기어때 잘난체" panose="020B0600000101010101" pitchFamily="50" charset="-127"/>
+                <a:ea typeface="여기어때 잘난체" panose="020B0600000101010101" pitchFamily="50" charset="-127"/>
+              </a:rPr>
+              <a:t>게임 월드 </a:t>
+            </a:r>
+            <a:r>
+              <a:rPr lang="ko-KR" altLang="en-US" sz="1200" dirty="0" err="1">
+                <a:latin typeface="여기어때 잘난체" panose="020B0600000101010101" pitchFamily="50" charset="-127"/>
+                <a:ea typeface="여기어때 잘난체" panose="020B0600000101010101" pitchFamily="50" charset="-127"/>
+              </a:rPr>
+              <a:t>잡몹전</a:t>
+            </a:r>
+            <a:r>
+              <a:rPr lang="en-US" altLang="ko-KR" sz="1200" dirty="0">
+                <a:latin typeface="여기어때 잘난체" panose="020B0600000101010101" pitchFamily="50" charset="-127"/>
+                <a:ea typeface="여기어때 잘난체" panose="020B0600000101010101" pitchFamily="50" charset="-127"/>
+              </a:rPr>
+              <a:t> </a:t>
             </a:r>
             <a:r>
               <a:rPr lang="ko-KR" altLang="en-US" sz="3200" dirty="0">
@@ -3260,32 +3289,53 @@
                 <a:latin typeface="여기어때 잘난체" panose="020B0600000101010101" pitchFamily="50" charset="-127"/>
                 <a:ea typeface="여기어때 잘난체" panose="020B0600000101010101" pitchFamily="50" charset="-127"/>
               </a:rPr>
-              <a:t>게임 소개 </a:t>
-            </a:r>
-            <a:r>
-              <a:rPr lang="en-US" altLang="ko-KR" sz="3200" dirty="0">
-                <a:solidFill>
-                  <a:schemeClr val="bg1"/>
-                </a:solidFill>
-                <a:latin typeface="여기어때 잘난체" panose="020B0600000101010101" pitchFamily="50" charset="-127"/>
-                <a:ea typeface="여기어때 잘난체" panose="020B0600000101010101" pitchFamily="50" charset="-127"/>
-              </a:rPr>
-              <a:t>– </a:t>
-            </a:r>
-            <a:r>
-              <a:rPr lang="ko-KR" altLang="en-US" sz="3200" dirty="0">
-                <a:solidFill>
-                  <a:schemeClr val="bg1"/>
-                </a:solidFill>
-                <a:latin typeface="여기어때 잘난체" panose="020B0600000101010101" pitchFamily="50" charset="-127"/>
-                <a:ea typeface="여기어때 잘난체" panose="020B0600000101010101" pitchFamily="50" charset="-127"/>
-              </a:rPr>
-              <a:t>게임 플레이어 </a:t>
-            </a:r>
-          </a:p>
-        </p:txBody>
-      </p:sp>
+              <a:t>게임 월드 </a:t>
+            </a:r>
+          </a:p>
+        </p:txBody>
+      </p:sp>
+      <p:pic>
+        <p:nvPicPr>
+          <p:cNvPr id="4" name="그림 3">
+            <a:extLst>
+              <a:ext uri="{FF2B5EF4-FFF2-40B4-BE49-F238E27FC236}">
+                <a16:creationId xmlns:a16="http://schemas.microsoft.com/office/drawing/2014/main" id="{CF767FF6-64A5-554C-F5B7-2DBE0680C07F}"/>
+              </a:ext>
+            </a:extLst>
+          </p:cNvPr>
+          <p:cNvPicPr>
+            <a:picLocks noChangeAspect="1"/>
+          </p:cNvPicPr>
+          <p:nvPr/>
+        </p:nvPicPr>
+        <p:blipFill>
+          <a:blip r:embed="rId2">
+            <a:extLst>
+              <a:ext uri="{28A0092B-C50C-407E-A947-70E740481C1C}">
+                <a14:useLocalDpi xmlns:a14="http://schemas.microsoft.com/office/drawing/2010/main" val="0"/>
+              </a:ext>
+            </a:extLst>
+          </a:blip>
+          <a:stretch>
+            <a:fillRect/>
+          </a:stretch>
+        </p:blipFill>
+        <p:spPr>
+          <a:xfrm>
+            <a:off x="990600" y="1201270"/>
+            <a:ext cx="5173532" cy="5173532"/>
+          </a:xfrm>
+          <a:prstGeom prst="rect">
+            <a:avLst/>
+          </a:prstGeom>
+        </p:spPr>
+      </p:pic>
     </p:spTree>
+    <p:extLst>
+      <p:ext uri="{BB962C8B-B14F-4D97-AF65-F5344CB8AC3E}">
+        <p14:creationId xmlns:p14="http://schemas.microsoft.com/office/powerpoint/2010/main" val="3338335739"/>
+      </p:ext>
+    </p:extLst>
   </p:cSld>
   <p:clrMapOvr>
     <a:masterClrMapping/>
@@ -3375,6 +3425,152 @@
         <p:spPr>
           <a:xfrm>
             <a:off x="469900" y="260991"/>
+            <a:ext cx="6692900" cy="584775"/>
+          </a:xfrm>
+          <a:prstGeom prst="rect">
+            <a:avLst/>
+          </a:prstGeom>
+          <a:noFill/>
+        </p:spPr>
+        <p:txBody>
+          <a:bodyPr wrap="square" rtlCol="0">
+            <a:spAutoFit/>
+          </a:bodyPr>
+          <a:lstStyle/>
+          <a:p>
+            <a:r>
+              <a:rPr lang="en-US" altLang="ko-KR" sz="3200" dirty="0">
+                <a:solidFill>
+                  <a:schemeClr val="bg1"/>
+                </a:solidFill>
+                <a:latin typeface="여기어때 잘난체" panose="020B0600000101010101" pitchFamily="50" charset="-127"/>
+                <a:ea typeface="여기어때 잘난체" panose="020B0600000101010101" pitchFamily="50" charset="-127"/>
+              </a:rPr>
+              <a:t>02. </a:t>
+            </a:r>
+            <a:r>
+              <a:rPr lang="ko-KR" altLang="en-US" sz="3200" dirty="0">
+                <a:solidFill>
+                  <a:schemeClr val="bg1"/>
+                </a:solidFill>
+                <a:latin typeface="여기어때 잘난체" panose="020B0600000101010101" pitchFamily="50" charset="-127"/>
+                <a:ea typeface="여기어때 잘난체" panose="020B0600000101010101" pitchFamily="50" charset="-127"/>
+              </a:rPr>
+              <a:t>게임 소개 </a:t>
+            </a:r>
+            <a:r>
+              <a:rPr lang="en-US" altLang="ko-KR" sz="3200" dirty="0">
+                <a:solidFill>
+                  <a:schemeClr val="bg1"/>
+                </a:solidFill>
+                <a:latin typeface="여기어때 잘난체" panose="020B0600000101010101" pitchFamily="50" charset="-127"/>
+                <a:ea typeface="여기어때 잘난체" panose="020B0600000101010101" pitchFamily="50" charset="-127"/>
+              </a:rPr>
+              <a:t>– </a:t>
+            </a:r>
+            <a:r>
+              <a:rPr lang="ko-KR" altLang="en-US" sz="3200" dirty="0">
+                <a:solidFill>
+                  <a:schemeClr val="bg1"/>
+                </a:solidFill>
+                <a:latin typeface="여기어때 잘난체" panose="020B0600000101010101" pitchFamily="50" charset="-127"/>
+                <a:ea typeface="여기어때 잘난체" panose="020B0600000101010101" pitchFamily="50" charset="-127"/>
+              </a:rPr>
+              <a:t>게임 플레이어 </a:t>
+            </a:r>
+          </a:p>
+        </p:txBody>
+      </p:sp>
+    </p:spTree>
+  </p:cSld>
+  <p:clrMapOvr>
+    <a:masterClrMapping/>
+  </p:clrMapOvr>
+</p:sld>
+</file>
+
+<file path=ppt/slides/slide12.xml><?xml version="1.0" encoding="utf-8"?>
+<p:sld xmlns:a="http://schemas.openxmlformats.org/drawingml/2006/main" xmlns:r="http://schemas.openxmlformats.org/officeDocument/2006/relationships" xmlns:p="http://schemas.openxmlformats.org/presentationml/2006/main">
+  <p:cSld>
+    <p:bg>
+      <p:bgPr>
+        <a:solidFill>
+          <a:srgbClr val="8BA9AB"/>
+        </a:solidFill>
+        <a:effectLst/>
+      </p:bgPr>
+    </p:bg>
+    <p:spTree>
+      <p:nvGrpSpPr>
+        <p:cNvPr id="1" name=""/>
+        <p:cNvGrpSpPr/>
+        <p:nvPr/>
+      </p:nvGrpSpPr>
+      <p:grpSpPr>
+        <a:xfrm>
+          <a:off x="0" y="0"/>
+          <a:ext cx="0" cy="0"/>
+          <a:chOff x="0" y="0"/>
+          <a:chExt cx="0" cy="0"/>
+        </a:xfrm>
+      </p:grpSpPr>
+      <p:sp>
+        <p:nvSpPr>
+          <p:cNvPr id="15" name="직사각형 14"/>
+          <p:cNvSpPr/>
+          <p:nvPr/>
+        </p:nvSpPr>
+        <p:spPr>
+          <a:xfrm>
+            <a:off x="469900" y="925976"/>
+            <a:ext cx="11226800" cy="5617119"/>
+          </a:xfrm>
+          <a:prstGeom prst="rect">
+            <a:avLst/>
+          </a:prstGeom>
+          <a:solidFill>
+            <a:schemeClr val="bg1"/>
+          </a:solidFill>
+          <a:ln w="28575">
+            <a:solidFill>
+              <a:srgbClr val="A3BCBD"/>
+            </a:solidFill>
+          </a:ln>
+        </p:spPr>
+        <p:style>
+          <a:lnRef idx="2">
+            <a:schemeClr val="accent1">
+              <a:shade val="50000"/>
+            </a:schemeClr>
+          </a:lnRef>
+          <a:fillRef idx="1">
+            <a:schemeClr val="accent1"/>
+          </a:fillRef>
+          <a:effectRef idx="0">
+            <a:schemeClr val="accent1"/>
+          </a:effectRef>
+          <a:fontRef idx="minor">
+            <a:schemeClr val="lt1"/>
+          </a:fontRef>
+        </p:style>
+        <p:txBody>
+          <a:bodyPr rtlCol="0" anchor="ctr"/>
+          <a:lstStyle/>
+          <a:p>
+            <a:pPr algn="ctr"/>
+            <a:endParaRPr lang="ko-KR" altLang="en-US"/>
+          </a:p>
+        </p:txBody>
+      </p:sp>
+      <p:sp>
+        <p:nvSpPr>
+          <p:cNvPr id="18" name="TextBox 17"/>
+          <p:cNvSpPr txBox="1"/>
+          <p:nvPr/>
+        </p:nvSpPr>
+        <p:spPr>
+          <a:xfrm>
+            <a:off x="469900" y="260991"/>
             <a:ext cx="6692900" cy="583565"/>
           </a:xfrm>
           <a:prstGeom prst="rect">
@@ -3465,7 +3661,7 @@
         </p:nvSpPr>
         <p:spPr>
           <a:xfrm>
-            <a:off x="2522855" y="1209040"/>
+            <a:off x="2522855" y="1096746"/>
             <a:ext cx="3111500" cy="2001520"/>
           </a:xfrm>
           <a:prstGeom prst="rect">
@@ -3483,6 +3679,9 @@
           <a:lstStyle/>
           <a:p>
             <a:pPr indent="0">
+              <a:lnSpc>
+                <a:spcPct val="150000"/>
+              </a:lnSpc>
               <a:spcBef>
                 <a:spcPts val="0"/>
               </a:spcBef>
@@ -3492,32 +3691,35 @@
               <a:buNone/>
             </a:pPr>
             <a:r>
-              <a:rPr lang="en-US" sz="1200">
-                <a:latin typeface="맑은 고딕" panose="020B0503020000020004" charset="-127"/>
-                <a:ea typeface="맑은 고딕" panose="020B0503020000020004" charset="-127"/>
+              <a:rPr lang="en-US" sz="1200" dirty="0">
+                <a:latin typeface="G마켓 산스 TTF Medium" panose="02000000000000000000" pitchFamily="2" charset="-127"/>
+                <a:ea typeface="G마켓 산스 TTF Medium" panose="02000000000000000000" pitchFamily="2" charset="-127"/>
                 <a:cs typeface="맑은 고딕" panose="020B0503020000020004" charset="-127"/>
                 <a:sym typeface="맑은 고딕" panose="020B0503020000020004" charset="-127"/>
               </a:rPr>
               <a:t>        </a:t>
             </a:r>
             <a:r>
-              <a:rPr lang="ko-KR" altLang="en-US" sz="1600" b="1">
-                <a:latin typeface="맑은 고딕" panose="020B0503020000020004" charset="-127"/>
-                <a:ea typeface="맑은 고딕" panose="020B0503020000020004" charset="-127"/>
+              <a:rPr lang="ko-KR" altLang="en-US" sz="1600" b="1" dirty="0" err="1">
+                <a:latin typeface="G마켓 산스 TTF Medium" panose="02000000000000000000" pitchFamily="2" charset="-127"/>
+                <a:ea typeface="G마켓 산스 TTF Medium" panose="02000000000000000000" pitchFamily="2" charset="-127"/>
                 <a:cs typeface="맑은 고딕" panose="020B0503020000020004" charset="-127"/>
                 <a:sym typeface="맑은 고딕" panose="020B0503020000020004" charset="-127"/>
               </a:rPr>
               <a:t>고블린</a:t>
             </a:r>
-            <a:endParaRPr sz="1600" b="1">
-              <a:latin typeface="맑은 고딕" panose="020B0503020000020004" charset="-127"/>
-              <a:ea typeface="맑은 고딕" panose="020B0503020000020004" charset="-127"/>
+            <a:endParaRPr sz="1600" b="1" dirty="0">
+              <a:latin typeface="G마켓 산스 TTF Medium" panose="02000000000000000000" pitchFamily="2" charset="-127"/>
+              <a:ea typeface="G마켓 산스 TTF Medium" panose="02000000000000000000" pitchFamily="2" charset="-127"/>
               <a:cs typeface="맑은 고딕" panose="020B0503020000020004" charset="-127"/>
               <a:sym typeface="맑은 고딕" panose="020B0503020000020004" charset="-127"/>
             </a:endParaRPr>
           </a:p>
           <a:p>
             <a:pPr indent="0">
+              <a:lnSpc>
+                <a:spcPct val="150000"/>
+              </a:lnSpc>
               <a:spcBef>
                 <a:spcPts val="0"/>
               </a:spcBef>
@@ -3526,15 +3728,18 @@
               </a:spcAft>
               <a:buNone/>
             </a:pPr>
-            <a:endParaRPr sz="1200">
-              <a:latin typeface="맑은 고딕" panose="020B0503020000020004" charset="-127"/>
-              <a:ea typeface="맑은 고딕" panose="020B0503020000020004" charset="-127"/>
+            <a:endParaRPr sz="1200" dirty="0">
+              <a:latin typeface="G마켓 산스 TTF Medium" panose="02000000000000000000" pitchFamily="2" charset="-127"/>
+              <a:ea typeface="G마켓 산스 TTF Medium" panose="02000000000000000000" pitchFamily="2" charset="-127"/>
               <a:cs typeface="맑은 고딕" panose="020B0503020000020004" charset="-127"/>
               <a:sym typeface="맑은 고딕" panose="020B0503020000020004" charset="-127"/>
             </a:endParaRPr>
           </a:p>
           <a:p>
             <a:pPr indent="0">
+              <a:lnSpc>
+                <a:spcPct val="150000"/>
+              </a:lnSpc>
               <a:spcBef>
                 <a:spcPts val="0"/>
               </a:spcBef>
@@ -3544,23 +3749,26 @@
               <a:buNone/>
             </a:pPr>
             <a:r>
-              <a:rPr lang="en-US" sz="1300">
-                <a:latin typeface="맑은 고딕" panose="020B0503020000020004" charset="-127"/>
-                <a:ea typeface="맑은 고딕" panose="020B0503020000020004" charset="-127"/>
+              <a:rPr lang="en-US" sz="1300" dirty="0">
+                <a:latin typeface="G마켓 산스 TTF Medium" panose="02000000000000000000" pitchFamily="2" charset="-127"/>
+                <a:ea typeface="G마켓 산스 TTF Medium" panose="02000000000000000000" pitchFamily="2" charset="-127"/>
                 <a:cs typeface="맑은 고딕" panose="020B0503020000020004" charset="-127"/>
                 <a:sym typeface="맑은 고딕" panose="020B0503020000020004" charset="-127"/>
               </a:rPr>
               <a:t>- 키 : 100cm</a:t>
             </a:r>
-            <a:endParaRPr sz="1300">
-              <a:latin typeface="맑은 고딕" panose="020B0503020000020004" charset="-127"/>
-              <a:ea typeface="맑은 고딕" panose="020B0503020000020004" charset="-127"/>
+            <a:endParaRPr sz="1300" dirty="0">
+              <a:latin typeface="G마켓 산스 TTF Medium" panose="02000000000000000000" pitchFamily="2" charset="-127"/>
+              <a:ea typeface="G마켓 산스 TTF Medium" panose="02000000000000000000" pitchFamily="2" charset="-127"/>
               <a:cs typeface="맑은 고딕" panose="020B0503020000020004" charset="-127"/>
               <a:sym typeface="맑은 고딕" panose="020B0503020000020004" charset="-127"/>
             </a:endParaRPr>
           </a:p>
           <a:p>
             <a:pPr indent="0">
+              <a:lnSpc>
+                <a:spcPct val="150000"/>
+              </a:lnSpc>
               <a:spcBef>
                 <a:spcPts val="0"/>
               </a:spcBef>
@@ -3570,23 +3778,44 @@
               <a:buNone/>
             </a:pPr>
             <a:r>
-              <a:rPr lang="en-US" sz="1300">
-                <a:latin typeface="맑은 고딕" panose="020B0503020000020004" charset="-127"/>
-                <a:ea typeface="맑은 고딕" panose="020B0503020000020004" charset="-127"/>
-                <a:cs typeface="맑은 고딕" panose="020B0503020000020004" charset="-127"/>
-                <a:sym typeface="맑은 고딕" panose="020B0503020000020004" charset="-127"/>
-              </a:rPr>
-              <a:t>- 이동속도 : 1km/h</a:t>
-            </a:r>
-            <a:endParaRPr sz="1300">
-              <a:latin typeface="맑은 고딕" panose="020B0503020000020004" charset="-127"/>
-              <a:ea typeface="맑은 고딕" panose="020B0503020000020004" charset="-127"/>
+              <a:rPr lang="en-US" sz="1300" dirty="0">
+                <a:latin typeface="G마켓 산스 TTF Medium" panose="02000000000000000000" pitchFamily="2" charset="-127"/>
+                <a:ea typeface="G마켓 산스 TTF Medium" panose="02000000000000000000" pitchFamily="2" charset="-127"/>
+                <a:cs typeface="맑은 고딕" panose="020B0503020000020004" charset="-127"/>
+                <a:sym typeface="맑은 고딕" panose="020B0503020000020004" charset="-127"/>
+              </a:rPr>
+              <a:t>- </a:t>
+            </a:r>
+            <a:r>
+              <a:rPr lang="en-US" sz="1300" dirty="0" err="1">
+                <a:latin typeface="G마켓 산스 TTF Medium" panose="02000000000000000000" pitchFamily="2" charset="-127"/>
+                <a:ea typeface="G마켓 산스 TTF Medium" panose="02000000000000000000" pitchFamily="2" charset="-127"/>
+                <a:cs typeface="맑은 고딕" panose="020B0503020000020004" charset="-127"/>
+                <a:sym typeface="맑은 고딕" panose="020B0503020000020004" charset="-127"/>
+              </a:rPr>
+              <a:t>이동속도</a:t>
+            </a:r>
+            <a:r>
+              <a:rPr lang="en-US" sz="1300" dirty="0">
+                <a:latin typeface="G마켓 산스 TTF Medium" panose="02000000000000000000" pitchFamily="2" charset="-127"/>
+                <a:ea typeface="G마켓 산스 TTF Medium" panose="02000000000000000000" pitchFamily="2" charset="-127"/>
+                <a:cs typeface="맑은 고딕" panose="020B0503020000020004" charset="-127"/>
+                <a:sym typeface="맑은 고딕" panose="020B0503020000020004" charset="-127"/>
+              </a:rPr>
+              <a:t> : 1km/h</a:t>
+            </a:r>
+            <a:endParaRPr sz="1300" dirty="0">
+              <a:latin typeface="G마켓 산스 TTF Medium" panose="02000000000000000000" pitchFamily="2" charset="-127"/>
+              <a:ea typeface="G마켓 산스 TTF Medium" panose="02000000000000000000" pitchFamily="2" charset="-127"/>
               <a:cs typeface="맑은 고딕" panose="020B0503020000020004" charset="-127"/>
               <a:sym typeface="맑은 고딕" panose="020B0503020000020004" charset="-127"/>
             </a:endParaRPr>
           </a:p>
           <a:p>
             <a:pPr indent="0">
+              <a:lnSpc>
+                <a:spcPct val="150000"/>
+              </a:lnSpc>
               <a:spcBef>
                 <a:spcPts val="0"/>
               </a:spcBef>
@@ -3596,17 +3825,38 @@
               <a:buNone/>
             </a:pPr>
             <a:r>
-              <a:rPr lang="en-US" sz="1300">
-                <a:latin typeface="맑은 고딕" panose="020B0503020000020004" charset="-127"/>
-                <a:ea typeface="맑은 고딕" panose="020B0503020000020004" charset="-127"/>
-                <a:cs typeface="맑은 고딕" panose="020B0503020000020004" charset="-127"/>
-                <a:sym typeface="맑은 고딕" panose="020B0503020000020004" charset="-127"/>
-              </a:rPr>
-              <a:t>- 체력 : 100</a:t>
+              <a:rPr lang="en-US" sz="1300" dirty="0">
+                <a:latin typeface="G마켓 산스 TTF Medium" panose="02000000000000000000" pitchFamily="2" charset="-127"/>
+                <a:ea typeface="G마켓 산스 TTF Medium" panose="02000000000000000000" pitchFamily="2" charset="-127"/>
+                <a:cs typeface="맑은 고딕" panose="020B0503020000020004" charset="-127"/>
+                <a:sym typeface="맑은 고딕" panose="020B0503020000020004" charset="-127"/>
+              </a:rPr>
+              <a:t>- </a:t>
+            </a:r>
+            <a:r>
+              <a:rPr lang="en-US" sz="1300" dirty="0" err="1">
+                <a:latin typeface="G마켓 산스 TTF Medium" panose="02000000000000000000" pitchFamily="2" charset="-127"/>
+                <a:ea typeface="G마켓 산스 TTF Medium" panose="02000000000000000000" pitchFamily="2" charset="-127"/>
+                <a:cs typeface="맑은 고딕" panose="020B0503020000020004" charset="-127"/>
+                <a:sym typeface="맑은 고딕" panose="020B0503020000020004" charset="-127"/>
+              </a:rPr>
+              <a:t>체력</a:t>
+            </a:r>
+            <a:r>
+              <a:rPr lang="en-US" sz="1300" dirty="0">
+                <a:latin typeface="G마켓 산스 TTF Medium" panose="02000000000000000000" pitchFamily="2" charset="-127"/>
+                <a:ea typeface="G마켓 산스 TTF Medium" panose="02000000000000000000" pitchFamily="2" charset="-127"/>
+                <a:cs typeface="맑은 고딕" panose="020B0503020000020004" charset="-127"/>
+                <a:sym typeface="맑은 고딕" panose="020B0503020000020004" charset="-127"/>
+              </a:rPr>
+              <a:t> : 100</a:t>
             </a:r>
           </a:p>
           <a:p>
             <a:pPr indent="0">
+              <a:lnSpc>
+                <a:spcPct val="150000"/>
+              </a:lnSpc>
               <a:spcBef>
                 <a:spcPts val="0"/>
               </a:spcBef>
@@ -3616,68 +3866,71 @@
               <a:buNone/>
             </a:pPr>
             <a:r>
-              <a:rPr lang="en-US" sz="1300">
-                <a:latin typeface="맑은 고딕" panose="020B0503020000020004" charset="-127"/>
-                <a:ea typeface="맑은 고딕" panose="020B0503020000020004" charset="-127"/>
+              <a:rPr lang="en-US" sz="1300" dirty="0">
+                <a:latin typeface="G마켓 산스 TTF Medium" panose="02000000000000000000" pitchFamily="2" charset="-127"/>
+                <a:ea typeface="G마켓 산스 TTF Medium" panose="02000000000000000000" pitchFamily="2" charset="-127"/>
                 <a:cs typeface="맑은 고딕" panose="020B0503020000020004" charset="-127"/>
                 <a:sym typeface="맑은 고딕" panose="020B0503020000020004" charset="-127"/>
               </a:rPr>
               <a:t>- </a:t>
             </a:r>
             <a:r>
-              <a:rPr lang="ko-KR" altLang="en-US" sz="1300">
-                <a:latin typeface="맑은 고딕" panose="020B0503020000020004" charset="-127"/>
-                <a:ea typeface="맑은 고딕" panose="020B0503020000020004" charset="-127"/>
+              <a:rPr lang="ko-KR" altLang="en-US" sz="1300" dirty="0">
+                <a:latin typeface="G마켓 산스 TTF Medium" panose="02000000000000000000" pitchFamily="2" charset="-127"/>
+                <a:ea typeface="G마켓 산스 TTF Medium" panose="02000000000000000000" pitchFamily="2" charset="-127"/>
                 <a:cs typeface="맑은 고딕" panose="020B0503020000020004" charset="-127"/>
                 <a:sym typeface="맑은 고딕" panose="020B0503020000020004" charset="-127"/>
               </a:rPr>
               <a:t>공격속도</a:t>
             </a:r>
             <a:r>
-              <a:rPr lang="en-US" altLang="ko-KR" sz="1300">
-                <a:latin typeface="맑은 고딕" panose="020B0503020000020004" charset="-127"/>
-                <a:ea typeface="맑은 고딕" panose="020B0503020000020004" charset="-127"/>
+              <a:rPr lang="en-US" altLang="ko-KR" sz="1300" dirty="0">
+                <a:latin typeface="G마켓 산스 TTF Medium" panose="02000000000000000000" pitchFamily="2" charset="-127"/>
+                <a:ea typeface="G마켓 산스 TTF Medium" panose="02000000000000000000" pitchFamily="2" charset="-127"/>
                 <a:cs typeface="맑은 고딕" panose="020B0503020000020004" charset="-127"/>
                 <a:sym typeface="맑은 고딕" panose="020B0503020000020004" charset="-127"/>
               </a:rPr>
               <a:t> : 1</a:t>
             </a:r>
             <a:r>
-              <a:rPr lang="ko-KR" altLang="en-US" sz="1300">
-                <a:latin typeface="맑은 고딕" panose="020B0503020000020004" charset="-127"/>
-                <a:ea typeface="맑은 고딕" panose="020B0503020000020004" charset="-127"/>
+              <a:rPr lang="ko-KR" altLang="en-US" sz="1300" dirty="0">
+                <a:latin typeface="G마켓 산스 TTF Medium" panose="02000000000000000000" pitchFamily="2" charset="-127"/>
+                <a:ea typeface="G마켓 산스 TTF Medium" panose="02000000000000000000" pitchFamily="2" charset="-127"/>
                 <a:cs typeface="맑은 고딕" panose="020B0503020000020004" charset="-127"/>
                 <a:sym typeface="맑은 고딕" panose="020B0503020000020004" charset="-127"/>
               </a:rPr>
               <a:t>초에</a:t>
             </a:r>
             <a:r>
-              <a:rPr lang="en-US" altLang="ko-KR" sz="1300">
-                <a:latin typeface="맑은 고딕" panose="020B0503020000020004" charset="-127"/>
-                <a:ea typeface="맑은 고딕" panose="020B0503020000020004" charset="-127"/>
+              <a:rPr lang="en-US" altLang="ko-KR" sz="1300" dirty="0">
+                <a:latin typeface="G마켓 산스 TTF Medium" panose="02000000000000000000" pitchFamily="2" charset="-127"/>
+                <a:ea typeface="G마켓 산스 TTF Medium" panose="02000000000000000000" pitchFamily="2" charset="-127"/>
                 <a:cs typeface="맑은 고딕" panose="020B0503020000020004" charset="-127"/>
                 <a:sym typeface="맑은 고딕" panose="020B0503020000020004" charset="-127"/>
               </a:rPr>
               <a:t> 1</a:t>
             </a:r>
             <a:r>
-              <a:rPr lang="ko-KR" altLang="en-US" sz="1300">
-                <a:latin typeface="맑은 고딕" panose="020B0503020000020004" charset="-127"/>
-                <a:ea typeface="맑은 고딕" panose="020B0503020000020004" charset="-127"/>
+              <a:rPr lang="ko-KR" altLang="en-US" sz="1300" dirty="0">
+                <a:latin typeface="G마켓 산스 TTF Medium" panose="02000000000000000000" pitchFamily="2" charset="-127"/>
+                <a:ea typeface="G마켓 산스 TTF Medium" panose="02000000000000000000" pitchFamily="2" charset="-127"/>
                 <a:cs typeface="맑은 고딕" panose="020B0503020000020004" charset="-127"/>
                 <a:sym typeface="맑은 고딕" panose="020B0503020000020004" charset="-127"/>
               </a:rPr>
               <a:t>번</a:t>
             </a:r>
-            <a:endParaRPr sz="1300">
-              <a:latin typeface="맑은 고딕" panose="020B0503020000020004" charset="-127"/>
-              <a:ea typeface="맑은 고딕" panose="020B0503020000020004" charset="-127"/>
+            <a:endParaRPr sz="1300" dirty="0">
+              <a:latin typeface="G마켓 산스 TTF Medium" panose="02000000000000000000" pitchFamily="2" charset="-127"/>
+              <a:ea typeface="G마켓 산스 TTF Medium" panose="02000000000000000000" pitchFamily="2" charset="-127"/>
               <a:cs typeface="맑은 고딕" panose="020B0503020000020004" charset="-127"/>
               <a:sym typeface="맑은 고딕" panose="020B0503020000020004" charset="-127"/>
             </a:endParaRPr>
           </a:p>
           <a:p>
             <a:pPr indent="0">
+              <a:lnSpc>
+                <a:spcPct val="150000"/>
+              </a:lnSpc>
               <a:spcBef>
                 <a:spcPts val="0"/>
               </a:spcBef>
@@ -3687,23 +3940,44 @@
               <a:buNone/>
             </a:pPr>
             <a:r>
-              <a:rPr lang="en-US" sz="1300">
-                <a:latin typeface="맑은 고딕" panose="020B0503020000020004" charset="-127"/>
-                <a:ea typeface="맑은 고딕" panose="020B0503020000020004" charset="-127"/>
-                <a:cs typeface="맑은 고딕" panose="020B0503020000020004" charset="-127"/>
-                <a:sym typeface="맑은 고딕" panose="020B0503020000020004" charset="-127"/>
-              </a:rPr>
-              <a:t>- 데미지 : 20</a:t>
-            </a:r>
-            <a:endParaRPr sz="1300">
-              <a:latin typeface="맑은 고딕" panose="020B0503020000020004" charset="-127"/>
-              <a:ea typeface="맑은 고딕" panose="020B0503020000020004" charset="-127"/>
+              <a:rPr lang="en-US" sz="1300" dirty="0">
+                <a:latin typeface="G마켓 산스 TTF Medium" panose="02000000000000000000" pitchFamily="2" charset="-127"/>
+                <a:ea typeface="G마켓 산스 TTF Medium" panose="02000000000000000000" pitchFamily="2" charset="-127"/>
+                <a:cs typeface="맑은 고딕" panose="020B0503020000020004" charset="-127"/>
+                <a:sym typeface="맑은 고딕" panose="020B0503020000020004" charset="-127"/>
+              </a:rPr>
+              <a:t>- </a:t>
+            </a:r>
+            <a:r>
+              <a:rPr lang="en-US" sz="1300" dirty="0" err="1">
+                <a:latin typeface="G마켓 산스 TTF Medium" panose="02000000000000000000" pitchFamily="2" charset="-127"/>
+                <a:ea typeface="G마켓 산스 TTF Medium" panose="02000000000000000000" pitchFamily="2" charset="-127"/>
+                <a:cs typeface="맑은 고딕" panose="020B0503020000020004" charset="-127"/>
+                <a:sym typeface="맑은 고딕" panose="020B0503020000020004" charset="-127"/>
+              </a:rPr>
+              <a:t>데미지</a:t>
+            </a:r>
+            <a:r>
+              <a:rPr lang="en-US" sz="1300" dirty="0">
+                <a:latin typeface="G마켓 산스 TTF Medium" panose="02000000000000000000" pitchFamily="2" charset="-127"/>
+                <a:ea typeface="G마켓 산스 TTF Medium" panose="02000000000000000000" pitchFamily="2" charset="-127"/>
+                <a:cs typeface="맑은 고딕" panose="020B0503020000020004" charset="-127"/>
+                <a:sym typeface="맑은 고딕" panose="020B0503020000020004" charset="-127"/>
+              </a:rPr>
+              <a:t> : 20</a:t>
+            </a:r>
+            <a:endParaRPr sz="1300" dirty="0">
+              <a:latin typeface="G마켓 산스 TTF Medium" panose="02000000000000000000" pitchFamily="2" charset="-127"/>
+              <a:ea typeface="G마켓 산스 TTF Medium" panose="02000000000000000000" pitchFamily="2" charset="-127"/>
               <a:cs typeface="맑은 고딕" panose="020B0503020000020004" charset="-127"/>
               <a:sym typeface="맑은 고딕" panose="020B0503020000020004" charset="-127"/>
             </a:endParaRPr>
           </a:p>
           <a:p>
             <a:pPr indent="0">
+              <a:lnSpc>
+                <a:spcPct val="150000"/>
+              </a:lnSpc>
               <a:spcBef>
                 <a:spcPts val="0"/>
               </a:spcBef>
@@ -3713,80 +3987,98 @@
               <a:buNone/>
             </a:pPr>
             <a:r>
-              <a:rPr lang="en-US" sz="1300">
-                <a:latin typeface="맑은 고딕" panose="020B0503020000020004" charset="-127"/>
-                <a:ea typeface="맑은 고딕" panose="020B0503020000020004" charset="-127"/>
-                <a:cs typeface="맑은 고딕" panose="020B0503020000020004" charset="-127"/>
-                <a:sym typeface="맑은 고딕" panose="020B0503020000020004" charset="-127"/>
-              </a:rPr>
-              <a:t>- 애니메이션 4종(Idle, </a:t>
-            </a:r>
-            <a:r>
-              <a:rPr lang="ko-KR" altLang="en-US" sz="1300">
-                <a:latin typeface="맑은 고딕" panose="020B0503020000020004" charset="-127"/>
-                <a:ea typeface="맑은 고딕" panose="020B0503020000020004" charset="-127"/>
+              <a:rPr lang="en-US" sz="1300" dirty="0">
+                <a:latin typeface="G마켓 산스 TTF Medium" panose="02000000000000000000" pitchFamily="2" charset="-127"/>
+                <a:ea typeface="G마켓 산스 TTF Medium" panose="02000000000000000000" pitchFamily="2" charset="-127"/>
+                <a:cs typeface="맑은 고딕" panose="020B0503020000020004" charset="-127"/>
+                <a:sym typeface="맑은 고딕" panose="020B0503020000020004" charset="-127"/>
+              </a:rPr>
+              <a:t>- </a:t>
+            </a:r>
+            <a:r>
+              <a:rPr lang="en-US" sz="1300" dirty="0" err="1">
+                <a:latin typeface="G마켓 산스 TTF Medium" panose="02000000000000000000" pitchFamily="2" charset="-127"/>
+                <a:ea typeface="G마켓 산스 TTF Medium" panose="02000000000000000000" pitchFamily="2" charset="-127"/>
+                <a:cs typeface="맑은 고딕" panose="020B0503020000020004" charset="-127"/>
+                <a:sym typeface="맑은 고딕" panose="020B0503020000020004" charset="-127"/>
+              </a:rPr>
+              <a:t>애니메이션</a:t>
+            </a:r>
+            <a:r>
+              <a:rPr lang="en-US" sz="1300" dirty="0">
+                <a:latin typeface="G마켓 산스 TTF Medium" panose="02000000000000000000" pitchFamily="2" charset="-127"/>
+                <a:ea typeface="G마켓 산스 TTF Medium" panose="02000000000000000000" pitchFamily="2" charset="-127"/>
+                <a:cs typeface="맑은 고딕" panose="020B0503020000020004" charset="-127"/>
+                <a:sym typeface="맑은 고딕" panose="020B0503020000020004" charset="-127"/>
+              </a:rPr>
+              <a:t> 4종(Idle, </a:t>
+            </a:r>
+            <a:r>
+              <a:rPr lang="ko-KR" altLang="en-US" sz="1300" dirty="0">
+                <a:latin typeface="G마켓 산스 TTF Medium" panose="02000000000000000000" pitchFamily="2" charset="-127"/>
+                <a:ea typeface="G마켓 산스 TTF Medium" panose="02000000000000000000" pitchFamily="2" charset="-127"/>
                 <a:cs typeface="맑은 고딕" panose="020B0503020000020004" charset="-127"/>
                 <a:sym typeface="맑은 고딕" panose="020B0503020000020004" charset="-127"/>
               </a:rPr>
               <a:t>이동</a:t>
             </a:r>
             <a:r>
-              <a:rPr lang="en-US" altLang="ko-KR" sz="1300">
-                <a:latin typeface="맑은 고딕" panose="020B0503020000020004" charset="-127"/>
-                <a:ea typeface="맑은 고딕" panose="020B0503020000020004" charset="-127"/>
+              <a:rPr lang="en-US" altLang="ko-KR" sz="1300" dirty="0">
+                <a:latin typeface="G마켓 산스 TTF Medium" panose="02000000000000000000" pitchFamily="2" charset="-127"/>
+                <a:ea typeface="G마켓 산스 TTF Medium" panose="02000000000000000000" pitchFamily="2" charset="-127"/>
                 <a:cs typeface="맑은 고딕" panose="020B0503020000020004" charset="-127"/>
                 <a:sym typeface="맑은 고딕" panose="020B0503020000020004" charset="-127"/>
               </a:rPr>
               <a:t>, </a:t>
             </a:r>
             <a:r>
-              <a:rPr lang="ko-KR" altLang="en-US" sz="1300">
-                <a:latin typeface="맑은 고딕" panose="020B0503020000020004" charset="-127"/>
-                <a:ea typeface="맑은 고딕" panose="020B0503020000020004" charset="-127"/>
+              <a:rPr lang="ko-KR" altLang="en-US" sz="1300" dirty="0">
+                <a:latin typeface="G마켓 산스 TTF Medium" panose="02000000000000000000" pitchFamily="2" charset="-127"/>
+                <a:ea typeface="G마켓 산스 TTF Medium" panose="02000000000000000000" pitchFamily="2" charset="-127"/>
                 <a:cs typeface="맑은 고딕" panose="020B0503020000020004" charset="-127"/>
                 <a:sym typeface="맑은 고딕" panose="020B0503020000020004" charset="-127"/>
               </a:rPr>
               <a:t>공격</a:t>
             </a:r>
             <a:r>
-              <a:rPr lang="en-US" altLang="ko-KR" sz="1300">
-                <a:latin typeface="맑은 고딕" panose="020B0503020000020004" charset="-127"/>
-                <a:ea typeface="맑은 고딕" panose="020B0503020000020004" charset="-127"/>
+              <a:rPr lang="en-US" altLang="ko-KR" sz="1300" dirty="0">
+                <a:latin typeface="G마켓 산스 TTF Medium" panose="02000000000000000000" pitchFamily="2" charset="-127"/>
+                <a:ea typeface="G마켓 산스 TTF Medium" panose="02000000000000000000" pitchFamily="2" charset="-127"/>
                 <a:cs typeface="맑은 고딕" panose="020B0503020000020004" charset="-127"/>
                 <a:sym typeface="맑은 고딕" panose="020B0503020000020004" charset="-127"/>
               </a:rPr>
               <a:t>, </a:t>
             </a:r>
             <a:r>
-              <a:rPr lang="ko-KR" altLang="en-US" sz="1300">
-                <a:latin typeface="맑은 고딕" panose="020B0503020000020004" charset="-127"/>
-                <a:ea typeface="맑은 고딕" panose="020B0503020000020004" charset="-127"/>
+              <a:rPr lang="ko-KR" altLang="en-US" sz="1300" dirty="0">
+                <a:latin typeface="G마켓 산스 TTF Medium" panose="02000000000000000000" pitchFamily="2" charset="-127"/>
+                <a:ea typeface="G마켓 산스 TTF Medium" panose="02000000000000000000" pitchFamily="2" charset="-127"/>
                 <a:cs typeface="맑은 고딕" panose="020B0503020000020004" charset="-127"/>
                 <a:sym typeface="맑은 고딕" panose="020B0503020000020004" charset="-127"/>
               </a:rPr>
               <a:t>사망</a:t>
             </a:r>
             <a:r>
-              <a:rPr lang="en-US" altLang="ko-KR" sz="1300">
-                <a:latin typeface="맑은 고딕" panose="020B0503020000020004" charset="-127"/>
-                <a:ea typeface="맑은 고딕" panose="020B0503020000020004" charset="-127"/>
+              <a:rPr lang="en-US" altLang="ko-KR" sz="1300" dirty="0">
+                <a:latin typeface="G마켓 산스 TTF Medium" panose="02000000000000000000" pitchFamily="2" charset="-127"/>
+                <a:ea typeface="G마켓 산스 TTF Medium" panose="02000000000000000000" pitchFamily="2" charset="-127"/>
                 <a:cs typeface="맑은 고딕" panose="020B0503020000020004" charset="-127"/>
                 <a:sym typeface="맑은 고딕" panose="020B0503020000020004" charset="-127"/>
               </a:rPr>
               <a:t>)</a:t>
             </a:r>
             <a:r>
-              <a:rPr lang="en-US" sz="1200">
-                <a:latin typeface="맑은 고딕" panose="020B0503020000020004" charset="-127"/>
-                <a:ea typeface="맑은 고딕" panose="020B0503020000020004" charset="-127"/>
+              <a:rPr lang="en-US" sz="1200" dirty="0">
+                <a:latin typeface="G마켓 산스 TTF Medium" panose="02000000000000000000" pitchFamily="2" charset="-127"/>
+                <a:ea typeface="G마켓 산스 TTF Medium" panose="02000000000000000000" pitchFamily="2" charset="-127"/>
                 <a:cs typeface="맑은 고딕" panose="020B0503020000020004" charset="-127"/>
                 <a:sym typeface="맑은 고딕" panose="020B0503020000020004" charset="-127"/>
               </a:rPr>
               <a:t> </a:t>
             </a:r>
-            <a:endParaRPr sz="1200">
-              <a:latin typeface="맑은 고딕" panose="020B0503020000020004" charset="-127"/>
-              <a:ea typeface="맑은 고딕" panose="020B0503020000020004" charset="-127"/>
+            <a:endParaRPr sz="1200" dirty="0">
+              <a:latin typeface="G마켓 산스 TTF Medium" panose="02000000000000000000" pitchFamily="2" charset="-127"/>
+              <a:ea typeface="G마켓 산스 TTF Medium" panose="02000000000000000000" pitchFamily="2" charset="-127"/>
               <a:cs typeface="맑은 고딕" panose="020B0503020000020004" charset="-127"/>
               <a:sym typeface="맑은 고딕" panose="020B0503020000020004" charset="-127"/>
             </a:endParaRPr>
@@ -3827,7 +4119,7 @@
         </p:nvSpPr>
         <p:spPr>
           <a:xfrm>
-            <a:off x="8091170" y="1209040"/>
+            <a:off x="8091170" y="1096746"/>
             <a:ext cx="3211195" cy="1859915"/>
           </a:xfrm>
           <a:prstGeom prst="rect">
@@ -3845,6 +4137,9 @@
           <a:lstStyle/>
           <a:p>
             <a:pPr indent="0">
+              <a:lnSpc>
+                <a:spcPct val="150000"/>
+              </a:lnSpc>
               <a:spcBef>
                 <a:spcPts val="0"/>
               </a:spcBef>
@@ -3855,8 +4150,8 @@
             </a:pPr>
             <a:r>
               <a:rPr lang="en-US" sz="1200">
-                <a:latin typeface="맑은 고딕" panose="020B0503020000020004" charset="-127"/>
-                <a:ea typeface="맑은 고딕" panose="020B0503020000020004" charset="-127"/>
+                <a:latin typeface="G마켓 산스 TTF Medium" panose="02000000000000000000" pitchFamily="2" charset="-127"/>
+                <a:ea typeface="G마켓 산스 TTF Medium" panose="02000000000000000000" pitchFamily="2" charset="-127"/>
                 <a:cs typeface="맑은 고딕" panose="020B0503020000020004" charset="-127"/>
                 <a:sym typeface="맑은 고딕" panose="020B0503020000020004" charset="-127"/>
               </a:rPr>
@@ -3864,22 +4159,25 @@
             </a:r>
             <a:r>
               <a:rPr lang="ko-KR" altLang="en-US" sz="1600" b="1">
-                <a:latin typeface="맑은 고딕" panose="020B0503020000020004" charset="-127"/>
-                <a:ea typeface="맑은 고딕" panose="020B0503020000020004" charset="-127"/>
+                <a:latin typeface="G마켓 산스 TTF Medium" panose="02000000000000000000" pitchFamily="2" charset="-127"/>
+                <a:ea typeface="G마켓 산스 TTF Medium" panose="02000000000000000000" pitchFamily="2" charset="-127"/>
                 <a:cs typeface="맑은 고딕" panose="020B0503020000020004" charset="-127"/>
                 <a:sym typeface="맑은 고딕" panose="020B0503020000020004" charset="-127"/>
               </a:rPr>
               <a:t>오거</a:t>
             </a:r>
             <a:endParaRPr sz="1600" b="1">
-              <a:latin typeface="맑은 고딕" panose="020B0503020000020004" charset="-127"/>
-              <a:ea typeface="맑은 고딕" panose="020B0503020000020004" charset="-127"/>
+              <a:latin typeface="G마켓 산스 TTF Medium" panose="02000000000000000000" pitchFamily="2" charset="-127"/>
+              <a:ea typeface="G마켓 산스 TTF Medium" panose="02000000000000000000" pitchFamily="2" charset="-127"/>
               <a:cs typeface="맑은 고딕" panose="020B0503020000020004" charset="-127"/>
               <a:sym typeface="맑은 고딕" panose="020B0503020000020004" charset="-127"/>
             </a:endParaRPr>
           </a:p>
           <a:p>
             <a:pPr indent="0">
+              <a:lnSpc>
+                <a:spcPct val="150000"/>
+              </a:lnSpc>
               <a:spcBef>
                 <a:spcPts val="0"/>
               </a:spcBef>
@@ -3889,14 +4187,17 @@
               <a:buNone/>
             </a:pPr>
             <a:endParaRPr sz="1200">
-              <a:latin typeface="맑은 고딕" panose="020B0503020000020004" charset="-127"/>
-              <a:ea typeface="맑은 고딕" panose="020B0503020000020004" charset="-127"/>
+              <a:latin typeface="G마켓 산스 TTF Medium" panose="02000000000000000000" pitchFamily="2" charset="-127"/>
+              <a:ea typeface="G마켓 산스 TTF Medium" panose="02000000000000000000" pitchFamily="2" charset="-127"/>
               <a:cs typeface="맑은 고딕" panose="020B0503020000020004" charset="-127"/>
               <a:sym typeface="맑은 고딕" panose="020B0503020000020004" charset="-127"/>
             </a:endParaRPr>
           </a:p>
           <a:p>
             <a:pPr indent="0">
+              <a:lnSpc>
+                <a:spcPct val="150000"/>
+              </a:lnSpc>
               <a:spcBef>
                 <a:spcPts val="0"/>
               </a:spcBef>
@@ -3907,22 +4208,25 @@
             </a:pPr>
             <a:r>
               <a:rPr lang="en-US" sz="1300">
-                <a:latin typeface="맑은 고딕" panose="020B0503020000020004" charset="-127"/>
-                <a:ea typeface="맑은 고딕" panose="020B0503020000020004" charset="-127"/>
+                <a:latin typeface="G마켓 산스 TTF Medium" panose="02000000000000000000" pitchFamily="2" charset="-127"/>
+                <a:ea typeface="G마켓 산스 TTF Medium" panose="02000000000000000000" pitchFamily="2" charset="-127"/>
                 <a:cs typeface="맑은 고딕" panose="020B0503020000020004" charset="-127"/>
                 <a:sym typeface="맑은 고딕" panose="020B0503020000020004" charset="-127"/>
               </a:rPr>
               <a:t>- 키 : 200cm</a:t>
             </a:r>
             <a:endParaRPr sz="1300">
-              <a:latin typeface="맑은 고딕" panose="020B0503020000020004" charset="-127"/>
-              <a:ea typeface="맑은 고딕" panose="020B0503020000020004" charset="-127"/>
+              <a:latin typeface="G마켓 산스 TTF Medium" panose="02000000000000000000" pitchFamily="2" charset="-127"/>
+              <a:ea typeface="G마켓 산스 TTF Medium" panose="02000000000000000000" pitchFamily="2" charset="-127"/>
               <a:cs typeface="맑은 고딕" panose="020B0503020000020004" charset="-127"/>
               <a:sym typeface="맑은 고딕" panose="020B0503020000020004" charset="-127"/>
             </a:endParaRPr>
           </a:p>
           <a:p>
             <a:pPr indent="0">
+              <a:lnSpc>
+                <a:spcPct val="150000"/>
+              </a:lnSpc>
               <a:spcBef>
                 <a:spcPts val="0"/>
               </a:spcBef>
@@ -3933,22 +4237,25 @@
             </a:pPr>
             <a:r>
               <a:rPr lang="en-US" sz="1300">
-                <a:latin typeface="맑은 고딕" panose="020B0503020000020004" charset="-127"/>
-                <a:ea typeface="맑은 고딕" panose="020B0503020000020004" charset="-127"/>
+                <a:latin typeface="G마켓 산스 TTF Medium" panose="02000000000000000000" pitchFamily="2" charset="-127"/>
+                <a:ea typeface="G마켓 산스 TTF Medium" panose="02000000000000000000" pitchFamily="2" charset="-127"/>
                 <a:cs typeface="맑은 고딕" panose="020B0503020000020004" charset="-127"/>
                 <a:sym typeface="맑은 고딕" panose="020B0503020000020004" charset="-127"/>
               </a:rPr>
               <a:t>- 이동속도 : 0.7km/h</a:t>
             </a:r>
             <a:endParaRPr sz="1300">
-              <a:latin typeface="맑은 고딕" panose="020B0503020000020004" charset="-127"/>
-              <a:ea typeface="맑은 고딕" panose="020B0503020000020004" charset="-127"/>
+              <a:latin typeface="G마켓 산스 TTF Medium" panose="02000000000000000000" pitchFamily="2" charset="-127"/>
+              <a:ea typeface="G마켓 산스 TTF Medium" panose="02000000000000000000" pitchFamily="2" charset="-127"/>
               <a:cs typeface="맑은 고딕" panose="020B0503020000020004" charset="-127"/>
               <a:sym typeface="맑은 고딕" panose="020B0503020000020004" charset="-127"/>
             </a:endParaRPr>
           </a:p>
           <a:p>
             <a:pPr indent="0">
+              <a:lnSpc>
+                <a:spcPct val="150000"/>
+              </a:lnSpc>
               <a:spcBef>
                 <a:spcPts val="0"/>
               </a:spcBef>
@@ -3959,8 +4266,8 @@
             </a:pPr>
             <a:r>
               <a:rPr lang="en-US" sz="1300">
-                <a:latin typeface="맑은 고딕" panose="020B0503020000020004" charset="-127"/>
-                <a:ea typeface="맑은 고딕" panose="020B0503020000020004" charset="-127"/>
+                <a:latin typeface="G마켓 산스 TTF Medium" panose="02000000000000000000" pitchFamily="2" charset="-127"/>
+                <a:ea typeface="G마켓 산스 TTF Medium" panose="02000000000000000000" pitchFamily="2" charset="-127"/>
                 <a:cs typeface="맑은 고딕" panose="020B0503020000020004" charset="-127"/>
                 <a:sym typeface="맑은 고딕" panose="020B0503020000020004" charset="-127"/>
               </a:rPr>
@@ -3969,6 +4276,9 @@
           </a:p>
           <a:p>
             <a:pPr indent="0">
+              <a:lnSpc>
+                <a:spcPct val="150000"/>
+              </a:lnSpc>
               <a:spcBef>
                 <a:spcPts val="0"/>
               </a:spcBef>
@@ -3979,8 +4289,8 @@
             </a:pPr>
             <a:r>
               <a:rPr lang="en-US" sz="1300">
-                <a:latin typeface="맑은 고딕" panose="020B0503020000020004" charset="-127"/>
-                <a:ea typeface="맑은 고딕" panose="020B0503020000020004" charset="-127"/>
+                <a:latin typeface="G마켓 산스 TTF Medium" panose="02000000000000000000" pitchFamily="2" charset="-127"/>
+                <a:ea typeface="G마켓 산스 TTF Medium" panose="02000000000000000000" pitchFamily="2" charset="-127"/>
                 <a:cs typeface="맑은 고딕" panose="020B0503020000020004" charset="-127"/>
                 <a:sym typeface="맑은 고딕" panose="020B0503020000020004" charset="-127"/>
               </a:rPr>
@@ -3988,8 +4298,8 @@
             </a:r>
             <a:r>
               <a:rPr lang="ko-KR" altLang="en-US" sz="1300">
-                <a:latin typeface="맑은 고딕" panose="020B0503020000020004" charset="-127"/>
-                <a:ea typeface="맑은 고딕" panose="020B0503020000020004" charset="-127"/>
+                <a:latin typeface="G마켓 산스 TTF Medium" panose="02000000000000000000" pitchFamily="2" charset="-127"/>
+                <a:ea typeface="G마켓 산스 TTF Medium" panose="02000000000000000000" pitchFamily="2" charset="-127"/>
                 <a:cs typeface="맑은 고딕" panose="020B0503020000020004" charset="-127"/>
                 <a:sym typeface="맑은 고딕" panose="020B0503020000020004" charset="-127"/>
               </a:rPr>
@@ -3997,8 +4307,8 @@
             </a:r>
             <a:r>
               <a:rPr lang="en-US" altLang="ko-KR" sz="1300">
-                <a:latin typeface="맑은 고딕" panose="020B0503020000020004" charset="-127"/>
-                <a:ea typeface="맑은 고딕" panose="020B0503020000020004" charset="-127"/>
+                <a:latin typeface="G마켓 산스 TTF Medium" panose="02000000000000000000" pitchFamily="2" charset="-127"/>
+                <a:ea typeface="G마켓 산스 TTF Medium" panose="02000000000000000000" pitchFamily="2" charset="-127"/>
                 <a:cs typeface="맑은 고딕" panose="020B0503020000020004" charset="-127"/>
                 <a:sym typeface="맑은 고딕" panose="020B0503020000020004" charset="-127"/>
               </a:rPr>
@@ -4006,8 +4316,8 @@
             </a:r>
             <a:r>
               <a:rPr lang="ko-KR" altLang="en-US" sz="1300">
-                <a:latin typeface="맑은 고딕" panose="020B0503020000020004" charset="-127"/>
-                <a:ea typeface="맑은 고딕" panose="020B0503020000020004" charset="-127"/>
+                <a:latin typeface="G마켓 산스 TTF Medium" panose="02000000000000000000" pitchFamily="2" charset="-127"/>
+                <a:ea typeface="G마켓 산스 TTF Medium" panose="02000000000000000000" pitchFamily="2" charset="-127"/>
                 <a:cs typeface="맑은 고딕" panose="020B0503020000020004" charset="-127"/>
                 <a:sym typeface="맑은 고딕" panose="020B0503020000020004" charset="-127"/>
               </a:rPr>
@@ -4015,8 +4325,8 @@
             </a:r>
             <a:r>
               <a:rPr lang="en-US" altLang="ko-KR" sz="1300">
-                <a:latin typeface="맑은 고딕" panose="020B0503020000020004" charset="-127"/>
-                <a:ea typeface="맑은 고딕" panose="020B0503020000020004" charset="-127"/>
+                <a:latin typeface="G마켓 산스 TTF Medium" panose="02000000000000000000" pitchFamily="2" charset="-127"/>
+                <a:ea typeface="G마켓 산스 TTF Medium" panose="02000000000000000000" pitchFamily="2" charset="-127"/>
                 <a:cs typeface="맑은 고딕" panose="020B0503020000020004" charset="-127"/>
                 <a:sym typeface="맑은 고딕" panose="020B0503020000020004" charset="-127"/>
               </a:rPr>
@@ -4024,22 +4334,25 @@
             </a:r>
             <a:r>
               <a:rPr lang="ko-KR" altLang="en-US" sz="1300">
-                <a:latin typeface="맑은 고딕" panose="020B0503020000020004" charset="-127"/>
-                <a:ea typeface="맑은 고딕" panose="020B0503020000020004" charset="-127"/>
+                <a:latin typeface="G마켓 산스 TTF Medium" panose="02000000000000000000" pitchFamily="2" charset="-127"/>
+                <a:ea typeface="G마켓 산스 TTF Medium" panose="02000000000000000000" pitchFamily="2" charset="-127"/>
                 <a:cs typeface="맑은 고딕" panose="020B0503020000020004" charset="-127"/>
                 <a:sym typeface="맑은 고딕" panose="020B0503020000020004" charset="-127"/>
               </a:rPr>
               <a:t>번</a:t>
             </a:r>
             <a:endParaRPr sz="1300">
-              <a:latin typeface="맑은 고딕" panose="020B0503020000020004" charset="-127"/>
-              <a:ea typeface="맑은 고딕" panose="020B0503020000020004" charset="-127"/>
+              <a:latin typeface="G마켓 산스 TTF Medium" panose="02000000000000000000" pitchFamily="2" charset="-127"/>
+              <a:ea typeface="G마켓 산스 TTF Medium" panose="02000000000000000000" pitchFamily="2" charset="-127"/>
               <a:cs typeface="맑은 고딕" panose="020B0503020000020004" charset="-127"/>
               <a:sym typeface="맑은 고딕" panose="020B0503020000020004" charset="-127"/>
             </a:endParaRPr>
           </a:p>
           <a:p>
             <a:pPr indent="0">
+              <a:lnSpc>
+                <a:spcPct val="150000"/>
+              </a:lnSpc>
               <a:spcBef>
                 <a:spcPts val="0"/>
               </a:spcBef>
@@ -4050,22 +4363,25 @@
             </a:pPr>
             <a:r>
               <a:rPr lang="en-US" sz="1300">
-                <a:latin typeface="맑은 고딕" panose="020B0503020000020004" charset="-127"/>
-                <a:ea typeface="맑은 고딕" panose="020B0503020000020004" charset="-127"/>
+                <a:latin typeface="G마켓 산스 TTF Medium" panose="02000000000000000000" pitchFamily="2" charset="-127"/>
+                <a:ea typeface="G마켓 산스 TTF Medium" panose="02000000000000000000" pitchFamily="2" charset="-127"/>
                 <a:cs typeface="맑은 고딕" panose="020B0503020000020004" charset="-127"/>
                 <a:sym typeface="맑은 고딕" panose="020B0503020000020004" charset="-127"/>
               </a:rPr>
               <a:t>- 데미지 : 50</a:t>
             </a:r>
             <a:endParaRPr sz="1300">
-              <a:latin typeface="맑은 고딕" panose="020B0503020000020004" charset="-127"/>
-              <a:ea typeface="맑은 고딕" panose="020B0503020000020004" charset="-127"/>
+              <a:latin typeface="G마켓 산스 TTF Medium" panose="02000000000000000000" pitchFamily="2" charset="-127"/>
+              <a:ea typeface="G마켓 산스 TTF Medium" panose="02000000000000000000" pitchFamily="2" charset="-127"/>
               <a:cs typeface="맑은 고딕" panose="020B0503020000020004" charset="-127"/>
               <a:sym typeface="맑은 고딕" panose="020B0503020000020004" charset="-127"/>
             </a:endParaRPr>
           </a:p>
           <a:p>
             <a:pPr indent="0">
+              <a:lnSpc>
+                <a:spcPct val="150000"/>
+              </a:lnSpc>
               <a:spcBef>
                 <a:spcPts val="0"/>
               </a:spcBef>
@@ -4076,8 +4392,8 @@
             </a:pPr>
             <a:r>
               <a:rPr lang="en-US" sz="1300">
-                <a:latin typeface="맑은 고딕" panose="020B0503020000020004" charset="-127"/>
-                <a:ea typeface="맑은 고딕" panose="020B0503020000020004" charset="-127"/>
+                <a:latin typeface="G마켓 산스 TTF Medium" panose="02000000000000000000" pitchFamily="2" charset="-127"/>
+                <a:ea typeface="G마켓 산스 TTF Medium" panose="02000000000000000000" pitchFamily="2" charset="-127"/>
                 <a:cs typeface="맑은 고딕" panose="020B0503020000020004" charset="-127"/>
                 <a:sym typeface="맑은 고딕" panose="020B0503020000020004" charset="-127"/>
               </a:rPr>
@@ -4085,8 +4401,8 @@
             </a:r>
             <a:r>
               <a:rPr lang="ko-KR" altLang="en-US" sz="1300">
-                <a:latin typeface="맑은 고딕" panose="020B0503020000020004" charset="-127"/>
-                <a:ea typeface="맑은 고딕" panose="020B0503020000020004" charset="-127"/>
+                <a:latin typeface="G마켓 산스 TTF Medium" panose="02000000000000000000" pitchFamily="2" charset="-127"/>
+                <a:ea typeface="G마켓 산스 TTF Medium" panose="02000000000000000000" pitchFamily="2" charset="-127"/>
                 <a:cs typeface="맑은 고딕" panose="020B0503020000020004" charset="-127"/>
                 <a:sym typeface="맑은 고딕" panose="020B0503020000020004" charset="-127"/>
               </a:rPr>
@@ -4094,8 +4410,8 @@
             </a:r>
             <a:r>
               <a:rPr lang="en-US" altLang="ko-KR" sz="1300">
-                <a:latin typeface="맑은 고딕" panose="020B0503020000020004" charset="-127"/>
-                <a:ea typeface="맑은 고딕" panose="020B0503020000020004" charset="-127"/>
+                <a:latin typeface="G마켓 산스 TTF Medium" panose="02000000000000000000" pitchFamily="2" charset="-127"/>
+                <a:ea typeface="G마켓 산스 TTF Medium" panose="02000000000000000000" pitchFamily="2" charset="-127"/>
                 <a:cs typeface="맑은 고딕" panose="020B0503020000020004" charset="-127"/>
                 <a:sym typeface="맑은 고딕" panose="020B0503020000020004" charset="-127"/>
               </a:rPr>
@@ -4103,8 +4419,8 @@
             </a:r>
             <a:r>
               <a:rPr lang="ko-KR" altLang="en-US" sz="1300">
-                <a:latin typeface="맑은 고딕" panose="020B0503020000020004" charset="-127"/>
-                <a:ea typeface="맑은 고딕" panose="020B0503020000020004" charset="-127"/>
+                <a:latin typeface="G마켓 산스 TTF Medium" panose="02000000000000000000" pitchFamily="2" charset="-127"/>
+                <a:ea typeface="G마켓 산스 TTF Medium" panose="02000000000000000000" pitchFamily="2" charset="-127"/>
                 <a:cs typeface="맑은 고딕" panose="020B0503020000020004" charset="-127"/>
                 <a:sym typeface="맑은 고딕" panose="020B0503020000020004" charset="-127"/>
               </a:rPr>
@@ -4112,8 +4428,8 @@
             </a:r>
             <a:r>
               <a:rPr lang="en-US" altLang="ko-KR" sz="1300">
-                <a:latin typeface="맑은 고딕" panose="020B0503020000020004" charset="-127"/>
-                <a:ea typeface="맑은 고딕" panose="020B0503020000020004" charset="-127"/>
+                <a:latin typeface="G마켓 산스 TTF Medium" panose="02000000000000000000" pitchFamily="2" charset="-127"/>
+                <a:ea typeface="G마켓 산스 TTF Medium" panose="02000000000000000000" pitchFamily="2" charset="-127"/>
                 <a:cs typeface="맑은 고딕" panose="020B0503020000020004" charset="-127"/>
                 <a:sym typeface="맑은 고딕" panose="020B0503020000020004" charset="-127"/>
               </a:rPr>
@@ -4121,8 +4437,8 @@
             </a:r>
             <a:r>
               <a:rPr lang="ko-KR" altLang="en-US" sz="1300">
-                <a:latin typeface="맑은 고딕" panose="020B0503020000020004" charset="-127"/>
-                <a:ea typeface="맑은 고딕" panose="020B0503020000020004" charset="-127"/>
+                <a:latin typeface="G마켓 산스 TTF Medium" panose="02000000000000000000" pitchFamily="2" charset="-127"/>
+                <a:ea typeface="G마켓 산스 TTF Medium" panose="02000000000000000000" pitchFamily="2" charset="-127"/>
                 <a:cs typeface="맑은 고딕" panose="020B0503020000020004" charset="-127"/>
                 <a:sym typeface="맑은 고딕" panose="020B0503020000020004" charset="-127"/>
               </a:rPr>
@@ -4130,8 +4446,8 @@
             </a:r>
             <a:r>
               <a:rPr lang="en-US" altLang="ko-KR" sz="1300">
-                <a:latin typeface="맑은 고딕" panose="020B0503020000020004" charset="-127"/>
-                <a:ea typeface="맑은 고딕" panose="020B0503020000020004" charset="-127"/>
+                <a:latin typeface="G마켓 산스 TTF Medium" panose="02000000000000000000" pitchFamily="2" charset="-127"/>
+                <a:ea typeface="G마켓 산스 TTF Medium" panose="02000000000000000000" pitchFamily="2" charset="-127"/>
                 <a:cs typeface="맑은 고딕" panose="020B0503020000020004" charset="-127"/>
                 <a:sym typeface="맑은 고딕" panose="020B0503020000020004" charset="-127"/>
               </a:rPr>
@@ -4139,16 +4455,16 @@
             </a:r>
             <a:r>
               <a:rPr lang="en-US" sz="1200">
-                <a:latin typeface="맑은 고딕" panose="020B0503020000020004" charset="-127"/>
-                <a:ea typeface="맑은 고딕" panose="020B0503020000020004" charset="-127"/>
+                <a:latin typeface="G마켓 산스 TTF Medium" panose="02000000000000000000" pitchFamily="2" charset="-127"/>
+                <a:ea typeface="G마켓 산스 TTF Medium" panose="02000000000000000000" pitchFamily="2" charset="-127"/>
                 <a:cs typeface="맑은 고딕" panose="020B0503020000020004" charset="-127"/>
                 <a:sym typeface="맑은 고딕" panose="020B0503020000020004" charset="-127"/>
               </a:rPr>
               <a:t> </a:t>
             </a:r>
             <a:endParaRPr sz="1200">
-              <a:latin typeface="맑은 고딕" panose="020B0503020000020004" charset="-127"/>
-              <a:ea typeface="맑은 고딕" panose="020B0503020000020004" charset="-127"/>
+              <a:latin typeface="G마켓 산스 TTF Medium" panose="02000000000000000000" pitchFamily="2" charset="-127"/>
+              <a:ea typeface="G마켓 산스 TTF Medium" panose="02000000000000000000" pitchFamily="2" charset="-127"/>
               <a:cs typeface="맑은 고딕" panose="020B0503020000020004" charset="-127"/>
               <a:sym typeface="맑은 고딕" panose="020B0503020000020004" charset="-127"/>
             </a:endParaRPr>
@@ -4189,7 +4505,7 @@
         </p:nvSpPr>
         <p:spPr>
           <a:xfrm>
-            <a:off x="8472805" y="4085590"/>
+            <a:off x="8472805" y="3973296"/>
             <a:ext cx="2829560" cy="1996440"/>
           </a:xfrm>
           <a:prstGeom prst="rect">
@@ -4207,6 +4523,9 @@
           <a:lstStyle/>
           <a:p>
             <a:pPr indent="0">
+              <a:lnSpc>
+                <a:spcPct val="150000"/>
+              </a:lnSpc>
               <a:spcBef>
                 <a:spcPts val="0"/>
               </a:spcBef>
@@ -4217,8 +4536,8 @@
             </a:pPr>
             <a:r>
               <a:rPr lang="en-US" sz="1200">
-                <a:latin typeface="맑은 고딕" panose="020B0503020000020004" charset="-127"/>
-                <a:ea typeface="맑은 고딕" panose="020B0503020000020004" charset="-127"/>
+                <a:latin typeface="G마켓 산스 TTF Medium" panose="02000000000000000000" pitchFamily="2" charset="-127"/>
+                <a:ea typeface="G마켓 산스 TTF Medium" panose="02000000000000000000" pitchFamily="2" charset="-127"/>
                 <a:cs typeface="맑은 고딕" panose="020B0503020000020004" charset="-127"/>
                 <a:sym typeface="맑은 고딕" panose="020B0503020000020004" charset="-127"/>
               </a:rPr>
@@ -4226,22 +4545,25 @@
             </a:r>
             <a:r>
               <a:rPr lang="ko-KR" altLang="en-US" sz="1600" b="1">
-                <a:latin typeface="맑은 고딕" panose="020B0503020000020004" charset="-127"/>
-                <a:ea typeface="맑은 고딕" panose="020B0503020000020004" charset="-127"/>
+                <a:latin typeface="G마켓 산스 TTF Medium" panose="02000000000000000000" pitchFamily="2" charset="-127"/>
+                <a:ea typeface="G마켓 산스 TTF Medium" panose="02000000000000000000" pitchFamily="2" charset="-127"/>
                 <a:cs typeface="맑은 고딕" panose="020B0503020000020004" charset="-127"/>
                 <a:sym typeface="맑은 고딕" panose="020B0503020000020004" charset="-127"/>
               </a:rPr>
               <a:t>골렘</a:t>
             </a:r>
             <a:endParaRPr sz="1600" b="1">
-              <a:latin typeface="맑은 고딕" panose="020B0503020000020004" charset="-127"/>
-              <a:ea typeface="맑은 고딕" panose="020B0503020000020004" charset="-127"/>
+              <a:latin typeface="G마켓 산스 TTF Medium" panose="02000000000000000000" pitchFamily="2" charset="-127"/>
+              <a:ea typeface="G마켓 산스 TTF Medium" panose="02000000000000000000" pitchFamily="2" charset="-127"/>
               <a:cs typeface="맑은 고딕" panose="020B0503020000020004" charset="-127"/>
               <a:sym typeface="맑은 고딕" panose="020B0503020000020004" charset="-127"/>
             </a:endParaRPr>
           </a:p>
           <a:p>
             <a:pPr indent="0">
+              <a:lnSpc>
+                <a:spcPct val="150000"/>
+              </a:lnSpc>
               <a:spcBef>
                 <a:spcPts val="0"/>
               </a:spcBef>
@@ -4251,14 +4573,17 @@
               <a:buNone/>
             </a:pPr>
             <a:endParaRPr sz="1200">
-              <a:latin typeface="맑은 고딕" panose="020B0503020000020004" charset="-127"/>
-              <a:ea typeface="맑은 고딕" panose="020B0503020000020004" charset="-127"/>
+              <a:latin typeface="G마켓 산스 TTF Medium" panose="02000000000000000000" pitchFamily="2" charset="-127"/>
+              <a:ea typeface="G마켓 산스 TTF Medium" panose="02000000000000000000" pitchFamily="2" charset="-127"/>
               <a:cs typeface="맑은 고딕" panose="020B0503020000020004" charset="-127"/>
               <a:sym typeface="맑은 고딕" panose="020B0503020000020004" charset="-127"/>
             </a:endParaRPr>
           </a:p>
           <a:p>
             <a:pPr indent="0">
+              <a:lnSpc>
+                <a:spcPct val="150000"/>
+              </a:lnSpc>
               <a:spcBef>
                 <a:spcPts val="0"/>
               </a:spcBef>
@@ -4269,22 +4594,25 @@
             </a:pPr>
             <a:r>
               <a:rPr lang="en-US" sz="1300">
-                <a:latin typeface="맑은 고딕" panose="020B0503020000020004" charset="-127"/>
-                <a:ea typeface="맑은 고딕" panose="020B0503020000020004" charset="-127"/>
+                <a:latin typeface="G마켓 산스 TTF Medium" panose="02000000000000000000" pitchFamily="2" charset="-127"/>
+                <a:ea typeface="G마켓 산스 TTF Medium" panose="02000000000000000000" pitchFamily="2" charset="-127"/>
                 <a:cs typeface="맑은 고딕" panose="020B0503020000020004" charset="-127"/>
                 <a:sym typeface="맑은 고딕" panose="020B0503020000020004" charset="-127"/>
               </a:rPr>
               <a:t>- 키 : 400cm</a:t>
             </a:r>
             <a:endParaRPr sz="1300">
-              <a:latin typeface="맑은 고딕" panose="020B0503020000020004" charset="-127"/>
-              <a:ea typeface="맑은 고딕" panose="020B0503020000020004" charset="-127"/>
+              <a:latin typeface="G마켓 산스 TTF Medium" panose="02000000000000000000" pitchFamily="2" charset="-127"/>
+              <a:ea typeface="G마켓 산스 TTF Medium" panose="02000000000000000000" pitchFamily="2" charset="-127"/>
               <a:cs typeface="맑은 고딕" panose="020B0503020000020004" charset="-127"/>
               <a:sym typeface="맑은 고딕" panose="020B0503020000020004" charset="-127"/>
             </a:endParaRPr>
           </a:p>
           <a:p>
             <a:pPr indent="0">
+              <a:lnSpc>
+                <a:spcPct val="150000"/>
+              </a:lnSpc>
               <a:spcBef>
                 <a:spcPts val="0"/>
               </a:spcBef>
@@ -4295,22 +4623,25 @@
             </a:pPr>
             <a:r>
               <a:rPr lang="en-US" sz="1300">
-                <a:latin typeface="맑은 고딕" panose="020B0503020000020004" charset="-127"/>
-                <a:ea typeface="맑은 고딕" panose="020B0503020000020004" charset="-127"/>
+                <a:latin typeface="G마켓 산스 TTF Medium" panose="02000000000000000000" pitchFamily="2" charset="-127"/>
+                <a:ea typeface="G마켓 산스 TTF Medium" panose="02000000000000000000" pitchFamily="2" charset="-127"/>
                 <a:cs typeface="맑은 고딕" panose="020B0503020000020004" charset="-127"/>
                 <a:sym typeface="맑은 고딕" panose="020B0503020000020004" charset="-127"/>
               </a:rPr>
               <a:t>- 이동속도 : 0.5km/h</a:t>
             </a:r>
             <a:endParaRPr sz="1300">
-              <a:latin typeface="맑은 고딕" panose="020B0503020000020004" charset="-127"/>
-              <a:ea typeface="맑은 고딕" panose="020B0503020000020004" charset="-127"/>
+              <a:latin typeface="G마켓 산스 TTF Medium" panose="02000000000000000000" pitchFamily="2" charset="-127"/>
+              <a:ea typeface="G마켓 산스 TTF Medium" panose="02000000000000000000" pitchFamily="2" charset="-127"/>
               <a:cs typeface="맑은 고딕" panose="020B0503020000020004" charset="-127"/>
               <a:sym typeface="맑은 고딕" panose="020B0503020000020004" charset="-127"/>
             </a:endParaRPr>
           </a:p>
           <a:p>
             <a:pPr indent="0">
+              <a:lnSpc>
+                <a:spcPct val="150000"/>
+              </a:lnSpc>
               <a:spcBef>
                 <a:spcPts val="0"/>
               </a:spcBef>
@@ -4321,8 +4652,8 @@
             </a:pPr>
             <a:r>
               <a:rPr lang="en-US" sz="1300">
-                <a:latin typeface="맑은 고딕" panose="020B0503020000020004" charset="-127"/>
-                <a:ea typeface="맑은 고딕" panose="020B0503020000020004" charset="-127"/>
+                <a:latin typeface="G마켓 산스 TTF Medium" panose="02000000000000000000" pitchFamily="2" charset="-127"/>
+                <a:ea typeface="G마켓 산스 TTF Medium" panose="02000000000000000000" pitchFamily="2" charset="-127"/>
                 <a:cs typeface="맑은 고딕" panose="020B0503020000020004" charset="-127"/>
                 <a:sym typeface="맑은 고딕" panose="020B0503020000020004" charset="-127"/>
               </a:rPr>
@@ -4331,6 +4662,9 @@
           </a:p>
           <a:p>
             <a:pPr indent="0">
+              <a:lnSpc>
+                <a:spcPct val="150000"/>
+              </a:lnSpc>
               <a:spcBef>
                 <a:spcPts val="0"/>
               </a:spcBef>
@@ -4341,8 +4675,8 @@
             </a:pPr>
             <a:r>
               <a:rPr lang="en-US" sz="1300">
-                <a:latin typeface="맑은 고딕" panose="020B0503020000020004" charset="-127"/>
-                <a:ea typeface="맑은 고딕" panose="020B0503020000020004" charset="-127"/>
+                <a:latin typeface="G마켓 산스 TTF Medium" panose="02000000000000000000" pitchFamily="2" charset="-127"/>
+                <a:ea typeface="G마켓 산스 TTF Medium" panose="02000000000000000000" pitchFamily="2" charset="-127"/>
                 <a:cs typeface="맑은 고딕" panose="020B0503020000020004" charset="-127"/>
                 <a:sym typeface="맑은 고딕" panose="020B0503020000020004" charset="-127"/>
               </a:rPr>
@@ -4350,8 +4684,8 @@
             </a:r>
             <a:r>
               <a:rPr lang="ko-KR" altLang="en-US" sz="1300">
-                <a:latin typeface="맑은 고딕" panose="020B0503020000020004" charset="-127"/>
-                <a:ea typeface="맑은 고딕" panose="020B0503020000020004" charset="-127"/>
+                <a:latin typeface="G마켓 산스 TTF Medium" panose="02000000000000000000" pitchFamily="2" charset="-127"/>
+                <a:ea typeface="G마켓 산스 TTF Medium" panose="02000000000000000000" pitchFamily="2" charset="-127"/>
                 <a:cs typeface="맑은 고딕" panose="020B0503020000020004" charset="-127"/>
                 <a:sym typeface="맑은 고딕" panose="020B0503020000020004" charset="-127"/>
               </a:rPr>
@@ -4359,22 +4693,25 @@
             </a:r>
             <a:r>
               <a:rPr lang="en-US" altLang="ko-KR" sz="1300">
-                <a:latin typeface="맑은 고딕" panose="020B0503020000020004" charset="-127"/>
-                <a:ea typeface="맑은 고딕" panose="020B0503020000020004" charset="-127"/>
+                <a:latin typeface="G마켓 산스 TTF Medium" panose="02000000000000000000" pitchFamily="2" charset="-127"/>
+                <a:ea typeface="G마켓 산스 TTF Medium" panose="02000000000000000000" pitchFamily="2" charset="-127"/>
                 <a:cs typeface="맑은 고딕" panose="020B0503020000020004" charset="-127"/>
                 <a:sym typeface="맑은 고딕" panose="020B0503020000020004" charset="-127"/>
               </a:rPr>
               <a:t> : 100</a:t>
             </a:r>
             <a:endParaRPr lang="en-US" sz="1300">
-              <a:latin typeface="맑은 고딕" panose="020B0503020000020004" charset="-127"/>
-              <a:ea typeface="맑은 고딕" panose="020B0503020000020004" charset="-127"/>
+              <a:latin typeface="G마켓 산스 TTF Medium" panose="02000000000000000000" pitchFamily="2" charset="-127"/>
+              <a:ea typeface="G마켓 산스 TTF Medium" panose="02000000000000000000" pitchFamily="2" charset="-127"/>
               <a:cs typeface="맑은 고딕" panose="020B0503020000020004" charset="-127"/>
               <a:sym typeface="맑은 고딕" panose="020B0503020000020004" charset="-127"/>
             </a:endParaRPr>
           </a:p>
           <a:p>
             <a:pPr indent="0">
+              <a:lnSpc>
+                <a:spcPct val="150000"/>
+              </a:lnSpc>
               <a:spcBef>
                 <a:spcPts val="0"/>
               </a:spcBef>
@@ -4385,8 +4722,8 @@
             </a:pPr>
             <a:r>
               <a:rPr lang="en-US" sz="1300">
-                <a:latin typeface="맑은 고딕" panose="020B0503020000020004" charset="-127"/>
-                <a:ea typeface="맑은 고딕" panose="020B0503020000020004" charset="-127"/>
+                <a:latin typeface="G마켓 산스 TTF Medium" panose="02000000000000000000" pitchFamily="2" charset="-127"/>
+                <a:ea typeface="G마켓 산스 TTF Medium" panose="02000000000000000000" pitchFamily="2" charset="-127"/>
                 <a:cs typeface="맑은 고딕" panose="020B0503020000020004" charset="-127"/>
                 <a:sym typeface="맑은 고딕" panose="020B0503020000020004" charset="-127"/>
               </a:rPr>
@@ -4394,8 +4731,8 @@
             </a:r>
             <a:r>
               <a:rPr lang="ko-KR" altLang="en-US" sz="1300">
-                <a:latin typeface="맑은 고딕" panose="020B0503020000020004" charset="-127"/>
-                <a:ea typeface="맑은 고딕" panose="020B0503020000020004" charset="-127"/>
+                <a:latin typeface="G마켓 산스 TTF Medium" panose="02000000000000000000" pitchFamily="2" charset="-127"/>
+                <a:ea typeface="G마켓 산스 TTF Medium" panose="02000000000000000000" pitchFamily="2" charset="-127"/>
                 <a:cs typeface="맑은 고딕" panose="020B0503020000020004" charset="-127"/>
                 <a:sym typeface="맑은 고딕" panose="020B0503020000020004" charset="-127"/>
               </a:rPr>
@@ -4403,8 +4740,8 @@
             </a:r>
             <a:r>
               <a:rPr lang="en-US" altLang="ko-KR" sz="1300">
-                <a:latin typeface="맑은 고딕" panose="020B0503020000020004" charset="-127"/>
-                <a:ea typeface="맑은 고딕" panose="020B0503020000020004" charset="-127"/>
+                <a:latin typeface="G마켓 산스 TTF Medium" panose="02000000000000000000" pitchFamily="2" charset="-127"/>
+                <a:ea typeface="G마켓 산스 TTF Medium" panose="02000000000000000000" pitchFamily="2" charset="-127"/>
                 <a:cs typeface="맑은 고딕" panose="020B0503020000020004" charset="-127"/>
                 <a:sym typeface="맑은 고딕" panose="020B0503020000020004" charset="-127"/>
               </a:rPr>
@@ -4412,8 +4749,8 @@
             </a:r>
             <a:r>
               <a:rPr lang="ko-KR" altLang="en-US" sz="1300">
-                <a:latin typeface="맑은 고딕" panose="020B0503020000020004" charset="-127"/>
-                <a:ea typeface="맑은 고딕" panose="020B0503020000020004" charset="-127"/>
+                <a:latin typeface="G마켓 산스 TTF Medium" panose="02000000000000000000" pitchFamily="2" charset="-127"/>
+                <a:ea typeface="G마켓 산스 TTF Medium" panose="02000000000000000000" pitchFamily="2" charset="-127"/>
                 <a:cs typeface="맑은 고딕" panose="020B0503020000020004" charset="-127"/>
                 <a:sym typeface="맑은 고딕" panose="020B0503020000020004" charset="-127"/>
               </a:rPr>
@@ -4421,8 +4758,8 @@
             </a:r>
             <a:r>
               <a:rPr lang="en-US" altLang="ko-KR" sz="1300">
-                <a:latin typeface="맑은 고딕" panose="020B0503020000020004" charset="-127"/>
-                <a:ea typeface="맑은 고딕" panose="020B0503020000020004" charset="-127"/>
+                <a:latin typeface="G마켓 산스 TTF Medium" panose="02000000000000000000" pitchFamily="2" charset="-127"/>
+                <a:ea typeface="G마켓 산스 TTF Medium" panose="02000000000000000000" pitchFamily="2" charset="-127"/>
                 <a:cs typeface="맑은 고딕" panose="020B0503020000020004" charset="-127"/>
                 <a:sym typeface="맑은 고딕" panose="020B0503020000020004" charset="-127"/>
               </a:rPr>
@@ -4430,8 +4767,8 @@
             </a:r>
             <a:r>
               <a:rPr lang="ko-KR" altLang="en-US" sz="1300">
-                <a:latin typeface="맑은 고딕" panose="020B0503020000020004" charset="-127"/>
-                <a:ea typeface="맑은 고딕" panose="020B0503020000020004" charset="-127"/>
+                <a:latin typeface="G마켓 산스 TTF Medium" panose="02000000000000000000" pitchFamily="2" charset="-127"/>
+                <a:ea typeface="G마켓 산스 TTF Medium" panose="02000000000000000000" pitchFamily="2" charset="-127"/>
                 <a:cs typeface="맑은 고딕" panose="020B0503020000020004" charset="-127"/>
                 <a:sym typeface="맑은 고딕" panose="020B0503020000020004" charset="-127"/>
               </a:rPr>
@@ -4439,8 +4776,8 @@
             </a:r>
             <a:r>
               <a:rPr lang="en-US" altLang="ko-KR" sz="1300">
-                <a:latin typeface="맑은 고딕" panose="020B0503020000020004" charset="-127"/>
-                <a:ea typeface="맑은 고딕" panose="020B0503020000020004" charset="-127"/>
+                <a:latin typeface="G마켓 산스 TTF Medium" panose="02000000000000000000" pitchFamily="2" charset="-127"/>
+                <a:ea typeface="G마켓 산스 TTF Medium" panose="02000000000000000000" pitchFamily="2" charset="-127"/>
                 <a:cs typeface="맑은 고딕" panose="020B0503020000020004" charset="-127"/>
                 <a:sym typeface="맑은 고딕" panose="020B0503020000020004" charset="-127"/>
               </a:rPr>
@@ -4448,8 +4785,8 @@
             </a:r>
             <a:r>
               <a:rPr lang="ko-KR" altLang="en-US" sz="1300">
-                <a:latin typeface="맑은 고딕" panose="020B0503020000020004" charset="-127"/>
-                <a:ea typeface="맑은 고딕" panose="020B0503020000020004" charset="-127"/>
+                <a:latin typeface="G마켓 산스 TTF Medium" panose="02000000000000000000" pitchFamily="2" charset="-127"/>
+                <a:ea typeface="G마켓 산스 TTF Medium" panose="02000000000000000000" pitchFamily="2" charset="-127"/>
                 <a:cs typeface="맑은 고딕" panose="020B0503020000020004" charset="-127"/>
                 <a:sym typeface="맑은 고딕" panose="020B0503020000020004" charset="-127"/>
               </a:rPr>
@@ -4457,8 +4794,8 @@
             </a:r>
             <a:r>
               <a:rPr lang="en-US" altLang="ko-KR" sz="1300">
-                <a:latin typeface="맑은 고딕" panose="020B0503020000020004" charset="-127"/>
-                <a:ea typeface="맑은 고딕" panose="020B0503020000020004" charset="-127"/>
+                <a:latin typeface="G마켓 산스 TTF Medium" panose="02000000000000000000" pitchFamily="2" charset="-127"/>
+                <a:ea typeface="G마켓 산스 TTF Medium" panose="02000000000000000000" pitchFamily="2" charset="-127"/>
                 <a:cs typeface="맑은 고딕" panose="020B0503020000020004" charset="-127"/>
                 <a:sym typeface="맑은 고딕" panose="020B0503020000020004" charset="-127"/>
               </a:rPr>
@@ -4466,16 +4803,16 @@
             </a:r>
             <a:r>
               <a:rPr lang="en-US" sz="1200">
-                <a:latin typeface="맑은 고딕" panose="020B0503020000020004" charset="-127"/>
-                <a:ea typeface="맑은 고딕" panose="020B0503020000020004" charset="-127"/>
+                <a:latin typeface="G마켓 산스 TTF Medium" panose="02000000000000000000" pitchFamily="2" charset="-127"/>
+                <a:ea typeface="G마켓 산스 TTF Medium" panose="02000000000000000000" pitchFamily="2" charset="-127"/>
                 <a:cs typeface="맑은 고딕" panose="020B0503020000020004" charset="-127"/>
                 <a:sym typeface="맑은 고딕" panose="020B0503020000020004" charset="-127"/>
               </a:rPr>
               <a:t> </a:t>
             </a:r>
             <a:endParaRPr sz="1200">
-              <a:latin typeface="맑은 고딕" panose="020B0503020000020004" charset="-127"/>
-              <a:ea typeface="맑은 고딕" panose="020B0503020000020004" charset="-127"/>
+              <a:latin typeface="G마켓 산스 TTF Medium" panose="02000000000000000000" pitchFamily="2" charset="-127"/>
+              <a:ea typeface="G마켓 산스 TTF Medium" panose="02000000000000000000" pitchFamily="2" charset="-127"/>
               <a:cs typeface="맑은 고딕" panose="020B0503020000020004" charset="-127"/>
               <a:sym typeface="맑은 고딕" panose="020B0503020000020004" charset="-127"/>
             </a:endParaRPr>
@@ -4516,7 +4853,7 @@
         </p:nvSpPr>
         <p:spPr>
           <a:xfrm>
-            <a:off x="2613025" y="4015105"/>
+            <a:off x="2613025" y="3902811"/>
             <a:ext cx="3111500" cy="2001520"/>
           </a:xfrm>
           <a:prstGeom prst="rect">
@@ -4534,6 +4871,9 @@
           <a:lstStyle/>
           <a:p>
             <a:pPr indent="0">
+              <a:lnSpc>
+                <a:spcPct val="150000"/>
+              </a:lnSpc>
               <a:spcBef>
                 <a:spcPts val="0"/>
               </a:spcBef>
@@ -4544,8 +4884,8 @@
             </a:pPr>
             <a:r>
               <a:rPr lang="en-US" sz="1200">
-                <a:latin typeface="맑은 고딕" panose="020B0503020000020004" charset="-127"/>
-                <a:ea typeface="맑은 고딕" panose="020B0503020000020004" charset="-127"/>
+                <a:latin typeface="G마켓 산스 TTF Medium" panose="02000000000000000000" pitchFamily="2" charset="-127"/>
+                <a:ea typeface="G마켓 산스 TTF Medium" panose="02000000000000000000" pitchFamily="2" charset="-127"/>
                 <a:cs typeface="맑은 고딕" panose="020B0503020000020004" charset="-127"/>
                 <a:sym typeface="맑은 고딕" panose="020B0503020000020004" charset="-127"/>
               </a:rPr>
@@ -4553,22 +4893,25 @@
             </a:r>
             <a:r>
               <a:rPr lang="ko-KR" altLang="en-US" sz="1600" b="1">
-                <a:latin typeface="맑은 고딕" panose="020B0503020000020004" charset="-127"/>
-                <a:ea typeface="맑은 고딕" panose="020B0503020000020004" charset="-127"/>
+                <a:latin typeface="G마켓 산스 TTF Medium" panose="02000000000000000000" pitchFamily="2" charset="-127"/>
+                <a:ea typeface="G마켓 산스 TTF Medium" panose="02000000000000000000" pitchFamily="2" charset="-127"/>
                 <a:cs typeface="맑은 고딕" panose="020B0503020000020004" charset="-127"/>
                 <a:sym typeface="맑은 고딕" panose="020B0503020000020004" charset="-127"/>
               </a:rPr>
               <a:t>스켈레톤</a:t>
             </a:r>
             <a:endParaRPr sz="1600" b="1">
-              <a:latin typeface="맑은 고딕" panose="020B0503020000020004" charset="-127"/>
-              <a:ea typeface="맑은 고딕" panose="020B0503020000020004" charset="-127"/>
+              <a:latin typeface="G마켓 산스 TTF Medium" panose="02000000000000000000" pitchFamily="2" charset="-127"/>
+              <a:ea typeface="G마켓 산스 TTF Medium" panose="02000000000000000000" pitchFamily="2" charset="-127"/>
               <a:cs typeface="맑은 고딕" panose="020B0503020000020004" charset="-127"/>
               <a:sym typeface="맑은 고딕" panose="020B0503020000020004" charset="-127"/>
             </a:endParaRPr>
           </a:p>
           <a:p>
             <a:pPr indent="0">
+              <a:lnSpc>
+                <a:spcPct val="150000"/>
+              </a:lnSpc>
               <a:spcBef>
                 <a:spcPts val="0"/>
               </a:spcBef>
@@ -4578,14 +4921,17 @@
               <a:buNone/>
             </a:pPr>
             <a:endParaRPr sz="1200">
-              <a:latin typeface="맑은 고딕" panose="020B0503020000020004" charset="-127"/>
-              <a:ea typeface="맑은 고딕" panose="020B0503020000020004" charset="-127"/>
+              <a:latin typeface="G마켓 산스 TTF Medium" panose="02000000000000000000" pitchFamily="2" charset="-127"/>
+              <a:ea typeface="G마켓 산스 TTF Medium" panose="02000000000000000000" pitchFamily="2" charset="-127"/>
               <a:cs typeface="맑은 고딕" panose="020B0503020000020004" charset="-127"/>
               <a:sym typeface="맑은 고딕" panose="020B0503020000020004" charset="-127"/>
             </a:endParaRPr>
           </a:p>
           <a:p>
             <a:pPr indent="0">
+              <a:lnSpc>
+                <a:spcPct val="150000"/>
+              </a:lnSpc>
               <a:spcBef>
                 <a:spcPts val="0"/>
               </a:spcBef>
@@ -4596,22 +4942,25 @@
             </a:pPr>
             <a:r>
               <a:rPr lang="en-US" sz="1300">
-                <a:latin typeface="맑은 고딕" panose="020B0503020000020004" charset="-127"/>
-                <a:ea typeface="맑은 고딕" panose="020B0503020000020004" charset="-127"/>
+                <a:latin typeface="G마켓 산스 TTF Medium" panose="02000000000000000000" pitchFamily="2" charset="-127"/>
+                <a:ea typeface="G마켓 산스 TTF Medium" panose="02000000000000000000" pitchFamily="2" charset="-127"/>
                 <a:cs typeface="맑은 고딕" panose="020B0503020000020004" charset="-127"/>
                 <a:sym typeface="맑은 고딕" panose="020B0503020000020004" charset="-127"/>
               </a:rPr>
               <a:t>- 키 : 160cm</a:t>
             </a:r>
             <a:endParaRPr sz="1300">
-              <a:latin typeface="맑은 고딕" panose="020B0503020000020004" charset="-127"/>
-              <a:ea typeface="맑은 고딕" panose="020B0503020000020004" charset="-127"/>
+              <a:latin typeface="G마켓 산스 TTF Medium" panose="02000000000000000000" pitchFamily="2" charset="-127"/>
+              <a:ea typeface="G마켓 산스 TTF Medium" panose="02000000000000000000" pitchFamily="2" charset="-127"/>
               <a:cs typeface="맑은 고딕" panose="020B0503020000020004" charset="-127"/>
               <a:sym typeface="맑은 고딕" panose="020B0503020000020004" charset="-127"/>
             </a:endParaRPr>
           </a:p>
           <a:p>
             <a:pPr indent="0">
+              <a:lnSpc>
+                <a:spcPct val="150000"/>
+              </a:lnSpc>
               <a:spcBef>
                 <a:spcPts val="0"/>
               </a:spcBef>
@@ -4622,22 +4971,25 @@
             </a:pPr>
             <a:r>
               <a:rPr lang="en-US" sz="1300">
-                <a:latin typeface="맑은 고딕" panose="020B0503020000020004" charset="-127"/>
-                <a:ea typeface="맑은 고딕" panose="020B0503020000020004" charset="-127"/>
+                <a:latin typeface="G마켓 산스 TTF Medium" panose="02000000000000000000" pitchFamily="2" charset="-127"/>
+                <a:ea typeface="G마켓 산스 TTF Medium" panose="02000000000000000000" pitchFamily="2" charset="-127"/>
                 <a:cs typeface="맑은 고딕" panose="020B0503020000020004" charset="-127"/>
                 <a:sym typeface="맑은 고딕" panose="020B0503020000020004" charset="-127"/>
               </a:rPr>
               <a:t>- 이동속도 : 1km/h</a:t>
             </a:r>
             <a:endParaRPr sz="1300">
-              <a:latin typeface="맑은 고딕" panose="020B0503020000020004" charset="-127"/>
-              <a:ea typeface="맑은 고딕" panose="020B0503020000020004" charset="-127"/>
+              <a:latin typeface="G마켓 산스 TTF Medium" panose="02000000000000000000" pitchFamily="2" charset="-127"/>
+              <a:ea typeface="G마켓 산스 TTF Medium" panose="02000000000000000000" pitchFamily="2" charset="-127"/>
               <a:cs typeface="맑은 고딕" panose="020B0503020000020004" charset="-127"/>
               <a:sym typeface="맑은 고딕" panose="020B0503020000020004" charset="-127"/>
             </a:endParaRPr>
           </a:p>
           <a:p>
             <a:pPr indent="0">
+              <a:lnSpc>
+                <a:spcPct val="150000"/>
+              </a:lnSpc>
               <a:spcBef>
                 <a:spcPts val="0"/>
               </a:spcBef>
@@ -4648,8 +5000,8 @@
             </a:pPr>
             <a:r>
               <a:rPr lang="en-US" sz="1300">
-                <a:latin typeface="맑은 고딕" panose="020B0503020000020004" charset="-127"/>
-                <a:ea typeface="맑은 고딕" panose="020B0503020000020004" charset="-127"/>
+                <a:latin typeface="G마켓 산스 TTF Medium" panose="02000000000000000000" pitchFamily="2" charset="-127"/>
+                <a:ea typeface="G마켓 산스 TTF Medium" panose="02000000000000000000" pitchFamily="2" charset="-127"/>
                 <a:cs typeface="맑은 고딕" panose="020B0503020000020004" charset="-127"/>
                 <a:sym typeface="맑은 고딕" panose="020B0503020000020004" charset="-127"/>
               </a:rPr>
@@ -4658,6 +5010,9 @@
           </a:p>
           <a:p>
             <a:pPr indent="0">
+              <a:lnSpc>
+                <a:spcPct val="150000"/>
+              </a:lnSpc>
               <a:spcBef>
                 <a:spcPts val="0"/>
               </a:spcBef>
@@ -4668,8 +5023,8 @@
             </a:pPr>
             <a:r>
               <a:rPr lang="en-US" sz="1300">
-                <a:latin typeface="맑은 고딕" panose="020B0503020000020004" charset="-127"/>
-                <a:ea typeface="맑은 고딕" panose="020B0503020000020004" charset="-127"/>
+                <a:latin typeface="G마켓 산스 TTF Medium" panose="02000000000000000000" pitchFamily="2" charset="-127"/>
+                <a:ea typeface="G마켓 산스 TTF Medium" panose="02000000000000000000" pitchFamily="2" charset="-127"/>
                 <a:cs typeface="맑은 고딕" panose="020B0503020000020004" charset="-127"/>
                 <a:sym typeface="맑은 고딕" panose="020B0503020000020004" charset="-127"/>
               </a:rPr>
@@ -4677,8 +5032,8 @@
             </a:r>
             <a:r>
               <a:rPr lang="ko-KR" altLang="en-US" sz="1300">
-                <a:latin typeface="맑은 고딕" panose="020B0503020000020004" charset="-127"/>
-                <a:ea typeface="맑은 고딕" panose="020B0503020000020004" charset="-127"/>
+                <a:latin typeface="G마켓 산스 TTF Medium" panose="02000000000000000000" pitchFamily="2" charset="-127"/>
+                <a:ea typeface="G마켓 산스 TTF Medium" panose="02000000000000000000" pitchFamily="2" charset="-127"/>
                 <a:cs typeface="맑은 고딕" panose="020B0503020000020004" charset="-127"/>
                 <a:sym typeface="맑은 고딕" panose="020B0503020000020004" charset="-127"/>
               </a:rPr>
@@ -4686,8 +5041,8 @@
             </a:r>
             <a:r>
               <a:rPr lang="en-US" altLang="ko-KR" sz="1300">
-                <a:latin typeface="맑은 고딕" panose="020B0503020000020004" charset="-127"/>
-                <a:ea typeface="맑은 고딕" panose="020B0503020000020004" charset="-127"/>
+                <a:latin typeface="G마켓 산스 TTF Medium" panose="02000000000000000000" pitchFamily="2" charset="-127"/>
+                <a:ea typeface="G마켓 산스 TTF Medium" panose="02000000000000000000" pitchFamily="2" charset="-127"/>
                 <a:cs typeface="맑은 고딕" panose="020B0503020000020004" charset="-127"/>
                 <a:sym typeface="맑은 고딕" panose="020B0503020000020004" charset="-127"/>
               </a:rPr>
@@ -4695,8 +5050,8 @@
             </a:r>
             <a:r>
               <a:rPr lang="ko-KR" altLang="en-US" sz="1300">
-                <a:latin typeface="맑은 고딕" panose="020B0503020000020004" charset="-127"/>
-                <a:ea typeface="맑은 고딕" panose="020B0503020000020004" charset="-127"/>
+                <a:latin typeface="G마켓 산스 TTF Medium" panose="02000000000000000000" pitchFamily="2" charset="-127"/>
+                <a:ea typeface="G마켓 산스 TTF Medium" panose="02000000000000000000" pitchFamily="2" charset="-127"/>
                 <a:cs typeface="맑은 고딕" panose="020B0503020000020004" charset="-127"/>
                 <a:sym typeface="맑은 고딕" panose="020B0503020000020004" charset="-127"/>
               </a:rPr>
@@ -4704,8 +5059,8 @@
             </a:r>
             <a:r>
               <a:rPr lang="en-US" altLang="ko-KR" sz="1300">
-                <a:latin typeface="맑은 고딕" panose="020B0503020000020004" charset="-127"/>
-                <a:ea typeface="맑은 고딕" panose="020B0503020000020004" charset="-127"/>
+                <a:latin typeface="G마켓 산스 TTF Medium" panose="02000000000000000000" pitchFamily="2" charset="-127"/>
+                <a:ea typeface="G마켓 산스 TTF Medium" panose="02000000000000000000" pitchFamily="2" charset="-127"/>
                 <a:cs typeface="맑은 고딕" panose="020B0503020000020004" charset="-127"/>
                 <a:sym typeface="맑은 고딕" panose="020B0503020000020004" charset="-127"/>
               </a:rPr>
@@ -4713,22 +5068,25 @@
             </a:r>
             <a:r>
               <a:rPr lang="ko-KR" altLang="en-US" sz="1300">
-                <a:latin typeface="맑은 고딕" panose="020B0503020000020004" charset="-127"/>
-                <a:ea typeface="맑은 고딕" panose="020B0503020000020004" charset="-127"/>
+                <a:latin typeface="G마켓 산스 TTF Medium" panose="02000000000000000000" pitchFamily="2" charset="-127"/>
+                <a:ea typeface="G마켓 산스 TTF Medium" panose="02000000000000000000" pitchFamily="2" charset="-127"/>
                 <a:cs typeface="맑은 고딕" panose="020B0503020000020004" charset="-127"/>
                 <a:sym typeface="맑은 고딕" panose="020B0503020000020004" charset="-127"/>
               </a:rPr>
               <a:t>번</a:t>
             </a:r>
             <a:endParaRPr sz="1300">
-              <a:latin typeface="맑은 고딕" panose="020B0503020000020004" charset="-127"/>
-              <a:ea typeface="맑은 고딕" panose="020B0503020000020004" charset="-127"/>
+              <a:latin typeface="G마켓 산스 TTF Medium" panose="02000000000000000000" pitchFamily="2" charset="-127"/>
+              <a:ea typeface="G마켓 산스 TTF Medium" panose="02000000000000000000" pitchFamily="2" charset="-127"/>
               <a:cs typeface="맑은 고딕" panose="020B0503020000020004" charset="-127"/>
               <a:sym typeface="맑은 고딕" panose="020B0503020000020004" charset="-127"/>
             </a:endParaRPr>
           </a:p>
           <a:p>
             <a:pPr indent="0">
+              <a:lnSpc>
+                <a:spcPct val="150000"/>
+              </a:lnSpc>
               <a:spcBef>
                 <a:spcPts val="0"/>
               </a:spcBef>
@@ -4739,22 +5097,25 @@
             </a:pPr>
             <a:r>
               <a:rPr lang="en-US" sz="1300">
-                <a:latin typeface="맑은 고딕" panose="020B0503020000020004" charset="-127"/>
-                <a:ea typeface="맑은 고딕" panose="020B0503020000020004" charset="-127"/>
+                <a:latin typeface="G마켓 산스 TTF Medium" panose="02000000000000000000" pitchFamily="2" charset="-127"/>
+                <a:ea typeface="G마켓 산스 TTF Medium" panose="02000000000000000000" pitchFamily="2" charset="-127"/>
                 <a:cs typeface="맑은 고딕" panose="020B0503020000020004" charset="-127"/>
                 <a:sym typeface="맑은 고딕" panose="020B0503020000020004" charset="-127"/>
               </a:rPr>
               <a:t>- 데미지 : 30</a:t>
             </a:r>
             <a:endParaRPr sz="1300">
-              <a:latin typeface="맑은 고딕" panose="020B0503020000020004" charset="-127"/>
-              <a:ea typeface="맑은 고딕" panose="020B0503020000020004" charset="-127"/>
+              <a:latin typeface="G마켓 산스 TTF Medium" panose="02000000000000000000" pitchFamily="2" charset="-127"/>
+              <a:ea typeface="G마켓 산스 TTF Medium" panose="02000000000000000000" pitchFamily="2" charset="-127"/>
               <a:cs typeface="맑은 고딕" panose="020B0503020000020004" charset="-127"/>
               <a:sym typeface="맑은 고딕" panose="020B0503020000020004" charset="-127"/>
             </a:endParaRPr>
           </a:p>
           <a:p>
             <a:pPr indent="0">
+              <a:lnSpc>
+                <a:spcPct val="150000"/>
+              </a:lnSpc>
               <a:spcBef>
                 <a:spcPts val="0"/>
               </a:spcBef>
@@ -4765,8 +5126,8 @@
             </a:pPr>
             <a:r>
               <a:rPr lang="en-US" sz="1300">
-                <a:latin typeface="맑은 고딕" panose="020B0503020000020004" charset="-127"/>
-                <a:ea typeface="맑은 고딕" panose="020B0503020000020004" charset="-127"/>
+                <a:latin typeface="G마켓 산스 TTF Medium" panose="02000000000000000000" pitchFamily="2" charset="-127"/>
+                <a:ea typeface="G마켓 산스 TTF Medium" panose="02000000000000000000" pitchFamily="2" charset="-127"/>
                 <a:cs typeface="맑은 고딕" panose="020B0503020000020004" charset="-127"/>
                 <a:sym typeface="맑은 고딕" panose="020B0503020000020004" charset="-127"/>
               </a:rPr>
@@ -4774,8 +5135,8 @@
             </a:r>
             <a:r>
               <a:rPr lang="ko-KR" altLang="en-US" sz="1300">
-                <a:latin typeface="맑은 고딕" panose="020B0503020000020004" charset="-127"/>
-                <a:ea typeface="맑은 고딕" panose="020B0503020000020004" charset="-127"/>
+                <a:latin typeface="G마켓 산스 TTF Medium" panose="02000000000000000000" pitchFamily="2" charset="-127"/>
+                <a:ea typeface="G마켓 산스 TTF Medium" panose="02000000000000000000" pitchFamily="2" charset="-127"/>
                 <a:cs typeface="맑은 고딕" panose="020B0503020000020004" charset="-127"/>
                 <a:sym typeface="맑은 고딕" panose="020B0503020000020004" charset="-127"/>
               </a:rPr>
@@ -4783,8 +5144,8 @@
             </a:r>
             <a:r>
               <a:rPr lang="en-US" altLang="ko-KR" sz="1300">
-                <a:latin typeface="맑은 고딕" panose="020B0503020000020004" charset="-127"/>
-                <a:ea typeface="맑은 고딕" panose="020B0503020000020004" charset="-127"/>
+                <a:latin typeface="G마켓 산스 TTF Medium" panose="02000000000000000000" pitchFamily="2" charset="-127"/>
+                <a:ea typeface="G마켓 산스 TTF Medium" panose="02000000000000000000" pitchFamily="2" charset="-127"/>
                 <a:cs typeface="맑은 고딕" panose="020B0503020000020004" charset="-127"/>
                 <a:sym typeface="맑은 고딕" panose="020B0503020000020004" charset="-127"/>
               </a:rPr>
@@ -4792,8 +5153,8 @@
             </a:r>
             <a:r>
               <a:rPr lang="ko-KR" altLang="en-US" sz="1300">
-                <a:latin typeface="맑은 고딕" panose="020B0503020000020004" charset="-127"/>
-                <a:ea typeface="맑은 고딕" panose="020B0503020000020004" charset="-127"/>
+                <a:latin typeface="G마켓 산스 TTF Medium" panose="02000000000000000000" pitchFamily="2" charset="-127"/>
+                <a:ea typeface="G마켓 산스 TTF Medium" panose="02000000000000000000" pitchFamily="2" charset="-127"/>
                 <a:cs typeface="맑은 고딕" panose="020B0503020000020004" charset="-127"/>
                 <a:sym typeface="맑은 고딕" panose="020B0503020000020004" charset="-127"/>
               </a:rPr>
@@ -4801,8 +5162,8 @@
             </a:r>
             <a:r>
               <a:rPr lang="en-US" altLang="ko-KR" sz="1300">
-                <a:latin typeface="맑은 고딕" panose="020B0503020000020004" charset="-127"/>
-                <a:ea typeface="맑은 고딕" panose="020B0503020000020004" charset="-127"/>
+                <a:latin typeface="G마켓 산스 TTF Medium" panose="02000000000000000000" pitchFamily="2" charset="-127"/>
+                <a:ea typeface="G마켓 산스 TTF Medium" panose="02000000000000000000" pitchFamily="2" charset="-127"/>
                 <a:cs typeface="맑은 고딕" panose="020B0503020000020004" charset="-127"/>
                 <a:sym typeface="맑은 고딕" panose="020B0503020000020004" charset="-127"/>
               </a:rPr>
@@ -4810,8 +5171,8 @@
             </a:r>
             <a:r>
               <a:rPr lang="ko-KR" altLang="en-US" sz="1300">
-                <a:latin typeface="맑은 고딕" panose="020B0503020000020004" charset="-127"/>
-                <a:ea typeface="맑은 고딕" panose="020B0503020000020004" charset="-127"/>
+                <a:latin typeface="G마켓 산스 TTF Medium" panose="02000000000000000000" pitchFamily="2" charset="-127"/>
+                <a:ea typeface="G마켓 산스 TTF Medium" panose="02000000000000000000" pitchFamily="2" charset="-127"/>
                 <a:cs typeface="맑은 고딕" panose="020B0503020000020004" charset="-127"/>
                 <a:sym typeface="맑은 고딕" panose="020B0503020000020004" charset="-127"/>
               </a:rPr>
@@ -4819,8 +5180,8 @@
             </a:r>
             <a:r>
               <a:rPr lang="en-US" altLang="ko-KR" sz="1300">
-                <a:latin typeface="맑은 고딕" panose="020B0503020000020004" charset="-127"/>
-                <a:ea typeface="맑은 고딕" panose="020B0503020000020004" charset="-127"/>
+                <a:latin typeface="G마켓 산스 TTF Medium" panose="02000000000000000000" pitchFamily="2" charset="-127"/>
+                <a:ea typeface="G마켓 산스 TTF Medium" panose="02000000000000000000" pitchFamily="2" charset="-127"/>
                 <a:cs typeface="맑은 고딕" panose="020B0503020000020004" charset="-127"/>
                 <a:sym typeface="맑은 고딕" panose="020B0503020000020004" charset="-127"/>
               </a:rPr>
@@ -4828,16 +5189,16 @@
             </a:r>
             <a:r>
               <a:rPr lang="en-US" sz="1200">
-                <a:latin typeface="맑은 고딕" panose="020B0503020000020004" charset="-127"/>
-                <a:ea typeface="맑은 고딕" panose="020B0503020000020004" charset="-127"/>
+                <a:latin typeface="G마켓 산스 TTF Medium" panose="02000000000000000000" pitchFamily="2" charset="-127"/>
+                <a:ea typeface="G마켓 산스 TTF Medium" panose="02000000000000000000" pitchFamily="2" charset="-127"/>
                 <a:cs typeface="맑은 고딕" panose="020B0503020000020004" charset="-127"/>
                 <a:sym typeface="맑은 고딕" panose="020B0503020000020004" charset="-127"/>
               </a:rPr>
               <a:t> </a:t>
             </a:r>
             <a:endParaRPr sz="1200">
-              <a:latin typeface="맑은 고딕" panose="020B0503020000020004" charset="-127"/>
-              <a:ea typeface="맑은 고딕" panose="020B0503020000020004" charset="-127"/>
+              <a:latin typeface="G마켓 산스 TTF Medium" panose="02000000000000000000" pitchFamily="2" charset="-127"/>
+              <a:ea typeface="G마켓 산스 TTF Medium" panose="02000000000000000000" pitchFamily="2" charset="-127"/>
               <a:cs typeface="맑은 고딕" panose="020B0503020000020004" charset="-127"/>
               <a:sym typeface="맑은 고딕" panose="020B0503020000020004" charset="-127"/>
             </a:endParaRPr>
@@ -4852,7 +5213,7 @@
 </p:sld>
 </file>
 
-<file path=ppt/slides/slide12.xml><?xml version="1.0" encoding="utf-8"?>
+<file path=ppt/slides/slide13.xml><?xml version="1.0" encoding="utf-8"?>
 <p:sld xmlns:a="http://schemas.openxmlformats.org/drawingml/2006/main" xmlns:r="http://schemas.openxmlformats.org/officeDocument/2006/relationships" xmlns:p="http://schemas.openxmlformats.org/presentationml/2006/main">
   <p:cSld>
     <p:bg>
@@ -7733,7 +8094,7 @@
 </p:sld>
 </file>
 
-<file path=ppt/slides/slide13.xml><?xml version="1.0" encoding="utf-8"?>
+<file path=ppt/slides/slide14.xml><?xml version="1.0" encoding="utf-8"?>
 <p:sld xmlns:a="http://schemas.openxmlformats.org/drawingml/2006/main" xmlns:r="http://schemas.openxmlformats.org/officeDocument/2006/relationships" xmlns:p="http://schemas.openxmlformats.org/presentationml/2006/main">
   <p:cSld>
     <p:bg>
@@ -7903,7 +8264,7 @@
         </p:blipFill>
         <p:spPr bwMode="auto">
           <a:xfrm>
-            <a:off x="1919037" y="925976"/>
+            <a:off x="1919037" y="855638"/>
             <a:ext cx="8353926" cy="3985142"/>
           </a:xfrm>
           <a:prstGeom prst="rect">
@@ -7929,7 +8290,7 @@
         </p:nvSpPr>
         <p:spPr>
           <a:xfrm>
-            <a:off x="3571970" y="2317827"/>
+            <a:off x="3571970" y="2247489"/>
             <a:ext cx="504000" cy="504000"/>
           </a:xfrm>
           <a:prstGeom prst="roundRect">
@@ -7977,7 +8338,7 @@
         </p:nvSpPr>
         <p:spPr>
           <a:xfrm>
-            <a:off x="3175730" y="2831987"/>
+            <a:off x="3175730" y="2761649"/>
             <a:ext cx="504000" cy="504000"/>
           </a:xfrm>
           <a:prstGeom prst="roundRect">
@@ -8025,7 +8386,7 @@
         </p:nvSpPr>
         <p:spPr>
           <a:xfrm>
-            <a:off x="3716750" y="2831987"/>
+            <a:off x="3716750" y="2761649"/>
             <a:ext cx="504000" cy="504000"/>
           </a:xfrm>
           <a:prstGeom prst="roundRect">
@@ -8073,7 +8434,7 @@
         </p:nvSpPr>
         <p:spPr>
           <a:xfrm>
-            <a:off x="4257770" y="2831987"/>
+            <a:off x="4257770" y="2761649"/>
             <a:ext cx="504000" cy="504000"/>
           </a:xfrm>
           <a:prstGeom prst="roundRect">
@@ -8121,7 +8482,7 @@
         </p:nvSpPr>
         <p:spPr>
           <a:xfrm>
-            <a:off x="2779490" y="1800492"/>
+            <a:off x="2779490" y="1730154"/>
             <a:ext cx="504000" cy="504000"/>
           </a:xfrm>
           <a:prstGeom prst="roundRect">
@@ -8169,7 +8530,7 @@
         </p:nvSpPr>
         <p:spPr>
           <a:xfrm>
-            <a:off x="3316160" y="1799846"/>
+            <a:off x="3316160" y="1729508"/>
             <a:ext cx="504000" cy="504000"/>
           </a:xfrm>
           <a:prstGeom prst="roundRect">
@@ -8217,7 +8578,7 @@
         </p:nvSpPr>
         <p:spPr>
           <a:xfrm>
-            <a:off x="3850925" y="1799846"/>
+            <a:off x="3850925" y="1729508"/>
             <a:ext cx="504000" cy="504000"/>
           </a:xfrm>
           <a:prstGeom prst="roundRect">
@@ -8265,8 +8626,8 @@
         </p:nvSpPr>
         <p:spPr>
           <a:xfrm>
-            <a:off x="1919037" y="4670316"/>
-            <a:ext cx="8518359" cy="1438855"/>
+            <a:off x="2243128" y="4498934"/>
+            <a:ext cx="8518359" cy="2177519"/>
           </a:xfrm>
           <a:prstGeom prst="rect">
             <a:avLst/>
@@ -8285,70 +8646,70 @@
               </a:lnSpc>
             </a:pPr>
             <a:r>
-              <a:rPr lang="ko-KR" altLang="en-US" sz="2000" dirty="0">
+              <a:rPr lang="ko-KR" altLang="en-US" dirty="0">
                 <a:latin typeface="G마켓 산스 TTF Light" panose="02000000000000000000" pitchFamily="2" charset="-127"/>
                 <a:ea typeface="G마켓 산스 TTF Light" panose="02000000000000000000" pitchFamily="2" charset="-127"/>
               </a:rPr>
               <a:t>플레이어 이동</a:t>
             </a:r>
             <a:r>
-              <a:rPr lang="en-US" altLang="ko-KR" sz="2000" dirty="0">
+              <a:rPr lang="en-US" altLang="ko-KR" dirty="0">
                 <a:latin typeface="G마켓 산스 TTF Light" panose="02000000000000000000" pitchFamily="2" charset="-127"/>
                 <a:ea typeface="G마켓 산스 TTF Light" panose="02000000000000000000" pitchFamily="2" charset="-127"/>
               </a:rPr>
               <a:t>	| W, A, S, D (</a:t>
             </a:r>
             <a:r>
-              <a:rPr lang="ko-KR" altLang="en-US" sz="2000" dirty="0">
+              <a:rPr lang="ko-KR" altLang="en-US" dirty="0">
                 <a:latin typeface="G마켓 산스 TTF Light" panose="02000000000000000000" pitchFamily="2" charset="-127"/>
                 <a:ea typeface="G마켓 산스 TTF Light" panose="02000000000000000000" pitchFamily="2" charset="-127"/>
               </a:rPr>
               <a:t>상</a:t>
             </a:r>
             <a:r>
-              <a:rPr lang="en-US" altLang="ko-KR" sz="2000" dirty="0">
+              <a:rPr lang="en-US" altLang="ko-KR" dirty="0">
                 <a:latin typeface="G마켓 산스 TTF Light" panose="02000000000000000000" pitchFamily="2" charset="-127"/>
                 <a:ea typeface="G마켓 산스 TTF Light" panose="02000000000000000000" pitchFamily="2" charset="-127"/>
               </a:rPr>
               <a:t>, </a:t>
             </a:r>
             <a:r>
-              <a:rPr lang="ko-KR" altLang="en-US" sz="2000" dirty="0">
+              <a:rPr lang="ko-KR" altLang="en-US" dirty="0">
                 <a:latin typeface="G마켓 산스 TTF Light" panose="02000000000000000000" pitchFamily="2" charset="-127"/>
                 <a:ea typeface="G마켓 산스 TTF Light" panose="02000000000000000000" pitchFamily="2" charset="-127"/>
               </a:rPr>
               <a:t>좌</a:t>
             </a:r>
             <a:r>
-              <a:rPr lang="en-US" altLang="ko-KR" sz="2000" dirty="0">
+              <a:rPr lang="en-US" altLang="ko-KR" dirty="0">
                 <a:latin typeface="G마켓 산스 TTF Light" panose="02000000000000000000" pitchFamily="2" charset="-127"/>
                 <a:ea typeface="G마켓 산스 TTF Light" panose="02000000000000000000" pitchFamily="2" charset="-127"/>
               </a:rPr>
               <a:t>, </a:t>
             </a:r>
             <a:r>
-              <a:rPr lang="ko-KR" altLang="en-US" sz="2000" dirty="0">
+              <a:rPr lang="ko-KR" altLang="en-US" dirty="0">
                 <a:latin typeface="G마켓 산스 TTF Light" panose="02000000000000000000" pitchFamily="2" charset="-127"/>
                 <a:ea typeface="G마켓 산스 TTF Light" panose="02000000000000000000" pitchFamily="2" charset="-127"/>
               </a:rPr>
               <a:t>하</a:t>
             </a:r>
             <a:r>
-              <a:rPr lang="en-US" altLang="ko-KR" sz="2000" dirty="0">
+              <a:rPr lang="en-US" altLang="ko-KR" dirty="0">
                 <a:latin typeface="G마켓 산스 TTF Light" panose="02000000000000000000" pitchFamily="2" charset="-127"/>
                 <a:ea typeface="G마켓 산스 TTF Light" panose="02000000000000000000" pitchFamily="2" charset="-127"/>
               </a:rPr>
               <a:t>, </a:t>
             </a:r>
             <a:r>
-              <a:rPr lang="ko-KR" altLang="en-US" sz="2000" dirty="0">
+              <a:rPr lang="ko-KR" altLang="en-US" dirty="0">
                 <a:latin typeface="G마켓 산스 TTF Light" panose="02000000000000000000" pitchFamily="2" charset="-127"/>
                 <a:ea typeface="G마켓 산스 TTF Light" panose="02000000000000000000" pitchFamily="2" charset="-127"/>
               </a:rPr>
               <a:t>우 </a:t>
             </a:r>
             <a:r>
-              <a:rPr lang="en-US" altLang="ko-KR" sz="2000" dirty="0">
+              <a:rPr lang="en-US" altLang="ko-KR" dirty="0">
                 <a:latin typeface="G마켓 산스 TTF Light" panose="02000000000000000000" pitchFamily="2" charset="-127"/>
                 <a:ea typeface="G마켓 산스 TTF Light" panose="02000000000000000000" pitchFamily="2" charset="-127"/>
               </a:rPr>
@@ -8362,70 +8723,70 @@
               </a:lnSpc>
             </a:pPr>
             <a:r>
-              <a:rPr lang="ko-KR" altLang="en-US" sz="2000" dirty="0">
+              <a:rPr lang="ko-KR" altLang="en-US" dirty="0">
                 <a:latin typeface="G마켓 산스 TTF Light" panose="02000000000000000000" pitchFamily="2" charset="-127"/>
                 <a:ea typeface="G마켓 산스 TTF Light" panose="02000000000000000000" pitchFamily="2" charset="-127"/>
               </a:rPr>
               <a:t>무기 변경</a:t>
             </a:r>
             <a:r>
-              <a:rPr lang="en-US" altLang="ko-KR" sz="2000" dirty="0">
+              <a:rPr lang="en-US" altLang="ko-KR" dirty="0">
                 <a:latin typeface="G마켓 산스 TTF Light" panose="02000000000000000000" pitchFamily="2" charset="-127"/>
                 <a:ea typeface="G마켓 산스 TTF Light" panose="02000000000000000000" pitchFamily="2" charset="-127"/>
               </a:rPr>
               <a:t>		| 1, 2, 3 (1</a:t>
             </a:r>
             <a:r>
-              <a:rPr lang="ko-KR" altLang="en-US" sz="2000" dirty="0">
+              <a:rPr lang="ko-KR" altLang="en-US" dirty="0">
                 <a:latin typeface="G마켓 산스 TTF Light" panose="02000000000000000000" pitchFamily="2" charset="-127"/>
                 <a:ea typeface="G마켓 산스 TTF Light" panose="02000000000000000000" pitchFamily="2" charset="-127"/>
               </a:rPr>
               <a:t>을 누르면 </a:t>
             </a:r>
             <a:r>
-              <a:rPr lang="en-US" altLang="ko-KR" sz="2000" dirty="0">
+              <a:rPr lang="en-US" altLang="ko-KR" dirty="0">
                 <a:latin typeface="G마켓 산스 TTF Light" panose="02000000000000000000" pitchFamily="2" charset="-127"/>
                 <a:ea typeface="G마켓 산스 TTF Light" panose="02000000000000000000" pitchFamily="2" charset="-127"/>
               </a:rPr>
               <a:t>1</a:t>
             </a:r>
             <a:r>
-              <a:rPr lang="ko-KR" altLang="en-US" sz="2000" dirty="0">
+              <a:rPr lang="ko-KR" altLang="en-US" dirty="0">
                 <a:latin typeface="G마켓 산스 TTF Light" panose="02000000000000000000" pitchFamily="2" charset="-127"/>
                 <a:ea typeface="G마켓 산스 TTF Light" panose="02000000000000000000" pitchFamily="2" charset="-127"/>
               </a:rPr>
               <a:t>번 무기</a:t>
             </a:r>
             <a:r>
-              <a:rPr lang="en-US" altLang="ko-KR" sz="2000" dirty="0">
+              <a:rPr lang="en-US" altLang="ko-KR" dirty="0">
                 <a:latin typeface="G마켓 산스 TTF Light" panose="02000000000000000000" pitchFamily="2" charset="-127"/>
                 <a:ea typeface="G마켓 산스 TTF Light" panose="02000000000000000000" pitchFamily="2" charset="-127"/>
               </a:rPr>
               <a:t>, 2</a:t>
             </a:r>
             <a:r>
-              <a:rPr lang="ko-KR" altLang="en-US" sz="2000" dirty="0">
+              <a:rPr lang="ko-KR" altLang="en-US" dirty="0">
                 <a:latin typeface="G마켓 산스 TTF Light" panose="02000000000000000000" pitchFamily="2" charset="-127"/>
                 <a:ea typeface="G마켓 산스 TTF Light" panose="02000000000000000000" pitchFamily="2" charset="-127"/>
               </a:rPr>
               <a:t>를 누르면 </a:t>
             </a:r>
             <a:r>
-              <a:rPr lang="en-US" altLang="ko-KR" sz="2000" dirty="0">
+              <a:rPr lang="en-US" altLang="ko-KR" dirty="0">
                 <a:latin typeface="G마켓 산스 TTF Light" panose="02000000000000000000" pitchFamily="2" charset="-127"/>
                 <a:ea typeface="G마켓 산스 TTF Light" panose="02000000000000000000" pitchFamily="2" charset="-127"/>
               </a:rPr>
               <a:t>2</a:t>
             </a:r>
             <a:r>
-              <a:rPr lang="ko-KR" altLang="en-US" sz="2000" dirty="0">
+              <a:rPr lang="ko-KR" altLang="en-US" dirty="0">
                 <a:latin typeface="G마켓 산스 TTF Light" panose="02000000000000000000" pitchFamily="2" charset="-127"/>
                 <a:ea typeface="G마켓 산스 TTF Light" panose="02000000000000000000" pitchFamily="2" charset="-127"/>
               </a:rPr>
               <a:t>번 무기</a:t>
             </a:r>
             <a:r>
-              <a:rPr lang="en-US" altLang="ko-KR" sz="2000" dirty="0">
+              <a:rPr lang="en-US" altLang="ko-KR" dirty="0">
                 <a:latin typeface="G마켓 산스 TTF Light" panose="02000000000000000000" pitchFamily="2" charset="-127"/>
                 <a:ea typeface="G마켓 산스 TTF Light" panose="02000000000000000000" pitchFamily="2" charset="-127"/>
               </a:rPr>
@@ -8439,19 +8800,51 @@
               </a:lnSpc>
             </a:pPr>
             <a:r>
-              <a:rPr lang="ko-KR" altLang="en-US" sz="2000" dirty="0">
+              <a:rPr lang="ko-KR" altLang="en-US" dirty="0">
                 <a:latin typeface="G마켓 산스 TTF Light" panose="02000000000000000000" pitchFamily="2" charset="-127"/>
                 <a:ea typeface="G마켓 산스 TTF Light" panose="02000000000000000000" pitchFamily="2" charset="-127"/>
               </a:rPr>
               <a:t>아이템 줍기</a:t>
             </a:r>
             <a:r>
-              <a:rPr lang="en-US" altLang="ko-KR" sz="2000" dirty="0">
+              <a:rPr lang="en-US" altLang="ko-KR" dirty="0">
                 <a:latin typeface="G마켓 산스 TTF Light" panose="02000000000000000000" pitchFamily="2" charset="-127"/>
                 <a:ea typeface="G마켓 산스 TTF Light" panose="02000000000000000000" pitchFamily="2" charset="-127"/>
               </a:rPr>
               <a:t>		| Q</a:t>
             </a:r>
+          </a:p>
+          <a:p>
+            <a:pPr>
+              <a:lnSpc>
+                <a:spcPct val="150000"/>
+              </a:lnSpc>
+            </a:pPr>
+            <a:r>
+              <a:rPr lang="ko-KR" altLang="en-US" dirty="0">
+                <a:latin typeface="G마켓 산스 TTF Light" panose="02000000000000000000" pitchFamily="2" charset="-127"/>
+                <a:ea typeface="G마켓 산스 TTF Light" panose="02000000000000000000" pitchFamily="2" charset="-127"/>
+              </a:rPr>
+              <a:t>점프</a:t>
+            </a:r>
+            <a:r>
+              <a:rPr lang="en-US" altLang="ko-KR" dirty="0">
+                <a:latin typeface="G마켓 산스 TTF Light" panose="02000000000000000000" pitchFamily="2" charset="-127"/>
+                <a:ea typeface="G마켓 산스 TTF Light" panose="02000000000000000000" pitchFamily="2" charset="-127"/>
+              </a:rPr>
+              <a:t>				| Space</a:t>
+            </a:r>
+            <a:endParaRPr lang="ko-KR" altLang="en-US" dirty="0">
+              <a:latin typeface="G마켓 산스 TTF Light" panose="02000000000000000000" pitchFamily="2" charset="-127"/>
+              <a:ea typeface="G마켓 산스 TTF Light" panose="02000000000000000000" pitchFamily="2" charset="-127"/>
+            </a:endParaRPr>
+          </a:p>
+          <a:p>
+            <a:pPr>
+              <a:lnSpc>
+                <a:spcPct val="150000"/>
+              </a:lnSpc>
+            </a:pPr>
             <a:endParaRPr lang="ko-KR" altLang="en-US" sz="2000" dirty="0">
               <a:latin typeface="G마켓 산스 TTF Light" panose="02000000000000000000" pitchFamily="2" charset="-127"/>
               <a:ea typeface="G마켓 산스 TTF Light" panose="02000000000000000000" pitchFamily="2" charset="-127"/>
@@ -8467,7 +8860,7 @@
         </p:nvSpPr>
         <p:spPr>
           <a:xfrm>
-            <a:off x="3044920" y="2317816"/>
+            <a:off x="3044920" y="2247478"/>
             <a:ext cx="504000" cy="504000"/>
           </a:xfrm>
           <a:prstGeom prst="roundRect">
@@ -8507,6 +8900,61 @@
           </a:p>
         </p:txBody>
       </p:sp>
+      <p:sp>
+        <p:nvSpPr>
+          <p:cNvPr id="2" name="사각형: 둥근 모서리 1">
+            <a:extLst>
+              <a:ext uri="{FF2B5EF4-FFF2-40B4-BE49-F238E27FC236}">
+                <a16:creationId xmlns:a16="http://schemas.microsoft.com/office/drawing/2014/main" id="{9FF6CFA2-D6F6-CE31-ED1B-FE7A5AB67A9E}"/>
+              </a:ext>
+            </a:extLst>
+          </p:cNvPr>
+          <p:cNvSpPr/>
+          <p:nvPr/>
+        </p:nvSpPr>
+        <p:spPr>
+          <a:xfrm>
+            <a:off x="4509770" y="3803873"/>
+            <a:ext cx="2653030" cy="504000"/>
+          </a:xfrm>
+          <a:prstGeom prst="roundRect">
+            <a:avLst/>
+          </a:prstGeom>
+          <a:solidFill>
+            <a:schemeClr val="accent2">
+              <a:lumMod val="75000"/>
+              <a:alpha val="40000"/>
+            </a:schemeClr>
+          </a:solidFill>
+          <a:ln>
+            <a:noFill/>
+          </a:ln>
+        </p:spPr>
+        <p:style>
+          <a:lnRef idx="2">
+            <a:schemeClr val="accent1">
+              <a:shade val="50000"/>
+            </a:schemeClr>
+          </a:lnRef>
+          <a:fillRef idx="1">
+            <a:schemeClr val="accent1"/>
+          </a:fillRef>
+          <a:effectRef idx="0">
+            <a:schemeClr val="accent1"/>
+          </a:effectRef>
+          <a:fontRef idx="minor">
+            <a:schemeClr val="lt1"/>
+          </a:fontRef>
+        </p:style>
+        <p:txBody>
+          <a:bodyPr rtlCol="0" anchor="ctr"/>
+          <a:lstStyle/>
+          <a:p>
+            <a:pPr algn="ctr"/>
+            <a:endParaRPr lang="ko-KR" altLang="en-US"/>
+          </a:p>
+        </p:txBody>
+      </p:sp>
     </p:spTree>
   </p:cSld>
   <p:clrMapOvr>
@@ -8515,7 +8963,7 @@
 </p:sld>
 </file>
 
-<file path=ppt/slides/slide14.xml><?xml version="1.0" encoding="utf-8"?>
+<file path=ppt/slides/slide15.xml><?xml version="1.0" encoding="utf-8"?>
 <p:sld xmlns:a="http://schemas.openxmlformats.org/drawingml/2006/main" xmlns:r="http://schemas.openxmlformats.org/officeDocument/2006/relationships" xmlns:p="http://schemas.openxmlformats.org/presentationml/2006/main">
   <p:cSld>
     <p:bg>
@@ -8651,7 +9099,7 @@
 </p:sld>
 </file>
 
-<file path=ppt/slides/slide15.xml><?xml version="1.0" encoding="utf-8"?>
+<file path=ppt/slides/slide16.xml><?xml version="1.0" encoding="utf-8"?>
 <p:sld xmlns:a="http://schemas.openxmlformats.org/drawingml/2006/main" xmlns:r="http://schemas.openxmlformats.org/officeDocument/2006/relationships" xmlns:p="http://schemas.openxmlformats.org/presentationml/2006/main">
   <p:cSld>
     <p:bg>
@@ -9155,7 +9603,7 @@
 </p:sld>
 </file>
 
-<file path=ppt/slides/slide16.xml><?xml version="1.0" encoding="utf-8"?>
+<file path=ppt/slides/slide17.xml><?xml version="1.0" encoding="utf-8"?>
 <p:sld xmlns:a="http://schemas.openxmlformats.org/drawingml/2006/main" xmlns:r="http://schemas.openxmlformats.org/officeDocument/2006/relationships" xmlns:p="http://schemas.openxmlformats.org/presentationml/2006/main">
   <p:cSld>
     <p:bg>
@@ -9311,7 +9759,7 @@
 </p:sld>
 </file>
 
-<file path=ppt/slides/slide17.xml><?xml version="1.0" encoding="utf-8"?>
+<file path=ppt/slides/slide18.xml><?xml version="1.0" encoding="utf-8"?>
 <p:sld xmlns:a="http://schemas.openxmlformats.org/drawingml/2006/main" xmlns:r="http://schemas.openxmlformats.org/officeDocument/2006/relationships" xmlns:p="http://schemas.openxmlformats.org/presentationml/2006/main">
   <p:cSld>
     <p:bg>
@@ -9429,6 +9877,177 @@
           </a:p>
         </p:txBody>
       </p:sp>
+      <p:sp>
+        <p:nvSpPr>
+          <p:cNvPr id="2" name="TextBox 1">
+            <a:extLst>
+              <a:ext uri="{FF2B5EF4-FFF2-40B4-BE49-F238E27FC236}">
+                <a16:creationId xmlns:a16="http://schemas.microsoft.com/office/drawing/2014/main" id="{2B0D9D19-506B-5AF8-23DA-A1D0B8C359DC}"/>
+              </a:ext>
+            </a:extLst>
+          </p:cNvPr>
+          <p:cNvSpPr txBox="1"/>
+          <p:nvPr/>
+        </p:nvSpPr>
+        <p:spPr>
+          <a:xfrm>
+            <a:off x="978569" y="1718518"/>
+            <a:ext cx="9392315" cy="3093154"/>
+          </a:xfrm>
+          <a:prstGeom prst="rect">
+            <a:avLst/>
+          </a:prstGeom>
+          <a:noFill/>
+        </p:spPr>
+        <p:txBody>
+          <a:bodyPr wrap="none" rtlCol="0">
+            <a:spAutoFit/>
+          </a:bodyPr>
+          <a:lstStyle/>
+          <a:p>
+            <a:pPr marL="342900" indent="-342900">
+              <a:lnSpc>
+                <a:spcPct val="200000"/>
+              </a:lnSpc>
+              <a:buFont typeface="Arial" panose="020B0604020202020204" pitchFamily="34" charset="0"/>
+              <a:buChar char="•"/>
+            </a:pPr>
+            <a:r>
+              <a:rPr lang="ko-KR" altLang="en-US" sz="2000" dirty="0">
+                <a:latin typeface="G마켓 산스 TTF Medium" panose="02000000000000000000" pitchFamily="2" charset="-127"/>
+                <a:ea typeface="G마켓 산스 TTF Medium" panose="02000000000000000000" pitchFamily="2" charset="-127"/>
+              </a:rPr>
+              <a:t>애니메이션 </a:t>
+            </a:r>
+            <a:r>
+              <a:rPr lang="ko-KR" altLang="en-US" sz="2000" dirty="0" err="1">
+                <a:latin typeface="G마켓 산스 TTF Medium" panose="02000000000000000000" pitchFamily="2" charset="-127"/>
+                <a:ea typeface="G마켓 산스 TTF Medium" panose="02000000000000000000" pitchFamily="2" charset="-127"/>
+              </a:rPr>
+              <a:t>블렌딩을</a:t>
+            </a:r>
+            <a:r>
+              <a:rPr lang="ko-KR" altLang="en-US" sz="2000" dirty="0">
+                <a:latin typeface="G마켓 산스 TTF Medium" panose="02000000000000000000" pitchFamily="2" charset="-127"/>
+                <a:ea typeface="G마켓 산스 TTF Medium" panose="02000000000000000000" pitchFamily="2" charset="-127"/>
+              </a:rPr>
+              <a:t> 하여 애니메이션 사이를 부드럽게 연결</a:t>
+            </a:r>
+            <a:endParaRPr lang="en-US" altLang="ko-KR" sz="2000" dirty="0">
+              <a:latin typeface="G마켓 산스 TTF Medium" panose="02000000000000000000" pitchFamily="2" charset="-127"/>
+              <a:ea typeface="G마켓 산스 TTF Medium" panose="02000000000000000000" pitchFamily="2" charset="-127"/>
+            </a:endParaRPr>
+          </a:p>
+          <a:p>
+            <a:pPr marL="342900" indent="-342900">
+              <a:lnSpc>
+                <a:spcPct val="200000"/>
+              </a:lnSpc>
+              <a:buFont typeface="Arial" panose="020B0604020202020204" pitchFamily="34" charset="0"/>
+              <a:buChar char="•"/>
+            </a:pPr>
+            <a:r>
+              <a:rPr lang="ko-KR" altLang="en-US" sz="2000" dirty="0">
+                <a:latin typeface="G마켓 산스 TTF Medium" panose="02000000000000000000" pitchFamily="2" charset="-127"/>
+                <a:ea typeface="G마켓 산스 TTF Medium" panose="02000000000000000000" pitchFamily="2" charset="-127"/>
+              </a:rPr>
+              <a:t>흐르는 물 표현</a:t>
+            </a:r>
+            <a:endParaRPr lang="en-US" altLang="ko-KR" sz="2000" dirty="0">
+              <a:latin typeface="G마켓 산스 TTF Medium" panose="02000000000000000000" pitchFamily="2" charset="-127"/>
+              <a:ea typeface="G마켓 산스 TTF Medium" panose="02000000000000000000" pitchFamily="2" charset="-127"/>
+            </a:endParaRPr>
+          </a:p>
+          <a:p>
+            <a:pPr marL="342900" indent="-342900">
+              <a:lnSpc>
+                <a:spcPct val="200000"/>
+              </a:lnSpc>
+              <a:buFont typeface="Arial" panose="020B0604020202020204" pitchFamily="34" charset="0"/>
+              <a:buChar char="•"/>
+            </a:pPr>
+            <a:r>
+              <a:rPr lang="ko-KR" altLang="en-US" sz="2000" dirty="0">
+                <a:latin typeface="G마켓 산스 TTF Medium" panose="02000000000000000000" pitchFamily="2" charset="-127"/>
+                <a:ea typeface="G마켓 산스 TTF Medium" panose="02000000000000000000" pitchFamily="2" charset="-127"/>
+              </a:rPr>
+              <a:t>물리법칙을 활용해 다양한 무기들을 생동감 넘치게 구현</a:t>
+            </a:r>
+            <a:endParaRPr lang="en-US" altLang="ko-KR" sz="2000" dirty="0">
+              <a:latin typeface="G마켓 산스 TTF Medium" panose="02000000000000000000" pitchFamily="2" charset="-127"/>
+              <a:ea typeface="G마켓 산스 TTF Medium" panose="02000000000000000000" pitchFamily="2" charset="-127"/>
+            </a:endParaRPr>
+          </a:p>
+          <a:p>
+            <a:pPr marL="342900" indent="-342900">
+              <a:lnSpc>
+                <a:spcPct val="200000"/>
+              </a:lnSpc>
+              <a:buFont typeface="Arial" panose="020B0604020202020204" pitchFamily="34" charset="0"/>
+              <a:buChar char="•"/>
+            </a:pPr>
+            <a:r>
+              <a:rPr lang="ko-KR" altLang="en-US" sz="2000" dirty="0">
+                <a:latin typeface="G마켓 산스 TTF Medium" panose="02000000000000000000" pitchFamily="2" charset="-127"/>
+                <a:ea typeface="G마켓 산스 TTF Medium" panose="02000000000000000000" pitchFamily="2" charset="-127"/>
+              </a:rPr>
+              <a:t>서버를 통해 </a:t>
+            </a:r>
+            <a:r>
+              <a:rPr lang="en-US" altLang="ko-KR" sz="2000" dirty="0">
+                <a:latin typeface="G마켓 산스 TTF Medium" panose="02000000000000000000" pitchFamily="2" charset="-127"/>
+                <a:ea typeface="G마켓 산스 TTF Medium" panose="02000000000000000000" pitchFamily="2" charset="-127"/>
+              </a:rPr>
+              <a:t>3</a:t>
+            </a:r>
+            <a:r>
+              <a:rPr lang="ko-KR" altLang="en-US" sz="2000" dirty="0">
+                <a:latin typeface="G마켓 산스 TTF Medium" panose="02000000000000000000" pitchFamily="2" charset="-127"/>
+                <a:ea typeface="G마켓 산스 TTF Medium" panose="02000000000000000000" pitchFamily="2" charset="-127"/>
+              </a:rPr>
+              <a:t>명의 플레이어가 모여 게임을 진행할 때</a:t>
+            </a:r>
+            <a:r>
+              <a:rPr lang="en-US" altLang="ko-KR" sz="2000" dirty="0">
+                <a:latin typeface="G마켓 산스 TTF Medium" panose="02000000000000000000" pitchFamily="2" charset="-127"/>
+                <a:ea typeface="G마켓 산스 TTF Medium" panose="02000000000000000000" pitchFamily="2" charset="-127"/>
+              </a:rPr>
+              <a:t> </a:t>
+            </a:r>
+            <a:r>
+              <a:rPr lang="ko-KR" altLang="en-US" sz="2000" dirty="0">
+                <a:latin typeface="G마켓 산스 TTF Medium" panose="02000000000000000000" pitchFamily="2" charset="-127"/>
+                <a:ea typeface="G마켓 산스 TTF Medium" panose="02000000000000000000" pitchFamily="2" charset="-127"/>
+              </a:rPr>
+              <a:t>프레임이 끊기지 않게 구현</a:t>
+            </a:r>
+            <a:endParaRPr lang="en-US" altLang="ko-KR" sz="2000" dirty="0">
+              <a:latin typeface="G마켓 산스 TTF Medium" panose="02000000000000000000" pitchFamily="2" charset="-127"/>
+              <a:ea typeface="G마켓 산스 TTF Medium" panose="02000000000000000000" pitchFamily="2" charset="-127"/>
+            </a:endParaRPr>
+          </a:p>
+          <a:p>
+            <a:pPr marL="342900" indent="-342900">
+              <a:lnSpc>
+                <a:spcPct val="200000"/>
+              </a:lnSpc>
+              <a:buFont typeface="Arial" panose="020B0604020202020204" pitchFamily="34" charset="0"/>
+              <a:buChar char="•"/>
+            </a:pPr>
+            <a:r>
+              <a:rPr lang="ko-KR" altLang="en-US" sz="2000" dirty="0">
+                <a:latin typeface="G마켓 산스 TTF Medium" panose="02000000000000000000" pitchFamily="2" charset="-127"/>
+                <a:ea typeface="G마켓 산스 TTF Medium" panose="02000000000000000000" pitchFamily="2" charset="-127"/>
+              </a:rPr>
+              <a:t>일괄 처리를 하여 불필요한 연산 최소화</a:t>
+            </a:r>
+            <a:endParaRPr lang="en-US" altLang="ko-KR" sz="2000" dirty="0">
+              <a:latin typeface="G마켓 산스 TTF Medium" panose="02000000000000000000" pitchFamily="2" charset="-127"/>
+              <a:ea typeface="G마켓 산스 TTF Medium" panose="02000000000000000000" pitchFamily="2" charset="-127"/>
+            </a:endParaRPr>
+          </a:p>
+        </p:txBody>
+      </p:sp>
     </p:spTree>
   </p:cSld>
   <p:clrMapOvr>
@@ -9437,7 +10056,7 @@
 </p:sld>
 </file>
 
-<file path=ppt/slides/slide18.xml><?xml version="1.0" encoding="utf-8"?>
+<file path=ppt/slides/slide19.xml><?xml version="1.0" encoding="utf-8"?>
 <p:sld xmlns:a="http://schemas.openxmlformats.org/drawingml/2006/main" xmlns:r="http://schemas.openxmlformats.org/officeDocument/2006/relationships" xmlns:p="http://schemas.openxmlformats.org/presentationml/2006/main">
   <p:cSld>
     <p:bg>
@@ -9562,789 +10181,6 @@
               <a:latin typeface="여기어때 잘난체" panose="020B0600000101010101" pitchFamily="50" charset="-127"/>
               <a:ea typeface="여기어때 잘난체" panose="020B0600000101010101" pitchFamily="50" charset="-127"/>
             </a:endParaRPr>
-          </a:p>
-        </p:txBody>
-      </p:sp>
-    </p:spTree>
-  </p:cSld>
-  <p:clrMapOvr>
-    <a:masterClrMapping/>
-  </p:clrMapOvr>
-</p:sld>
-</file>
-
-<file path=ppt/slides/slide19.xml><?xml version="1.0" encoding="utf-8"?>
-<p:sld xmlns:a="http://schemas.openxmlformats.org/drawingml/2006/main" xmlns:r="http://schemas.openxmlformats.org/officeDocument/2006/relationships" xmlns:p="http://schemas.openxmlformats.org/presentationml/2006/main">
-  <p:cSld>
-    <p:spTree>
-      <p:nvGrpSpPr>
-        <p:cNvPr id="1" name=""/>
-        <p:cNvGrpSpPr/>
-        <p:nvPr/>
-      </p:nvGrpSpPr>
-      <p:grpSpPr>
-        <a:xfrm>
-          <a:off x="0" y="0"/>
-          <a:ext cx="0" cy="0"/>
-          <a:chOff x="0" y="0"/>
-          <a:chExt cx="0" cy="0"/>
-        </a:xfrm>
-      </p:grpSpPr>
-      <p:sp>
-        <p:nvSpPr>
-          <p:cNvPr id="13" name="TextBox 12"/>
-          <p:cNvSpPr txBox="1"/>
-          <p:nvPr/>
-        </p:nvSpPr>
-        <p:spPr>
-          <a:xfrm>
-            <a:off x="4273333" y="418405"/>
-            <a:ext cx="3645333" cy="584775"/>
-          </a:xfrm>
-          <a:prstGeom prst="rect">
-            <a:avLst/>
-          </a:prstGeom>
-          <a:noFill/>
-        </p:spPr>
-        <p:txBody>
-          <a:bodyPr wrap="square" rtlCol="0">
-            <a:spAutoFit/>
-          </a:bodyPr>
-          <a:lstStyle/>
-          <a:p>
-            <a:r>
-              <a:rPr lang="en-US" altLang="ko-KR" sz="3200" dirty="0">
-                <a:solidFill>
-                  <a:srgbClr val="8BA9AB"/>
-                </a:solidFill>
-                <a:latin typeface="여기어때 잘난체" panose="020B0600000101010101" pitchFamily="50" charset="-127"/>
-                <a:ea typeface="여기어때 잘난체" panose="020B0600000101010101" pitchFamily="50" charset="-127"/>
-              </a:rPr>
-              <a:t>04. </a:t>
-            </a:r>
-            <a:r>
-              <a:rPr lang="ko-KR" altLang="en-US" sz="3200" dirty="0">
-                <a:solidFill>
-                  <a:srgbClr val="8BA9AB"/>
-                </a:solidFill>
-                <a:latin typeface="여기어때 잘난체" panose="020B0600000101010101" pitchFamily="50" charset="-127"/>
-                <a:ea typeface="여기어때 잘난체" panose="020B0600000101010101" pitchFamily="50" charset="-127"/>
-              </a:rPr>
-              <a:t>타 게임과 비교</a:t>
-            </a:r>
-          </a:p>
-        </p:txBody>
-      </p:sp>
-      <p:pic>
-        <p:nvPicPr>
-          <p:cNvPr id="1026" name="Picture 2" descr="휴먼: 폴 플랫 (Human: Fall Flat)"/>
-          <p:cNvPicPr>
-            <a:picLocks noChangeAspect="1" noChangeArrowheads="1"/>
-          </p:cNvPicPr>
-          <p:nvPr/>
-        </p:nvPicPr>
-        <p:blipFill>
-          <a:blip r:embed="rId2">
-            <a:extLst>
-              <a:ext uri="{28A0092B-C50C-407E-A947-70E740481C1C}">
-                <a14:useLocalDpi xmlns:a14="http://schemas.microsoft.com/office/drawing/2010/main" val="0"/>
-              </a:ext>
-            </a:extLst>
-          </a:blip>
-          <a:srcRect/>
-          <a:stretch>
-            <a:fillRect/>
-          </a:stretch>
-        </p:blipFill>
-        <p:spPr bwMode="auto">
-          <a:xfrm>
-            <a:off x="477846" y="2335012"/>
-            <a:ext cx="3552972" cy="1998249"/>
-          </a:xfrm>
-          <a:prstGeom prst="rect">
-            <a:avLst/>
-          </a:prstGeom>
-          <a:noFill/>
-          <a:extLst>
-            <a:ext uri="{909E8E84-426E-40DD-AFC4-6F175D3DCCD1}">
-              <a14:hiddenFill xmlns:a14="http://schemas.microsoft.com/office/drawing/2010/main">
-                <a:solidFill>
-                  <a:srgbClr val="FFFFFF"/>
-                </a:solidFill>
-              </a14:hiddenFill>
-            </a:ext>
-          </a:extLst>
-        </p:spPr>
-      </p:pic>
-      <p:graphicFrame>
-        <p:nvGraphicFramePr>
-          <p:cNvPr id="2" name="표 3"/>
-          <p:cNvGraphicFramePr>
-            <a:graphicFrameLocks noGrp="1"/>
-          </p:cNvGraphicFramePr>
-          <p:nvPr/>
-        </p:nvGraphicFramePr>
-        <p:xfrm>
-          <a:off x="4273333" y="1819922"/>
-          <a:ext cx="7649379" cy="4619566"/>
-        </p:xfrm>
-        <a:graphic>
-          <a:graphicData uri="http://schemas.openxmlformats.org/drawingml/2006/table">
-            <a:tbl>
-              <a:tblPr firstRow="1" bandRow="1">
-                <a:tableStyleId>{5C22544A-7EE6-4342-B048-85BDC9FD1C3A}</a:tableStyleId>
-              </a:tblPr>
-              <a:tblGrid>
-                <a:gridCol w="1357148">
-                  <a:extLst>
-                    <a:ext uri="{9D8B030D-6E8A-4147-A177-3AD203B41FA5}">
-                      <a16:colId xmlns:a16="http://schemas.microsoft.com/office/drawing/2014/main" val="20000"/>
-                    </a:ext>
-                  </a:extLst>
-                </a:gridCol>
-                <a:gridCol w="3034125">
-                  <a:extLst>
-                    <a:ext uri="{9D8B030D-6E8A-4147-A177-3AD203B41FA5}">
-                      <a16:colId xmlns:a16="http://schemas.microsoft.com/office/drawing/2014/main" val="20001"/>
-                    </a:ext>
-                  </a:extLst>
-                </a:gridCol>
-                <a:gridCol w="3258106">
-                  <a:extLst>
-                    <a:ext uri="{9D8B030D-6E8A-4147-A177-3AD203B41FA5}">
-                      <a16:colId xmlns:a16="http://schemas.microsoft.com/office/drawing/2014/main" val="20002"/>
-                    </a:ext>
-                  </a:extLst>
-                </a:gridCol>
-              </a:tblGrid>
-              <a:tr h="430092">
-                <a:tc>
-                  <a:txBody>
-                    <a:bodyPr/>
-                    <a:lstStyle/>
-                    <a:p>
-                      <a:pPr algn="ctr" latinLnBrk="1"/>
-                      <a:r>
-                        <a:rPr lang="ko-KR" altLang="en-US" b="0" dirty="0" err="1">
-                          <a:solidFill>
-                            <a:schemeClr val="tx1"/>
-                          </a:solidFill>
-                          <a:latin typeface="G마켓 산스 TTF Medium" panose="02000000000000000000" pitchFamily="2" charset="-127"/>
-                          <a:ea typeface="G마켓 산스 TTF Medium" panose="02000000000000000000" pitchFamily="2" charset="-127"/>
-                        </a:rPr>
-                        <a:t>타게임</a:t>
-                      </a:r>
-                      <a:endParaRPr lang="ko-KR" altLang="en-US" b="0" dirty="0">
-                        <a:solidFill>
-                          <a:schemeClr val="tx1"/>
-                        </a:solidFill>
-                        <a:latin typeface="G마켓 산스 TTF Medium" panose="02000000000000000000" pitchFamily="2" charset="-127"/>
-                        <a:ea typeface="G마켓 산스 TTF Medium" panose="02000000000000000000" pitchFamily="2" charset="-127"/>
-                      </a:endParaRPr>
-                    </a:p>
-                  </a:txBody>
-                  <a:tcPr anchor="ctr">
-                    <a:lnB w="12700" cap="flat" cmpd="sng" algn="ctr">
-                      <a:solidFill>
-                        <a:srgbClr val="8BA9AB"/>
-                      </a:solidFill>
-                      <a:prstDash val="solid"/>
-                      <a:round/>
-                      <a:headEnd type="none" w="med" len="med"/>
-                      <a:tailEnd type="none" w="med" len="med"/>
-                    </a:lnB>
-                    <a:solidFill>
-                      <a:srgbClr val="B1C6C7"/>
-                    </a:solidFill>
-                  </a:tcPr>
-                </a:tc>
-                <a:tc>
-                  <a:txBody>
-                    <a:bodyPr/>
-                    <a:lstStyle/>
-                    <a:p>
-                      <a:pPr algn="ctr" latinLnBrk="1"/>
-                      <a:r>
-                        <a:rPr lang="ko-KR" altLang="en-US" b="0" dirty="0">
-                          <a:solidFill>
-                            <a:schemeClr val="tx1"/>
-                          </a:solidFill>
-                          <a:latin typeface="G마켓 산스 TTF Medium" panose="02000000000000000000" pitchFamily="2" charset="-127"/>
-                          <a:ea typeface="G마켓 산스 TTF Medium" panose="02000000000000000000" pitchFamily="2" charset="-127"/>
-                        </a:rPr>
-                        <a:t>유사점</a:t>
-                      </a:r>
-                    </a:p>
-                  </a:txBody>
-                  <a:tcPr anchor="ctr">
-                    <a:lnB w="12700" cap="flat" cmpd="sng" algn="ctr">
-                      <a:solidFill>
-                        <a:srgbClr val="8BA9AB"/>
-                      </a:solidFill>
-                      <a:prstDash val="solid"/>
-                      <a:round/>
-                      <a:headEnd type="none" w="med" len="med"/>
-                      <a:tailEnd type="none" w="med" len="med"/>
-                    </a:lnB>
-                    <a:solidFill>
-                      <a:srgbClr val="B1C6C7"/>
-                    </a:solidFill>
-                  </a:tcPr>
-                </a:tc>
-                <a:tc>
-                  <a:txBody>
-                    <a:bodyPr/>
-                    <a:lstStyle/>
-                    <a:p>
-                      <a:pPr algn="ctr" latinLnBrk="1"/>
-                      <a:r>
-                        <a:rPr lang="ko-KR" altLang="en-US" b="0" dirty="0">
-                          <a:solidFill>
-                            <a:schemeClr val="tx1"/>
-                          </a:solidFill>
-                          <a:latin typeface="G마켓 산스 TTF Medium" panose="02000000000000000000" pitchFamily="2" charset="-127"/>
-                          <a:ea typeface="G마켓 산스 TTF Medium" panose="02000000000000000000" pitchFamily="2" charset="-127"/>
-                        </a:rPr>
-                        <a:t>개선하고 싶은 점</a:t>
-                      </a:r>
-                    </a:p>
-                  </a:txBody>
-                  <a:tcPr anchor="ctr">
-                    <a:lnB w="12700" cap="flat" cmpd="sng" algn="ctr">
-                      <a:solidFill>
-                        <a:srgbClr val="8BA9AB"/>
-                      </a:solidFill>
-                      <a:prstDash val="solid"/>
-                      <a:round/>
-                      <a:headEnd type="none" w="med" len="med"/>
-                      <a:tailEnd type="none" w="med" len="med"/>
-                    </a:lnB>
-                    <a:solidFill>
-                      <a:srgbClr val="B1C6C7"/>
-                    </a:solidFill>
-                  </a:tcPr>
-                </a:tc>
-                <a:extLst>
-                  <a:ext uri="{0D108BD9-81ED-4DB2-BD59-A6C34878D82A}">
-                    <a16:rowId xmlns:a16="http://schemas.microsoft.com/office/drawing/2014/main" val="10000"/>
-                  </a:ext>
-                </a:extLst>
-              </a:tr>
-              <a:tr h="2094737">
-                <a:tc>
-                  <a:txBody>
-                    <a:bodyPr/>
-                    <a:lstStyle/>
-                    <a:p>
-                      <a:pPr algn="ctr" latinLnBrk="1">
-                        <a:lnSpc>
-                          <a:spcPct val="150000"/>
-                        </a:lnSpc>
-                      </a:pPr>
-                      <a:r>
-                        <a:rPr lang="ko-KR" altLang="en-US" sz="1600" b="0" dirty="0">
-                          <a:solidFill>
-                            <a:schemeClr val="tx1"/>
-                          </a:solidFill>
-                          <a:latin typeface="G마켓 산스 TTF Medium" panose="02000000000000000000" pitchFamily="2" charset="-127"/>
-                          <a:ea typeface="G마켓 산스 TTF Medium" panose="02000000000000000000" pitchFamily="2" charset="-127"/>
-                        </a:rPr>
-                        <a:t>휴먼 폴 플랫</a:t>
-                      </a:r>
-                    </a:p>
-                  </a:txBody>
-                  <a:tcPr anchor="ctr">
-                    <a:lnL w="12700" cap="flat" cmpd="sng" algn="ctr">
-                      <a:solidFill>
-                        <a:srgbClr val="8BA9AB"/>
-                      </a:solidFill>
-                      <a:prstDash val="solid"/>
-                      <a:round/>
-                      <a:headEnd type="none" w="med" len="med"/>
-                      <a:tailEnd type="none" w="med" len="med"/>
-                    </a:lnL>
-                    <a:lnR w="12700" cap="flat" cmpd="sng" algn="ctr">
-                      <a:solidFill>
-                        <a:srgbClr val="8BA9AB"/>
-                      </a:solidFill>
-                      <a:prstDash val="solid"/>
-                      <a:round/>
-                      <a:headEnd type="none" w="med" len="med"/>
-                      <a:tailEnd type="none" w="med" len="med"/>
-                    </a:lnR>
-                    <a:lnT w="12700" cap="flat" cmpd="sng" algn="ctr">
-                      <a:solidFill>
-                        <a:srgbClr val="8BA9AB"/>
-                      </a:solidFill>
-                      <a:prstDash val="solid"/>
-                      <a:round/>
-                      <a:headEnd type="none" w="med" len="med"/>
-                      <a:tailEnd type="none" w="med" len="med"/>
-                    </a:lnT>
-                    <a:lnB w="12700" cap="flat" cmpd="sng" algn="ctr">
-                      <a:solidFill>
-                        <a:srgbClr val="8BA9AB"/>
-                      </a:solidFill>
-                      <a:prstDash val="solid"/>
-                      <a:round/>
-                      <a:headEnd type="none" w="med" len="med"/>
-                      <a:tailEnd type="none" w="med" len="med"/>
-                    </a:lnB>
-                    <a:solidFill>
-                      <a:schemeClr val="bg1"/>
-                    </a:solidFill>
-                  </a:tcPr>
-                </a:tc>
-                <a:tc>
-                  <a:txBody>
-                    <a:bodyPr/>
-                    <a:lstStyle/>
-                    <a:p>
-                      <a:pPr algn="l" latinLnBrk="1">
-                        <a:lnSpc>
-                          <a:spcPct val="150000"/>
-                        </a:lnSpc>
-                      </a:pPr>
-                      <a:r>
-                        <a:rPr lang="ko-KR" altLang="en-US" sz="1200" b="0" dirty="0">
-                          <a:solidFill>
-                            <a:schemeClr val="tx1"/>
-                          </a:solidFill>
-                          <a:latin typeface="G마켓 산스 TTF Light" panose="02000000000000000000" pitchFamily="2" charset="-127"/>
-                          <a:ea typeface="G마켓 산스 TTF Light" panose="02000000000000000000" pitchFamily="2" charset="-127"/>
-                        </a:rPr>
-                        <a:t>유저들 간의 협동을 통해</a:t>
-                      </a:r>
-                      <a:endParaRPr lang="en-US" altLang="ko-KR" sz="1200" b="0" dirty="0">
-                        <a:solidFill>
-                          <a:schemeClr val="tx1"/>
-                        </a:solidFill>
-                        <a:latin typeface="G마켓 산스 TTF Light" panose="02000000000000000000" pitchFamily="2" charset="-127"/>
-                        <a:ea typeface="G마켓 산스 TTF Light" panose="02000000000000000000" pitchFamily="2" charset="-127"/>
-                      </a:endParaRPr>
-                    </a:p>
-                    <a:p>
-                      <a:pPr algn="l" latinLnBrk="1">
-                        <a:lnSpc>
-                          <a:spcPct val="150000"/>
-                        </a:lnSpc>
-                      </a:pPr>
-                      <a:r>
-                        <a:rPr lang="ko-KR" altLang="en-US" sz="1200" b="0" dirty="0">
-                          <a:solidFill>
-                            <a:schemeClr val="tx1"/>
-                          </a:solidFill>
-                          <a:latin typeface="G마켓 산스 TTF Light" panose="02000000000000000000" pitchFamily="2" charset="-127"/>
-                          <a:ea typeface="G마켓 산스 TTF Light" panose="02000000000000000000" pitchFamily="2" charset="-127"/>
-                        </a:rPr>
-                        <a:t>사물 혹은 지형을 이용하여 길을 이동한다</a:t>
-                      </a:r>
-                      <a:r>
-                        <a:rPr lang="en-US" altLang="ko-KR" sz="1200" b="0" dirty="0">
-                          <a:solidFill>
-                            <a:schemeClr val="tx1"/>
-                          </a:solidFill>
-                          <a:latin typeface="G마켓 산스 TTF Light" panose="02000000000000000000" pitchFamily="2" charset="-127"/>
-                          <a:ea typeface="G마켓 산스 TTF Light" panose="02000000000000000000" pitchFamily="2" charset="-127"/>
-                        </a:rPr>
-                        <a:t>.</a:t>
-                      </a:r>
-                      <a:endParaRPr lang="ko-KR" altLang="en-US" sz="1200" b="0" dirty="0">
-                        <a:solidFill>
-                          <a:schemeClr val="tx1"/>
-                        </a:solidFill>
-                        <a:latin typeface="G마켓 산스 TTF Light" panose="02000000000000000000" pitchFamily="2" charset="-127"/>
-                        <a:ea typeface="G마켓 산스 TTF Light" panose="02000000000000000000" pitchFamily="2" charset="-127"/>
-                      </a:endParaRPr>
-                    </a:p>
-                  </a:txBody>
-                  <a:tcPr anchor="ctr">
-                    <a:lnL w="12700" cap="flat" cmpd="sng" algn="ctr">
-                      <a:solidFill>
-                        <a:srgbClr val="8BA9AB"/>
-                      </a:solidFill>
-                      <a:prstDash val="solid"/>
-                      <a:round/>
-                      <a:headEnd type="none" w="med" len="med"/>
-                      <a:tailEnd type="none" w="med" len="med"/>
-                    </a:lnL>
-                    <a:lnR w="12700" cap="flat" cmpd="sng" algn="ctr">
-                      <a:solidFill>
-                        <a:srgbClr val="8BA9AB"/>
-                      </a:solidFill>
-                      <a:prstDash val="solid"/>
-                      <a:round/>
-                      <a:headEnd type="none" w="med" len="med"/>
-                      <a:tailEnd type="none" w="med" len="med"/>
-                    </a:lnR>
-                    <a:lnT w="12700" cap="flat" cmpd="sng" algn="ctr">
-                      <a:solidFill>
-                        <a:srgbClr val="8BA9AB"/>
-                      </a:solidFill>
-                      <a:prstDash val="solid"/>
-                      <a:round/>
-                      <a:headEnd type="none" w="med" len="med"/>
-                      <a:tailEnd type="none" w="med" len="med"/>
-                    </a:lnT>
-                    <a:lnB w="12700" cap="flat" cmpd="sng" algn="ctr">
-                      <a:solidFill>
-                        <a:srgbClr val="8BA9AB"/>
-                      </a:solidFill>
-                      <a:prstDash val="solid"/>
-                      <a:round/>
-                      <a:headEnd type="none" w="med" len="med"/>
-                      <a:tailEnd type="none" w="med" len="med"/>
-                    </a:lnB>
-                    <a:solidFill>
-                      <a:schemeClr val="bg1"/>
-                    </a:solidFill>
-                  </a:tcPr>
-                </a:tc>
-                <a:tc>
-                  <a:txBody>
-                    <a:bodyPr/>
-                    <a:lstStyle/>
-                    <a:p>
-                      <a:pPr algn="l" latinLnBrk="1">
-                        <a:lnSpc>
-                          <a:spcPct val="150000"/>
-                        </a:lnSpc>
-                      </a:pPr>
-                      <a:r>
-                        <a:rPr lang="ko-KR" altLang="en-US" sz="1200" b="0" dirty="0">
-                          <a:solidFill>
-                            <a:schemeClr val="tx1"/>
-                          </a:solidFill>
-                          <a:latin typeface="G마켓 산스 TTF Light" panose="02000000000000000000" pitchFamily="2" charset="-127"/>
-                          <a:ea typeface="G마켓 산스 TTF Light" panose="02000000000000000000" pitchFamily="2" charset="-127"/>
-                        </a:rPr>
-                        <a:t>단순히 길을 이동하는 것 뿐만이 아니라 몬스터를 추가 시켜 전투가 가능하게끔 컨텐츠 추가</a:t>
-                      </a:r>
-                    </a:p>
-                  </a:txBody>
-                  <a:tcPr anchor="ctr">
-                    <a:lnL w="12700" cap="flat" cmpd="sng" algn="ctr">
-                      <a:solidFill>
-                        <a:srgbClr val="8BA9AB"/>
-                      </a:solidFill>
-                      <a:prstDash val="solid"/>
-                      <a:round/>
-                      <a:headEnd type="none" w="med" len="med"/>
-                      <a:tailEnd type="none" w="med" len="med"/>
-                    </a:lnL>
-                    <a:lnR w="12700" cap="flat" cmpd="sng" algn="ctr">
-                      <a:solidFill>
-                        <a:srgbClr val="8BA9AB"/>
-                      </a:solidFill>
-                      <a:prstDash val="solid"/>
-                      <a:round/>
-                      <a:headEnd type="none" w="med" len="med"/>
-                      <a:tailEnd type="none" w="med" len="med"/>
-                    </a:lnR>
-                    <a:lnT w="12700" cap="flat" cmpd="sng" algn="ctr">
-                      <a:solidFill>
-                        <a:srgbClr val="8BA9AB"/>
-                      </a:solidFill>
-                      <a:prstDash val="solid"/>
-                      <a:round/>
-                      <a:headEnd type="none" w="med" len="med"/>
-                      <a:tailEnd type="none" w="med" len="med"/>
-                    </a:lnT>
-                    <a:lnB w="12700" cap="flat" cmpd="sng" algn="ctr">
-                      <a:solidFill>
-                        <a:srgbClr val="8BA9AB"/>
-                      </a:solidFill>
-                      <a:prstDash val="solid"/>
-                      <a:round/>
-                      <a:headEnd type="none" w="med" len="med"/>
-                      <a:tailEnd type="none" w="med" len="med"/>
-                    </a:lnB>
-                    <a:solidFill>
-                      <a:schemeClr val="bg1"/>
-                    </a:solidFill>
-                  </a:tcPr>
-                </a:tc>
-                <a:extLst>
-                  <a:ext uri="{0D108BD9-81ED-4DB2-BD59-A6C34878D82A}">
-                    <a16:rowId xmlns:a16="http://schemas.microsoft.com/office/drawing/2014/main" val="10001"/>
-                  </a:ext>
-                </a:extLst>
-              </a:tr>
-              <a:tr h="2094737">
-                <a:tc>
-                  <a:txBody>
-                    <a:bodyPr/>
-                    <a:lstStyle/>
-                    <a:p>
-                      <a:pPr algn="ctr" latinLnBrk="1">
-                        <a:lnSpc>
-                          <a:spcPct val="150000"/>
-                        </a:lnSpc>
-                      </a:pPr>
-                      <a:r>
-                        <a:rPr lang="ko-KR" altLang="en-US" sz="1600" b="0" dirty="0" err="1">
-                          <a:solidFill>
-                            <a:schemeClr val="tx1"/>
-                          </a:solidFill>
-                          <a:latin typeface="G마켓 산스 TTF Medium" panose="02000000000000000000" pitchFamily="2" charset="-127"/>
-                          <a:ea typeface="G마켓 산스 TTF Medium" panose="02000000000000000000" pitchFamily="2" charset="-127"/>
-                        </a:rPr>
-                        <a:t>젤다</a:t>
-                      </a:r>
-                      <a:endParaRPr lang="ko-KR" altLang="en-US" sz="1600" b="0" dirty="0">
-                        <a:solidFill>
-                          <a:schemeClr val="tx1"/>
-                        </a:solidFill>
-                        <a:latin typeface="G마켓 산스 TTF Medium" panose="02000000000000000000" pitchFamily="2" charset="-127"/>
-                        <a:ea typeface="G마켓 산스 TTF Medium" panose="02000000000000000000" pitchFamily="2" charset="-127"/>
-                      </a:endParaRPr>
-                    </a:p>
-                  </a:txBody>
-                  <a:tcPr anchor="ctr">
-                    <a:lnL w="12700" cap="flat" cmpd="sng" algn="ctr">
-                      <a:solidFill>
-                        <a:srgbClr val="8BA9AB"/>
-                      </a:solidFill>
-                      <a:prstDash val="solid"/>
-                      <a:round/>
-                      <a:headEnd type="none" w="med" len="med"/>
-                      <a:tailEnd type="none" w="med" len="med"/>
-                    </a:lnL>
-                    <a:lnR w="12700" cap="flat" cmpd="sng" algn="ctr">
-                      <a:solidFill>
-                        <a:srgbClr val="8BA9AB"/>
-                      </a:solidFill>
-                      <a:prstDash val="solid"/>
-                      <a:round/>
-                      <a:headEnd type="none" w="med" len="med"/>
-                      <a:tailEnd type="none" w="med" len="med"/>
-                    </a:lnR>
-                    <a:lnT w="12700" cap="flat" cmpd="sng" algn="ctr">
-                      <a:solidFill>
-                        <a:srgbClr val="8BA9AB"/>
-                      </a:solidFill>
-                      <a:prstDash val="solid"/>
-                      <a:round/>
-                      <a:headEnd type="none" w="med" len="med"/>
-                      <a:tailEnd type="none" w="med" len="med"/>
-                    </a:lnT>
-                    <a:lnB w="12700" cap="flat" cmpd="sng" algn="ctr">
-                      <a:solidFill>
-                        <a:srgbClr val="8BA9AB"/>
-                      </a:solidFill>
-                      <a:prstDash val="solid"/>
-                      <a:round/>
-                      <a:headEnd type="none" w="med" len="med"/>
-                      <a:tailEnd type="none" w="med" len="med"/>
-                    </a:lnB>
-                    <a:solidFill>
-                      <a:schemeClr val="bg1"/>
-                    </a:solidFill>
-                  </a:tcPr>
-                </a:tc>
-                <a:tc>
-                  <a:txBody>
-                    <a:bodyPr/>
-                    <a:lstStyle/>
-                    <a:p>
-                      <a:pPr algn="l" latinLnBrk="1">
-                        <a:lnSpc>
-                          <a:spcPct val="150000"/>
-                        </a:lnSpc>
-                      </a:pPr>
-                      <a:endParaRPr lang="ko-KR" altLang="en-US" sz="1200" b="0" dirty="0">
-                        <a:solidFill>
-                          <a:schemeClr val="tx1"/>
-                        </a:solidFill>
-                        <a:latin typeface="G마켓 산스 TTF Light" panose="02000000000000000000" pitchFamily="2" charset="-127"/>
-                        <a:ea typeface="G마켓 산스 TTF Light" panose="02000000000000000000" pitchFamily="2" charset="-127"/>
-                      </a:endParaRPr>
-                    </a:p>
-                  </a:txBody>
-                  <a:tcPr anchor="ctr">
-                    <a:lnL w="12700" cap="flat" cmpd="sng" algn="ctr">
-                      <a:solidFill>
-                        <a:srgbClr val="8BA9AB"/>
-                      </a:solidFill>
-                      <a:prstDash val="solid"/>
-                      <a:round/>
-                      <a:headEnd type="none" w="med" len="med"/>
-                      <a:tailEnd type="none" w="med" len="med"/>
-                    </a:lnL>
-                    <a:lnR w="12700" cap="flat" cmpd="sng" algn="ctr">
-                      <a:solidFill>
-                        <a:srgbClr val="8BA9AB"/>
-                      </a:solidFill>
-                      <a:prstDash val="solid"/>
-                      <a:round/>
-                      <a:headEnd type="none" w="med" len="med"/>
-                      <a:tailEnd type="none" w="med" len="med"/>
-                    </a:lnR>
-                    <a:lnT w="12700" cap="flat" cmpd="sng" algn="ctr">
-                      <a:solidFill>
-                        <a:srgbClr val="8BA9AB"/>
-                      </a:solidFill>
-                      <a:prstDash val="solid"/>
-                      <a:round/>
-                      <a:headEnd type="none" w="med" len="med"/>
-                      <a:tailEnd type="none" w="med" len="med"/>
-                    </a:lnT>
-                    <a:lnB w="12700" cap="flat" cmpd="sng" algn="ctr">
-                      <a:solidFill>
-                        <a:srgbClr val="8BA9AB"/>
-                      </a:solidFill>
-                      <a:prstDash val="solid"/>
-                      <a:round/>
-                      <a:headEnd type="none" w="med" len="med"/>
-                      <a:tailEnd type="none" w="med" len="med"/>
-                    </a:lnB>
-                    <a:solidFill>
-                      <a:schemeClr val="bg1"/>
-                    </a:solidFill>
-                  </a:tcPr>
-                </a:tc>
-                <a:tc>
-                  <a:txBody>
-                    <a:bodyPr/>
-                    <a:lstStyle/>
-                    <a:p>
-                      <a:pPr algn="l" latinLnBrk="1">
-                        <a:lnSpc>
-                          <a:spcPct val="150000"/>
-                        </a:lnSpc>
-                      </a:pPr>
-                      <a:endParaRPr lang="ko-KR" altLang="en-US" sz="1200" b="0" dirty="0">
-                        <a:solidFill>
-                          <a:schemeClr val="tx1"/>
-                        </a:solidFill>
-                        <a:latin typeface="G마켓 산스 TTF Light" panose="02000000000000000000" pitchFamily="2" charset="-127"/>
-                        <a:ea typeface="G마켓 산스 TTF Light" panose="02000000000000000000" pitchFamily="2" charset="-127"/>
-                      </a:endParaRPr>
-                    </a:p>
-                  </a:txBody>
-                  <a:tcPr anchor="ctr">
-                    <a:lnL w="12700" cap="flat" cmpd="sng" algn="ctr">
-                      <a:solidFill>
-                        <a:srgbClr val="8BA9AB"/>
-                      </a:solidFill>
-                      <a:prstDash val="solid"/>
-                      <a:round/>
-                      <a:headEnd type="none" w="med" len="med"/>
-                      <a:tailEnd type="none" w="med" len="med"/>
-                    </a:lnL>
-                    <a:lnR w="12700" cap="flat" cmpd="sng" algn="ctr">
-                      <a:solidFill>
-                        <a:srgbClr val="8BA9AB"/>
-                      </a:solidFill>
-                      <a:prstDash val="solid"/>
-                      <a:round/>
-                      <a:headEnd type="none" w="med" len="med"/>
-                      <a:tailEnd type="none" w="med" len="med"/>
-                    </a:lnR>
-                    <a:lnT w="12700" cap="flat" cmpd="sng" algn="ctr">
-                      <a:solidFill>
-                        <a:srgbClr val="8BA9AB"/>
-                      </a:solidFill>
-                      <a:prstDash val="solid"/>
-                      <a:round/>
-                      <a:headEnd type="none" w="med" len="med"/>
-                      <a:tailEnd type="none" w="med" len="med"/>
-                    </a:lnT>
-                    <a:lnB w="12700" cap="flat" cmpd="sng" algn="ctr">
-                      <a:solidFill>
-                        <a:srgbClr val="8BA9AB"/>
-                      </a:solidFill>
-                      <a:prstDash val="solid"/>
-                      <a:round/>
-                      <a:headEnd type="none" w="med" len="med"/>
-                      <a:tailEnd type="none" w="med" len="med"/>
-                    </a:lnB>
-                    <a:solidFill>
-                      <a:schemeClr val="bg1"/>
-                    </a:solidFill>
-                  </a:tcPr>
-                </a:tc>
-                <a:extLst>
-                  <a:ext uri="{0D108BD9-81ED-4DB2-BD59-A6C34878D82A}">
-                    <a16:rowId xmlns:a16="http://schemas.microsoft.com/office/drawing/2014/main" val="10002"/>
-                  </a:ext>
-                </a:extLst>
-              </a:tr>
-            </a:tbl>
-          </a:graphicData>
-        </a:graphic>
-      </p:graphicFrame>
-      <p:sp>
-        <p:nvSpPr>
-          <p:cNvPr id="5" name="TextBox 4"/>
-          <p:cNvSpPr txBox="1"/>
-          <p:nvPr/>
-        </p:nvSpPr>
-        <p:spPr>
-          <a:xfrm>
-            <a:off x="4793941" y="1424748"/>
-            <a:ext cx="7396577" cy="276999"/>
-          </a:xfrm>
-          <a:prstGeom prst="rect">
-            <a:avLst/>
-          </a:prstGeom>
-          <a:noFill/>
-        </p:spPr>
-        <p:txBody>
-          <a:bodyPr wrap="none" rtlCol="0">
-            <a:spAutoFit/>
-          </a:bodyPr>
-          <a:lstStyle/>
-          <a:p>
-            <a:r>
-              <a:rPr lang="ko-KR" altLang="en-US" sz="1200" dirty="0">
-                <a:latin typeface="G마켓 산스 TTF Medium" panose="02000000000000000000" pitchFamily="2" charset="-127"/>
-                <a:ea typeface="G마켓 산스 TTF Medium" panose="02000000000000000000" pitchFamily="2" charset="-127"/>
-              </a:rPr>
-              <a:t>선정 이유</a:t>
-            </a:r>
-            <a:r>
-              <a:rPr lang="en-US" altLang="ko-KR" sz="1200" dirty="0">
-                <a:latin typeface="G마켓 산스 TTF Medium" panose="02000000000000000000" pitchFamily="2" charset="-127"/>
-                <a:ea typeface="G마켓 산스 TTF Medium" panose="02000000000000000000" pitchFamily="2" charset="-127"/>
-              </a:rPr>
-              <a:t>	</a:t>
-            </a:r>
-            <a:r>
-              <a:rPr lang="ko-KR" altLang="en-US" sz="1200" dirty="0">
-                <a:latin typeface="G마켓 산스 TTF Medium" panose="02000000000000000000" pitchFamily="2" charset="-127"/>
-                <a:ea typeface="G마켓 산스 TTF Medium" panose="02000000000000000000" pitchFamily="2" charset="-127"/>
-              </a:rPr>
-              <a:t> </a:t>
-            </a:r>
-            <a:r>
-              <a:rPr lang="en-US" altLang="ko-KR" sz="1200" dirty="0">
-                <a:latin typeface="G마켓 산스 TTF Light" panose="02000000000000000000" pitchFamily="2" charset="-127"/>
-                <a:ea typeface="G마켓 산스 TTF Light" panose="02000000000000000000" pitchFamily="2" charset="-127"/>
-              </a:rPr>
-              <a:t>:  </a:t>
-            </a:r>
-            <a:r>
-              <a:rPr lang="ko-KR" altLang="en-US" sz="1200" dirty="0">
-                <a:latin typeface="G마켓 산스 TTF Light" panose="02000000000000000000" pitchFamily="2" charset="-127"/>
-                <a:ea typeface="G마켓 산스 TTF Light" panose="02000000000000000000" pitchFamily="2" charset="-127"/>
-              </a:rPr>
-              <a:t>여러 유저들 간의 협동 혹은 경쟁을 통해 스테이지를 뚫어 나아가는 게임이라 선정하였습니다</a:t>
-            </a:r>
-            <a:r>
-              <a:rPr lang="en-US" altLang="ko-KR" sz="1200" dirty="0">
-                <a:latin typeface="G마켓 산스 TTF Light" panose="02000000000000000000" pitchFamily="2" charset="-127"/>
-                <a:ea typeface="G마켓 산스 TTF Light" panose="02000000000000000000" pitchFamily="2" charset="-127"/>
-              </a:rPr>
-              <a:t>.</a:t>
-            </a:r>
-            <a:r>
-              <a:rPr lang="ko-KR" altLang="en-US" sz="1200" dirty="0">
-                <a:latin typeface="G마켓 산스 TTF Light" panose="02000000000000000000" pitchFamily="2" charset="-127"/>
-                <a:ea typeface="G마켓 산스 TTF Light" panose="02000000000000000000" pitchFamily="2" charset="-127"/>
-              </a:rPr>
-              <a:t> </a:t>
-            </a:r>
           </a:p>
         </p:txBody>
       </p:sp>
@@ -10750,6 +10586,581 @@
     <p:bg>
       <p:bgPr>
         <a:solidFill>
+          <a:schemeClr val="bg1"/>
+        </a:solidFill>
+        <a:effectLst/>
+      </p:bgPr>
+    </p:bg>
+    <p:spTree>
+      <p:nvGrpSpPr>
+        <p:cNvPr id="1" name=""/>
+        <p:cNvGrpSpPr/>
+        <p:nvPr/>
+      </p:nvGrpSpPr>
+      <p:grpSpPr>
+        <a:xfrm>
+          <a:off x="0" y="0"/>
+          <a:ext cx="0" cy="0"/>
+          <a:chOff x="0" y="0"/>
+          <a:chExt cx="0" cy="0"/>
+        </a:xfrm>
+      </p:grpSpPr>
+      <p:sp>
+        <p:nvSpPr>
+          <p:cNvPr id="2" name="사각형: 둥근 모서리 1">
+            <a:extLst>
+              <a:ext uri="{FF2B5EF4-FFF2-40B4-BE49-F238E27FC236}">
+                <a16:creationId xmlns:a16="http://schemas.microsoft.com/office/drawing/2014/main" id="{48874B81-0718-7C9D-8743-47128BA16685}"/>
+              </a:ext>
+            </a:extLst>
+          </p:cNvPr>
+          <p:cNvSpPr/>
+          <p:nvPr/>
+        </p:nvSpPr>
+        <p:spPr>
+          <a:xfrm>
+            <a:off x="745516" y="1553986"/>
+            <a:ext cx="5007664" cy="1800000"/>
+          </a:xfrm>
+          <a:prstGeom prst="roundRect">
+            <a:avLst/>
+          </a:prstGeom>
+          <a:solidFill>
+            <a:srgbClr val="B1C6C7"/>
+          </a:solidFill>
+          <a:ln>
+            <a:noFill/>
+          </a:ln>
+        </p:spPr>
+        <p:style>
+          <a:lnRef idx="2">
+            <a:schemeClr val="accent1">
+              <a:shade val="50000"/>
+            </a:schemeClr>
+          </a:lnRef>
+          <a:fillRef idx="1">
+            <a:schemeClr val="accent1"/>
+          </a:fillRef>
+          <a:effectRef idx="0">
+            <a:schemeClr val="accent1"/>
+          </a:effectRef>
+          <a:fontRef idx="minor">
+            <a:schemeClr val="lt1"/>
+          </a:fontRef>
+        </p:style>
+        <p:txBody>
+          <a:bodyPr rtlCol="0" anchor="ctr"/>
+          <a:lstStyle/>
+          <a:p>
+            <a:pPr algn="ctr"/>
+            <a:endParaRPr lang="ko-KR" altLang="en-US"/>
+          </a:p>
+        </p:txBody>
+      </p:sp>
+      <p:sp>
+        <p:nvSpPr>
+          <p:cNvPr id="3" name="사각형: 둥근 모서리 2">
+            <a:extLst>
+              <a:ext uri="{FF2B5EF4-FFF2-40B4-BE49-F238E27FC236}">
+                <a16:creationId xmlns:a16="http://schemas.microsoft.com/office/drawing/2014/main" id="{884B4D9E-E8E5-82AB-C0A4-A95813D22005}"/>
+              </a:ext>
+            </a:extLst>
+          </p:cNvPr>
+          <p:cNvSpPr/>
+          <p:nvPr/>
+        </p:nvSpPr>
+        <p:spPr>
+          <a:xfrm>
+            <a:off x="6438820" y="1513881"/>
+            <a:ext cx="5007664" cy="1800000"/>
+          </a:xfrm>
+          <a:prstGeom prst="roundRect">
+            <a:avLst/>
+          </a:prstGeom>
+          <a:solidFill>
+            <a:srgbClr val="B1C6C7"/>
+          </a:solidFill>
+          <a:ln>
+            <a:noFill/>
+          </a:ln>
+        </p:spPr>
+        <p:style>
+          <a:lnRef idx="2">
+            <a:schemeClr val="accent1">
+              <a:shade val="50000"/>
+            </a:schemeClr>
+          </a:lnRef>
+          <a:fillRef idx="1">
+            <a:schemeClr val="accent1"/>
+          </a:fillRef>
+          <a:effectRef idx="0">
+            <a:schemeClr val="accent1"/>
+          </a:effectRef>
+          <a:fontRef idx="minor">
+            <a:schemeClr val="lt1"/>
+          </a:fontRef>
+        </p:style>
+        <p:txBody>
+          <a:bodyPr rtlCol="0" anchor="ctr"/>
+          <a:lstStyle/>
+          <a:p>
+            <a:pPr algn="ctr"/>
+            <a:endParaRPr lang="ko-KR" altLang="en-US"/>
+          </a:p>
+        </p:txBody>
+      </p:sp>
+      <p:sp>
+        <p:nvSpPr>
+          <p:cNvPr id="5" name="사각형: 둥근 모서리 4">
+            <a:extLst>
+              <a:ext uri="{FF2B5EF4-FFF2-40B4-BE49-F238E27FC236}">
+                <a16:creationId xmlns:a16="http://schemas.microsoft.com/office/drawing/2014/main" id="{38328945-B1F3-304F-660B-23D086F7428A}"/>
+              </a:ext>
+            </a:extLst>
+          </p:cNvPr>
+          <p:cNvSpPr/>
+          <p:nvPr/>
+        </p:nvSpPr>
+        <p:spPr>
+          <a:xfrm>
+            <a:off x="745516" y="4132024"/>
+            <a:ext cx="5007664" cy="1800000"/>
+          </a:xfrm>
+          <a:prstGeom prst="roundRect">
+            <a:avLst/>
+          </a:prstGeom>
+          <a:solidFill>
+            <a:srgbClr val="B1C6C7"/>
+          </a:solidFill>
+          <a:ln>
+            <a:noFill/>
+          </a:ln>
+        </p:spPr>
+        <p:style>
+          <a:lnRef idx="2">
+            <a:schemeClr val="accent1">
+              <a:shade val="50000"/>
+            </a:schemeClr>
+          </a:lnRef>
+          <a:fillRef idx="1">
+            <a:schemeClr val="accent1"/>
+          </a:fillRef>
+          <a:effectRef idx="0">
+            <a:schemeClr val="accent1"/>
+          </a:effectRef>
+          <a:fontRef idx="minor">
+            <a:schemeClr val="lt1"/>
+          </a:fontRef>
+        </p:style>
+        <p:txBody>
+          <a:bodyPr rtlCol="0" anchor="ctr"/>
+          <a:lstStyle/>
+          <a:p>
+            <a:pPr algn="ctr"/>
+            <a:endParaRPr lang="ko-KR" altLang="en-US"/>
+          </a:p>
+        </p:txBody>
+      </p:sp>
+      <p:sp>
+        <p:nvSpPr>
+          <p:cNvPr id="9" name="사각형: 둥근 모서리 8">
+            <a:extLst>
+              <a:ext uri="{FF2B5EF4-FFF2-40B4-BE49-F238E27FC236}">
+                <a16:creationId xmlns:a16="http://schemas.microsoft.com/office/drawing/2014/main" id="{EB64EEFA-E370-F2BA-7621-F5BBA3FB0E3C}"/>
+              </a:ext>
+            </a:extLst>
+          </p:cNvPr>
+          <p:cNvSpPr/>
+          <p:nvPr/>
+        </p:nvSpPr>
+        <p:spPr>
+          <a:xfrm>
+            <a:off x="6438820" y="4091919"/>
+            <a:ext cx="5007664" cy="1800000"/>
+          </a:xfrm>
+          <a:prstGeom prst="roundRect">
+            <a:avLst/>
+          </a:prstGeom>
+          <a:solidFill>
+            <a:srgbClr val="B1C6C7"/>
+          </a:solidFill>
+          <a:ln>
+            <a:noFill/>
+          </a:ln>
+        </p:spPr>
+        <p:style>
+          <a:lnRef idx="2">
+            <a:schemeClr val="accent1">
+              <a:shade val="50000"/>
+            </a:schemeClr>
+          </a:lnRef>
+          <a:fillRef idx="1">
+            <a:schemeClr val="accent1"/>
+          </a:fillRef>
+          <a:effectRef idx="0">
+            <a:schemeClr val="accent1"/>
+          </a:effectRef>
+          <a:fontRef idx="minor">
+            <a:schemeClr val="lt1"/>
+          </a:fontRef>
+        </p:style>
+        <p:txBody>
+          <a:bodyPr rtlCol="0" anchor="ctr"/>
+          <a:lstStyle/>
+          <a:p>
+            <a:pPr algn="ctr"/>
+            <a:endParaRPr lang="ko-KR" altLang="en-US"/>
+          </a:p>
+        </p:txBody>
+      </p:sp>
+      <p:sp>
+        <p:nvSpPr>
+          <p:cNvPr id="10" name="직사각형 9">
+            <a:extLst>
+              <a:ext uri="{FF2B5EF4-FFF2-40B4-BE49-F238E27FC236}">
+                <a16:creationId xmlns:a16="http://schemas.microsoft.com/office/drawing/2014/main" id="{50F23E1D-8121-CB46-1160-FD2CD7FB610F}"/>
+              </a:ext>
+            </a:extLst>
+          </p:cNvPr>
+          <p:cNvSpPr/>
+          <p:nvPr/>
+        </p:nvSpPr>
+        <p:spPr>
+          <a:xfrm>
+            <a:off x="469900" y="925976"/>
+            <a:ext cx="11226800" cy="5617119"/>
+          </a:xfrm>
+          <a:prstGeom prst="rect">
+            <a:avLst/>
+          </a:prstGeom>
+          <a:noFill/>
+          <a:ln w="28575">
+            <a:solidFill>
+              <a:srgbClr val="A3BCBD"/>
+            </a:solidFill>
+          </a:ln>
+        </p:spPr>
+        <p:style>
+          <a:lnRef idx="2">
+            <a:schemeClr val="accent1">
+              <a:shade val="50000"/>
+            </a:schemeClr>
+          </a:lnRef>
+          <a:fillRef idx="1">
+            <a:schemeClr val="accent1"/>
+          </a:fillRef>
+          <a:effectRef idx="0">
+            <a:schemeClr val="accent1"/>
+          </a:effectRef>
+          <a:fontRef idx="minor">
+            <a:schemeClr val="lt1"/>
+          </a:fontRef>
+        </p:style>
+        <p:txBody>
+          <a:bodyPr rtlCol="0" anchor="ctr"/>
+          <a:lstStyle/>
+          <a:p>
+            <a:pPr algn="ctr"/>
+            <a:endParaRPr lang="ko-KR" altLang="en-US"/>
+          </a:p>
+        </p:txBody>
+      </p:sp>
+      <p:sp>
+        <p:nvSpPr>
+          <p:cNvPr id="11" name="TextBox 10">
+            <a:extLst>
+              <a:ext uri="{FF2B5EF4-FFF2-40B4-BE49-F238E27FC236}">
+                <a16:creationId xmlns:a16="http://schemas.microsoft.com/office/drawing/2014/main" id="{61565F28-1967-4D3F-5EA0-C23EA451E957}"/>
+              </a:ext>
+            </a:extLst>
+          </p:cNvPr>
+          <p:cNvSpPr txBox="1"/>
+          <p:nvPr/>
+        </p:nvSpPr>
+        <p:spPr>
+          <a:xfrm>
+            <a:off x="469900" y="260991"/>
+            <a:ext cx="4273753" cy="584775"/>
+          </a:xfrm>
+          <a:prstGeom prst="rect">
+            <a:avLst/>
+          </a:prstGeom>
+          <a:noFill/>
+        </p:spPr>
+        <p:txBody>
+          <a:bodyPr wrap="square" rtlCol="0">
+            <a:spAutoFit/>
+          </a:bodyPr>
+          <a:lstStyle/>
+          <a:p>
+            <a:r>
+              <a:rPr lang="en-US" altLang="ko-KR" sz="3200" dirty="0">
+                <a:solidFill>
+                  <a:srgbClr val="8BA9AB"/>
+                </a:solidFill>
+                <a:latin typeface="여기어때 잘난체" panose="020B0600000101010101" pitchFamily="50" charset="-127"/>
+                <a:ea typeface="여기어때 잘난체" panose="020B0600000101010101" pitchFamily="50" charset="-127"/>
+              </a:rPr>
+              <a:t>04. </a:t>
+            </a:r>
+            <a:r>
+              <a:rPr lang="ko-KR" altLang="en-US" sz="3200" dirty="0">
+                <a:solidFill>
+                  <a:srgbClr val="8BA9AB"/>
+                </a:solidFill>
+                <a:latin typeface="여기어때 잘난체" panose="020B0600000101010101" pitchFamily="50" charset="-127"/>
+                <a:ea typeface="여기어때 잘난체" panose="020B0600000101010101" pitchFamily="50" charset="-127"/>
+              </a:rPr>
+              <a:t>타 게임과 비교</a:t>
+            </a:r>
+          </a:p>
+        </p:txBody>
+      </p:sp>
+      <p:sp>
+        <p:nvSpPr>
+          <p:cNvPr id="12" name="TextBox 11">
+            <a:extLst>
+              <a:ext uri="{FF2B5EF4-FFF2-40B4-BE49-F238E27FC236}">
+                <a16:creationId xmlns:a16="http://schemas.microsoft.com/office/drawing/2014/main" id="{A5E6E248-FAD2-03B7-617D-78AE1A378E54}"/>
+              </a:ext>
+            </a:extLst>
+          </p:cNvPr>
+          <p:cNvSpPr txBox="1"/>
+          <p:nvPr/>
+        </p:nvSpPr>
+        <p:spPr>
+          <a:xfrm>
+            <a:off x="2542873" y="2172247"/>
+            <a:ext cx="2666114" cy="584775"/>
+          </a:xfrm>
+          <a:prstGeom prst="rect">
+            <a:avLst/>
+          </a:prstGeom>
+          <a:noFill/>
+        </p:spPr>
+        <p:txBody>
+          <a:bodyPr wrap="none" rtlCol="0">
+            <a:spAutoFit/>
+          </a:bodyPr>
+          <a:lstStyle/>
+          <a:p>
+            <a:r>
+              <a:rPr lang="ko-KR" altLang="en-US" sz="3200" dirty="0">
+                <a:solidFill>
+                  <a:schemeClr val="bg1"/>
+                </a:solidFill>
+                <a:latin typeface="G마켓 산스 TTF Bold" panose="02000000000000000000" pitchFamily="2" charset="-127"/>
+                <a:ea typeface="G마켓 산스 TTF Bold" panose="02000000000000000000" pitchFamily="2" charset="-127"/>
+              </a:rPr>
+              <a:t>무기의 다양성</a:t>
+            </a:r>
+          </a:p>
+        </p:txBody>
+      </p:sp>
+      <p:pic>
+        <p:nvPicPr>
+          <p:cNvPr id="13" name="그림 12">
+            <a:extLst>
+              <a:ext uri="{FF2B5EF4-FFF2-40B4-BE49-F238E27FC236}">
+                <a16:creationId xmlns:a16="http://schemas.microsoft.com/office/drawing/2014/main" id="{2B9FD514-22B6-B019-63B1-E41A0D67784A}"/>
+              </a:ext>
+            </a:extLst>
+          </p:cNvPr>
+          <p:cNvPicPr>
+            <a:picLocks noChangeAspect="1"/>
+          </p:cNvPicPr>
+          <p:nvPr/>
+        </p:nvPicPr>
+        <p:blipFill>
+          <a:blip r:embed="rId2" cstate="print">
+            <a:extLst>
+              <a:ext uri="{28A0092B-C50C-407E-A947-70E740481C1C}">
+                <a14:useLocalDpi xmlns:a14="http://schemas.microsoft.com/office/drawing/2010/main" val="0"/>
+              </a:ext>
+            </a:extLst>
+          </a:blip>
+          <a:stretch>
+            <a:fillRect/>
+          </a:stretch>
+        </p:blipFill>
+        <p:spPr>
+          <a:xfrm>
+            <a:off x="1284714" y="2495413"/>
+            <a:ext cx="572519" cy="572519"/>
+          </a:xfrm>
+          <a:prstGeom prst="rect">
+            <a:avLst/>
+          </a:prstGeom>
+        </p:spPr>
+      </p:pic>
+      <p:pic>
+        <p:nvPicPr>
+          <p:cNvPr id="16" name="그림 15">
+            <a:extLst>
+              <a:ext uri="{FF2B5EF4-FFF2-40B4-BE49-F238E27FC236}">
+                <a16:creationId xmlns:a16="http://schemas.microsoft.com/office/drawing/2014/main" id="{24CD8405-2C60-247F-AD95-DBB4D7D97BD9}"/>
+              </a:ext>
+            </a:extLst>
+          </p:cNvPr>
+          <p:cNvPicPr>
+            <a:picLocks noChangeAspect="1"/>
+          </p:cNvPicPr>
+          <p:nvPr/>
+        </p:nvPicPr>
+        <p:blipFill>
+          <a:blip r:embed="rId3" cstate="print">
+            <a:extLst>
+              <a:ext uri="{28A0092B-C50C-407E-A947-70E740481C1C}">
+                <a14:useLocalDpi xmlns:a14="http://schemas.microsoft.com/office/drawing/2010/main" val="0"/>
+              </a:ext>
+            </a:extLst>
+          </a:blip>
+          <a:stretch>
+            <a:fillRect/>
+          </a:stretch>
+        </p:blipFill>
+        <p:spPr>
+          <a:xfrm>
+            <a:off x="1789866" y="1788744"/>
+            <a:ext cx="627087" cy="627087"/>
+          </a:xfrm>
+          <a:prstGeom prst="rect">
+            <a:avLst/>
+          </a:prstGeom>
+        </p:spPr>
+      </p:pic>
+      <p:pic>
+        <p:nvPicPr>
+          <p:cNvPr id="17" name="그림 16">
+            <a:extLst>
+              <a:ext uri="{FF2B5EF4-FFF2-40B4-BE49-F238E27FC236}">
+                <a16:creationId xmlns:a16="http://schemas.microsoft.com/office/drawing/2014/main" id="{9B8FB1B3-8A35-7D1A-E809-0BCEFDB47982}"/>
+              </a:ext>
+            </a:extLst>
+          </p:cNvPr>
+          <p:cNvPicPr>
+            <a:picLocks noChangeAspect="1"/>
+          </p:cNvPicPr>
+          <p:nvPr/>
+        </p:nvPicPr>
+        <p:blipFill>
+          <a:blip r:embed="rId4" cstate="print">
+            <a:extLst>
+              <a:ext uri="{28A0092B-C50C-407E-A947-70E740481C1C}">
+                <a14:useLocalDpi xmlns:a14="http://schemas.microsoft.com/office/drawing/2010/main" val="0"/>
+              </a:ext>
+            </a:extLst>
+          </a:blip>
+          <a:stretch>
+            <a:fillRect/>
+          </a:stretch>
+        </p:blipFill>
+        <p:spPr>
+          <a:xfrm>
+            <a:off x="909981" y="1841362"/>
+            <a:ext cx="572519" cy="572519"/>
+          </a:xfrm>
+          <a:prstGeom prst="rect">
+            <a:avLst/>
+          </a:prstGeom>
+        </p:spPr>
+      </p:pic>
+      <p:pic>
+        <p:nvPicPr>
+          <p:cNvPr id="19" name="그림 18">
+            <a:extLst>
+              <a:ext uri="{FF2B5EF4-FFF2-40B4-BE49-F238E27FC236}">
+                <a16:creationId xmlns:a16="http://schemas.microsoft.com/office/drawing/2014/main" id="{31B552ED-8D92-D8AD-C3A7-C00261FB106D}"/>
+              </a:ext>
+            </a:extLst>
+          </p:cNvPr>
+          <p:cNvPicPr>
+            <a:picLocks noChangeAspect="1"/>
+          </p:cNvPicPr>
+          <p:nvPr/>
+        </p:nvPicPr>
+        <p:blipFill>
+          <a:blip r:embed="rId5" cstate="print">
+            <a:extLst>
+              <a:ext uri="{28A0092B-C50C-407E-A947-70E740481C1C}">
+                <a14:useLocalDpi xmlns:a14="http://schemas.microsoft.com/office/drawing/2010/main" val="0"/>
+              </a:ext>
+            </a:extLst>
+          </a:blip>
+          <a:stretch>
+            <a:fillRect/>
+          </a:stretch>
+        </p:blipFill>
+        <p:spPr>
+          <a:xfrm>
+            <a:off x="6709753" y="1778299"/>
+            <a:ext cx="1271163" cy="1271163"/>
+          </a:xfrm>
+          <a:prstGeom prst="rect">
+            <a:avLst/>
+          </a:prstGeom>
+        </p:spPr>
+      </p:pic>
+      <p:sp>
+        <p:nvSpPr>
+          <p:cNvPr id="20" name="TextBox 19">
+            <a:extLst>
+              <a:ext uri="{FF2B5EF4-FFF2-40B4-BE49-F238E27FC236}">
+                <a16:creationId xmlns:a16="http://schemas.microsoft.com/office/drawing/2014/main" id="{C191FD9D-6365-5F68-7F24-614E13672AE1}"/>
+              </a:ext>
+            </a:extLst>
+          </p:cNvPr>
+          <p:cNvSpPr txBox="1"/>
+          <p:nvPr/>
+        </p:nvSpPr>
+        <p:spPr>
+          <a:xfrm>
+            <a:off x="8106150" y="2161598"/>
+            <a:ext cx="3175869" cy="584775"/>
+          </a:xfrm>
+          <a:prstGeom prst="rect">
+            <a:avLst/>
+          </a:prstGeom>
+          <a:noFill/>
+        </p:spPr>
+        <p:txBody>
+          <a:bodyPr wrap="none" rtlCol="0">
+            <a:spAutoFit/>
+          </a:bodyPr>
+          <a:lstStyle/>
+          <a:p>
+            <a:r>
+              <a:rPr lang="ko-KR" altLang="en-US" sz="3200" dirty="0">
+                <a:solidFill>
+                  <a:schemeClr val="bg1"/>
+                </a:solidFill>
+                <a:latin typeface="G마켓 산스 TTF Bold" panose="02000000000000000000" pitchFamily="2" charset="-127"/>
+                <a:ea typeface="G마켓 산스 TTF Bold" panose="02000000000000000000" pitchFamily="2" charset="-127"/>
+              </a:rPr>
+              <a:t>즐거운 퍼즐 요소</a:t>
+            </a:r>
+          </a:p>
+        </p:txBody>
+      </p:sp>
+    </p:spTree>
+    <p:extLst>
+      <p:ext uri="{BB962C8B-B14F-4D97-AF65-F5344CB8AC3E}">
+        <p14:creationId xmlns:p14="http://schemas.microsoft.com/office/powerpoint/2010/main" val="947484716"/>
+      </p:ext>
+    </p:extLst>
+  </p:cSld>
+  <p:clrMapOvr>
+    <a:masterClrMapping/>
+  </p:clrMapOvr>
+</p:sld>
+</file>
+
+<file path=ppt/slides/slide21.xml><?xml version="1.0" encoding="utf-8"?>
+<p:sld xmlns:a="http://schemas.openxmlformats.org/drawingml/2006/main" xmlns:r="http://schemas.openxmlformats.org/officeDocument/2006/relationships" xmlns:p="http://schemas.openxmlformats.org/presentationml/2006/main">
+  <p:cSld>
+    <p:bg>
+      <p:bgPr>
+        <a:solidFill>
           <a:srgbClr val="8BA9AB"/>
         </a:solidFill>
         <a:effectLst/>
@@ -10880,7 +11291,7 @@
 </p:sld>
 </file>
 
-<file path=ppt/slides/slide21.xml><?xml version="1.0" encoding="utf-8"?>
+<file path=ppt/slides/slide22.xml><?xml version="1.0" encoding="utf-8"?>
 <p:sld xmlns:a="http://schemas.openxmlformats.org/drawingml/2006/main" xmlns:r="http://schemas.openxmlformats.org/officeDocument/2006/relationships" xmlns:p="http://schemas.openxmlformats.org/presentationml/2006/main">
   <p:cSld>
     <p:bg>
@@ -11006,7 +11417,7 @@
 </p:sld>
 </file>
 
-<file path=ppt/slides/slide22.xml><?xml version="1.0" encoding="utf-8"?>
+<file path=ppt/slides/slide23.xml><?xml version="1.0" encoding="utf-8"?>
 <p:sld xmlns:a="http://schemas.openxmlformats.org/drawingml/2006/main" xmlns:r="http://schemas.openxmlformats.org/officeDocument/2006/relationships" xmlns:p="http://schemas.openxmlformats.org/presentationml/2006/main">
   <p:cSld>
     <p:bg>
@@ -13491,6 +13902,14 @@
 <file path=ppt/slides/slide9.xml><?xml version="1.0" encoding="utf-8"?>
 <p:sld xmlns:a="http://schemas.openxmlformats.org/drawingml/2006/main" xmlns:r="http://schemas.openxmlformats.org/officeDocument/2006/relationships" xmlns:p="http://schemas.openxmlformats.org/presentationml/2006/main">
   <p:cSld>
+    <p:bg>
+      <p:bgPr>
+        <a:solidFill>
+          <a:srgbClr val="8BA9AB"/>
+        </a:solidFill>
+        <a:effectLst/>
+      </p:bgPr>
+    </p:bg>
     <p:spTree>
       <p:nvGrpSpPr>
         <p:cNvPr id="1" name=""/>
@@ -13549,10 +13968,6 @@
           <a:lstStyle/>
           <a:p>
             <a:pPr algn="ctr"/>
-            <a:r>
-              <a:rPr lang="en-US" altLang="ko-KR"/>
-              <a:t>s</a:t>
-            </a:r>
             <a:endParaRPr lang="ko-KR" altLang="en-US"/>
           </a:p>
         </p:txBody>
@@ -13565,8 +13980,8 @@
         </p:nvSpPr>
         <p:spPr>
           <a:xfrm>
-            <a:off x="469900" y="260991"/>
-            <a:ext cx="5412740" cy="1077218"/>
+            <a:off x="469899" y="260991"/>
+            <a:ext cx="7888037" cy="584775"/>
           </a:xfrm>
           <a:prstGeom prst="rect">
             <a:avLst/>
@@ -13581,45 +13996,13 @@
           <a:p>
             <a:r>
               <a:rPr lang="en-US" altLang="ko-KR" sz="3200" dirty="0">
+                <a:solidFill>
+                  <a:schemeClr val="bg1"/>
+                </a:solidFill>
                 <a:latin typeface="여기어때 잘난체" panose="020B0600000101010101" pitchFamily="50" charset="-127"/>
                 <a:ea typeface="여기어때 잘난체" panose="020B0600000101010101" pitchFamily="50" charset="-127"/>
               </a:rPr>
               <a:t>02. </a:t>
-            </a:r>
-            <a:r>
-              <a:rPr lang="ko-KR" altLang="en-US" sz="3200" dirty="0">
-                <a:latin typeface="여기어때 잘난체" panose="020B0600000101010101" pitchFamily="50" charset="-127"/>
-                <a:ea typeface="여기어때 잘난체" panose="020B0600000101010101" pitchFamily="50" charset="-127"/>
-              </a:rPr>
-              <a:t>게임소개 </a:t>
-            </a:r>
-            <a:r>
-              <a:rPr lang="en-US" altLang="ko-KR" sz="3200" dirty="0">
-                <a:latin typeface="여기어때 잘난체" panose="020B0600000101010101" pitchFamily="50" charset="-127"/>
-                <a:ea typeface="여기어때 잘난체" panose="020B0600000101010101" pitchFamily="50" charset="-127"/>
-              </a:rPr>
-              <a:t>– </a:t>
-            </a:r>
-            <a:r>
-              <a:rPr lang="ko-KR" altLang="en-US" sz="3200" dirty="0">
-                <a:latin typeface="여기어때 잘난체" panose="020B0600000101010101" pitchFamily="50" charset="-127"/>
-                <a:ea typeface="여기어때 잘난체" panose="020B0600000101010101" pitchFamily="50" charset="-127"/>
-              </a:rPr>
-              <a:t>게임 월드 </a:t>
-            </a:r>
-            <a:r>
-              <a:rPr lang="ko-KR" altLang="en-US" sz="1200" dirty="0" err="1">
-                <a:latin typeface="여기어때 잘난체" panose="020B0600000101010101" pitchFamily="50" charset="-127"/>
-                <a:ea typeface="여기어때 잘난체" panose="020B0600000101010101" pitchFamily="50" charset="-127"/>
-              </a:rPr>
-              <a:t>잡몹전</a:t>
-            </a:r>
-            <a:r>
-              <a:rPr lang="en-US" altLang="ko-KR" sz="1200" dirty="0">
-                <a:latin typeface="여기어때 잘난체" panose="020B0600000101010101" pitchFamily="50" charset="-127"/>
-                <a:ea typeface="여기어때 잘난체" panose="020B0600000101010101" pitchFamily="50" charset="-127"/>
-              </a:rPr>
-              <a:t> </a:t>
             </a:r>
             <a:r>
               <a:rPr lang="ko-KR" altLang="en-US" sz="3200" dirty="0">
@@ -13629,17 +14012,125 @@
                 <a:latin typeface="여기어때 잘난체" panose="020B0600000101010101" pitchFamily="50" charset="-127"/>
                 <a:ea typeface="여기어때 잘난체" panose="020B0600000101010101" pitchFamily="50" charset="-127"/>
               </a:rPr>
-              <a:t>게임 월드 </a:t>
-            </a:r>
+              <a:t>게임 소개 </a:t>
+            </a:r>
+            <a:r>
+              <a:rPr lang="en-US" altLang="ko-KR" sz="3200" dirty="0">
+                <a:solidFill>
+                  <a:schemeClr val="bg1"/>
+                </a:solidFill>
+                <a:latin typeface="여기어때 잘난체" panose="020B0600000101010101" pitchFamily="50" charset="-127"/>
+                <a:ea typeface="여기어때 잘난체" panose="020B0600000101010101" pitchFamily="50" charset="-127"/>
+              </a:rPr>
+              <a:t>– </a:t>
+            </a:r>
+            <a:r>
+              <a:rPr lang="ko-KR" altLang="en-US" sz="3200" dirty="0">
+                <a:solidFill>
+                  <a:schemeClr val="bg1"/>
+                </a:solidFill>
+                <a:latin typeface="여기어때 잘난체" panose="020B0600000101010101" pitchFamily="50" charset="-127"/>
+                <a:ea typeface="여기어때 잘난체" panose="020B0600000101010101" pitchFamily="50" charset="-127"/>
+              </a:rPr>
+              <a:t>게임 월드</a:t>
+            </a:r>
+            <a:r>
+              <a:rPr lang="ko-KR" altLang="en-US" sz="2400" dirty="0">
+                <a:solidFill>
+                  <a:schemeClr val="bg1"/>
+                </a:solidFill>
+                <a:latin typeface="여기어때 잘난체" panose="020B0600000101010101" pitchFamily="50" charset="-127"/>
+                <a:ea typeface="여기어때 잘난체" panose="020B0600000101010101" pitchFamily="50" charset="-127"/>
+              </a:rPr>
+              <a:t> </a:t>
+            </a:r>
+            <a:r>
+              <a:rPr lang="ko-KR" altLang="en-US" sz="2400" dirty="0" err="1">
+                <a:solidFill>
+                  <a:schemeClr val="bg1"/>
+                </a:solidFill>
+                <a:latin typeface="여기어때 잘난체" panose="020B0600000101010101" pitchFamily="50" charset="-127"/>
+                <a:ea typeface="여기어때 잘난체" panose="020B0600000101010101" pitchFamily="50" charset="-127"/>
+              </a:rPr>
+              <a:t>잡몹전</a:t>
+            </a:r>
+            <a:r>
+              <a:rPr lang="ko-KR" altLang="en-US" sz="2400" dirty="0">
+                <a:solidFill>
+                  <a:schemeClr val="bg1"/>
+                </a:solidFill>
+                <a:latin typeface="여기어때 잘난체" panose="020B0600000101010101" pitchFamily="50" charset="-127"/>
+                <a:ea typeface="여기어때 잘난체" panose="020B0600000101010101" pitchFamily="50" charset="-127"/>
+              </a:rPr>
+              <a:t>  </a:t>
+            </a:r>
+          </a:p>
+        </p:txBody>
+      </p:sp>
+      <p:sp>
+        <p:nvSpPr>
+          <p:cNvPr id="7" name="직사각형 6">
+            <a:extLst>
+              <a:ext uri="{FF2B5EF4-FFF2-40B4-BE49-F238E27FC236}">
+                <a16:creationId xmlns:a16="http://schemas.microsoft.com/office/drawing/2014/main" id="{8D6402C3-8B48-E8FE-94A1-7748C9B253A4}"/>
+              </a:ext>
+            </a:extLst>
+          </p:cNvPr>
+          <p:cNvSpPr/>
+          <p:nvPr/>
+        </p:nvSpPr>
+        <p:spPr>
+          <a:xfrm>
+            <a:off x="469900" y="925976"/>
+            <a:ext cx="11226800" cy="5617119"/>
+          </a:xfrm>
+          <a:prstGeom prst="rect">
+            <a:avLst/>
+          </a:prstGeom>
+          <a:solidFill>
+            <a:schemeClr val="bg1"/>
+          </a:solidFill>
+          <a:ln w="28575">
+            <a:solidFill>
+              <a:srgbClr val="A3BCBD"/>
+            </a:solidFill>
+          </a:ln>
+        </p:spPr>
+        <p:style>
+          <a:lnRef idx="2">
+            <a:schemeClr val="accent1">
+              <a:shade val="50000"/>
+            </a:schemeClr>
+          </a:lnRef>
+          <a:fillRef idx="1">
+            <a:schemeClr val="accent1"/>
+          </a:fillRef>
+          <a:effectRef idx="0">
+            <a:schemeClr val="accent1"/>
+          </a:effectRef>
+          <a:fontRef idx="minor">
+            <a:schemeClr val="lt1"/>
+          </a:fontRef>
+        </p:style>
+        <p:txBody>
+          <a:bodyPr rtlCol="0" anchor="ctr"/>
+          <a:lstStyle/>
+          <a:p>
+            <a:pPr algn="ctr"/>
+            <a:r>
+              <a:rPr lang="en-US" altLang="ko-KR"/>
+              <a:t>s</a:t>
+            </a:r>
+            <a:endParaRPr lang="ko-KR" altLang="en-US"/>
           </a:p>
         </p:txBody>
       </p:sp>
       <p:pic>
         <p:nvPicPr>
-          <p:cNvPr id="4" name="그림 3">
+          <p:cNvPr id="9" name="그림 8">
             <a:extLst>
               <a:ext uri="{FF2B5EF4-FFF2-40B4-BE49-F238E27FC236}">
-                <a16:creationId xmlns:a16="http://schemas.microsoft.com/office/drawing/2014/main" id="{CF767FF6-64A5-554C-F5B7-2DBE0680C07F}"/>
+                <a16:creationId xmlns:a16="http://schemas.microsoft.com/office/drawing/2014/main" id="{37168EE8-6D94-C7A0-15CD-6333F22194A5}"/>
               </a:ext>
             </a:extLst>
           </p:cNvPr>
@@ -13673,7 +14164,7 @@
     </p:spTree>
     <p:extLst>
       <p:ext uri="{BB962C8B-B14F-4D97-AF65-F5344CB8AC3E}">
-        <p14:creationId xmlns:p14="http://schemas.microsoft.com/office/powerpoint/2010/main" val="3338335739"/>
+        <p14:creationId xmlns:p14="http://schemas.microsoft.com/office/powerpoint/2010/main" val="2419748640"/>
       </p:ext>
     </p:extLst>
   </p:cSld>

</xml_diff>